<commit_message>
Typo in instruction Image
</commit_message>
<xml_diff>
--- a/user-study/instructions/Instructions.pptx
+++ b/user-study/instructions/Instructions.pptx
@@ -5563,7 +5563,7 @@
         </p:nvGrpSpPr>
         <p:grpSpPr>
           <a:xfrm>
-            <a:off x="1107164" y="685800"/>
+            <a:off x="2924746" y="647700"/>
             <a:ext cx="4690625" cy="5562600"/>
             <a:chOff x="3124200" y="609600"/>
             <a:chExt cx="4883390" cy="5791200"/>
@@ -5690,7 +5690,7 @@
         </p:nvSpPr>
         <p:spPr>
           <a:xfrm>
-            <a:off x="5940050" y="1168452"/>
+            <a:off x="7757632" y="1130352"/>
             <a:ext cx="1509622" cy="923330"/>
           </a:xfrm>
           <a:prstGeom prst="rect">
@@ -5706,7 +5706,7 @@
           <a:p>
             <a:r>
               <a:rPr lang="en-US" dirty="0"/>
-              <a:t>Click to rate next image.</a:t>
+              <a:t>Click to see next image.</a:t>
             </a:r>
           </a:p>
           <a:p>
@@ -5731,7 +5731,7 @@
         </p:nvSpPr>
         <p:spPr>
           <a:xfrm>
-            <a:off x="4876801" y="685801"/>
+            <a:off x="6694383" y="647701"/>
             <a:ext cx="838200" cy="457200"/>
           </a:xfrm>
           <a:prstGeom prst="roundRect">
@@ -5789,7 +5789,7 @@
         </p:nvCxnSpPr>
         <p:spPr>
           <a:xfrm>
-            <a:off x="5715001" y="914401"/>
+            <a:off x="7532583" y="876301"/>
             <a:ext cx="225049" cy="715716"/>
           </a:xfrm>
           <a:prstGeom prst="straightConnector1">

</xml_diff>

<commit_message>
Updated Instructions images still need to be cropped
</commit_message>
<xml_diff>
--- a/user-study/instructions/Instructions.pptx
+++ b/user-study/instructions/Instructions.pptx
@@ -2,7 +2,7 @@
 <file path=ppt/presentation.xml><?xml version="1.0" encoding="utf-8"?>
 <p:presentation xmlns:a="http://schemas.openxmlformats.org/drawingml/2006/main" xmlns:r="http://schemas.openxmlformats.org/officeDocument/2006/relationships" xmlns:p="http://schemas.openxmlformats.org/presentationml/2006/main" saveSubsetFonts="1">
   <p:sldMasterIdLst>
-    <p:sldMasterId id="2147483648" r:id="rId1"/>
+    <p:sldMasterId id="2147483660" r:id="rId1"/>
   </p:sldMasterIdLst>
   <p:sldIdLst>
     <p:sldId id="256" r:id="rId2"/>
@@ -14,13 +14,13 @@
     <p:sldId id="264" r:id="rId8"/>
     <p:sldId id="265" r:id="rId9"/>
   </p:sldIdLst>
-  <p:sldSz cx="12192000" cy="6858000"/>
+  <p:sldSz cx="9144000" cy="6858000" type="screen4x3"/>
   <p:notesSz cx="6858000" cy="9144000"/>
   <p:defaultTextStyle>
     <a:defPPr>
       <a:defRPr lang="en-US"/>
     </a:defPPr>
-    <a:lvl1pPr marL="0" algn="l" defTabSz="914400" rtl="0" eaLnBrk="1" latinLnBrk="0" hangingPunct="1">
+    <a:lvl1pPr marL="0" algn="l" defTabSz="457200" rtl="0" eaLnBrk="1" latinLnBrk="0" hangingPunct="1">
       <a:defRPr sz="1800" kern="1200">
         <a:solidFill>
           <a:schemeClr val="tx1"/>
@@ -30,7 +30,7 @@
         <a:cs typeface="+mn-cs"/>
       </a:defRPr>
     </a:lvl1pPr>
-    <a:lvl2pPr marL="457200" algn="l" defTabSz="914400" rtl="0" eaLnBrk="1" latinLnBrk="0" hangingPunct="1">
+    <a:lvl2pPr marL="457200" algn="l" defTabSz="457200" rtl="0" eaLnBrk="1" latinLnBrk="0" hangingPunct="1">
       <a:defRPr sz="1800" kern="1200">
         <a:solidFill>
           <a:schemeClr val="tx1"/>
@@ -40,7 +40,7 @@
         <a:cs typeface="+mn-cs"/>
       </a:defRPr>
     </a:lvl2pPr>
-    <a:lvl3pPr marL="914400" algn="l" defTabSz="914400" rtl="0" eaLnBrk="1" latinLnBrk="0" hangingPunct="1">
+    <a:lvl3pPr marL="914400" algn="l" defTabSz="457200" rtl="0" eaLnBrk="1" latinLnBrk="0" hangingPunct="1">
       <a:defRPr sz="1800" kern="1200">
         <a:solidFill>
           <a:schemeClr val="tx1"/>
@@ -50,7 +50,7 @@
         <a:cs typeface="+mn-cs"/>
       </a:defRPr>
     </a:lvl3pPr>
-    <a:lvl4pPr marL="1371600" algn="l" defTabSz="914400" rtl="0" eaLnBrk="1" latinLnBrk="0" hangingPunct="1">
+    <a:lvl4pPr marL="1371600" algn="l" defTabSz="457200" rtl="0" eaLnBrk="1" latinLnBrk="0" hangingPunct="1">
       <a:defRPr sz="1800" kern="1200">
         <a:solidFill>
           <a:schemeClr val="tx1"/>
@@ -60,7 +60,7 @@
         <a:cs typeface="+mn-cs"/>
       </a:defRPr>
     </a:lvl4pPr>
-    <a:lvl5pPr marL="1828800" algn="l" defTabSz="914400" rtl="0" eaLnBrk="1" latinLnBrk="0" hangingPunct="1">
+    <a:lvl5pPr marL="1828800" algn="l" defTabSz="457200" rtl="0" eaLnBrk="1" latinLnBrk="0" hangingPunct="1">
       <a:defRPr sz="1800" kern="1200">
         <a:solidFill>
           <a:schemeClr val="tx1"/>
@@ -70,7 +70,7 @@
         <a:cs typeface="+mn-cs"/>
       </a:defRPr>
     </a:lvl5pPr>
-    <a:lvl6pPr marL="2286000" algn="l" defTabSz="914400" rtl="0" eaLnBrk="1" latinLnBrk="0" hangingPunct="1">
+    <a:lvl6pPr marL="2286000" algn="l" defTabSz="457200" rtl="0" eaLnBrk="1" latinLnBrk="0" hangingPunct="1">
       <a:defRPr sz="1800" kern="1200">
         <a:solidFill>
           <a:schemeClr val="tx1"/>
@@ -80,7 +80,7 @@
         <a:cs typeface="+mn-cs"/>
       </a:defRPr>
     </a:lvl6pPr>
-    <a:lvl7pPr marL="2743200" algn="l" defTabSz="914400" rtl="0" eaLnBrk="1" latinLnBrk="0" hangingPunct="1">
+    <a:lvl7pPr marL="2743200" algn="l" defTabSz="457200" rtl="0" eaLnBrk="1" latinLnBrk="0" hangingPunct="1">
       <a:defRPr sz="1800" kern="1200">
         <a:solidFill>
           <a:schemeClr val="tx1"/>
@@ -90,7 +90,7 @@
         <a:cs typeface="+mn-cs"/>
       </a:defRPr>
     </a:lvl7pPr>
-    <a:lvl8pPr marL="3200400" algn="l" defTabSz="914400" rtl="0" eaLnBrk="1" latinLnBrk="0" hangingPunct="1">
+    <a:lvl8pPr marL="3200400" algn="l" defTabSz="457200" rtl="0" eaLnBrk="1" latinLnBrk="0" hangingPunct="1">
       <a:defRPr sz="1800" kern="1200">
         <a:solidFill>
           <a:schemeClr val="tx1"/>
@@ -100,7 +100,7 @@
         <a:cs typeface="+mn-cs"/>
       </a:defRPr>
     </a:lvl8pPr>
-    <a:lvl9pPr marL="3657600" algn="l" defTabSz="914400" rtl="0" eaLnBrk="1" latinLnBrk="0" hangingPunct="1">
+    <a:lvl9pPr marL="3657600" algn="l" defTabSz="457200" rtl="0" eaLnBrk="1" latinLnBrk="0" hangingPunct="1">
       <a:defRPr sz="1800" kern="1200">
         <a:solidFill>
           <a:schemeClr val="tx1"/>
@@ -113,7 +113,18 @@
   </p:defaultTextStyle>
   <p:extLst>
     <p:ext uri="{EFAFB233-063F-42B5-8137-9DF3F51BA10A}">
-      <p15:sldGuideLst xmlns:p15="http://schemas.microsoft.com/office/powerpoint/2012/main"/>
+      <p15:sldGuideLst xmlns:p15="http://schemas.microsoft.com/office/powerpoint/2012/main">
+        <p15:guide id="1" orient="horz" pos="2160" userDrawn="1">
+          <p15:clr>
+            <a:srgbClr val="A4A3A4"/>
+          </p15:clr>
+        </p15:guide>
+        <p15:guide id="2" pos="2880" userDrawn="1">
+          <p15:clr>
+            <a:srgbClr val="A4A3A4"/>
+          </p15:clr>
+        </p15:guide>
+      </p15:sldGuideLst>
     </p:ext>
   </p:extLst>
 </p:presentation>
@@ -138,13 +149,7 @@
       </p:grpSpPr>
       <p:sp>
         <p:nvSpPr>
-          <p:cNvPr id="2" name="Title 1">
-            <a:extLst>
-              <a:ext uri="{FF2B5EF4-FFF2-40B4-BE49-F238E27FC236}">
-                <a16:creationId xmlns:a16="http://schemas.microsoft.com/office/drawing/2014/main" id="{9FE2268F-F0DD-46BB-9ABF-4FA57AAF2571}"/>
-              </a:ext>
-            </a:extLst>
-          </p:cNvPr>
+          <p:cNvPr id="2" name="Title 1"/>
           <p:cNvSpPr>
             <a:spLocks noGrp="1"/>
           </p:cNvSpPr>
@@ -154,8 +159,8 @@
         </p:nvSpPr>
         <p:spPr>
           <a:xfrm>
-            <a:off x="1524000" y="1122363"/>
-            <a:ext cx="9144000" cy="2387600"/>
+            <a:off x="685800" y="1122363"/>
+            <a:ext cx="7772400" cy="2387600"/>
           </a:xfrm>
         </p:spPr>
         <p:txBody>
@@ -170,18 +175,13 @@
               <a:rPr lang="en-US"/>
               <a:t>Click to edit Master title style</a:t>
             </a:r>
-          </a:p>
-        </p:txBody>
-      </p:sp>
-      <p:sp>
-        <p:nvSpPr>
-          <p:cNvPr id="3" name="Subtitle 2">
-            <a:extLst>
-              <a:ext uri="{FF2B5EF4-FFF2-40B4-BE49-F238E27FC236}">
-                <a16:creationId xmlns:a16="http://schemas.microsoft.com/office/drawing/2014/main" id="{C13C8275-C79C-4A3C-89C6-0126791060D7}"/>
-              </a:ext>
-            </a:extLst>
-          </p:cNvPr>
+            <a:endParaRPr lang="en-US" dirty="0"/>
+          </a:p>
+        </p:txBody>
+      </p:sp>
+      <p:sp>
+        <p:nvSpPr>
+          <p:cNvPr id="3" name="Subtitle 2"/>
           <p:cNvSpPr>
             <a:spLocks noGrp="1"/>
           </p:cNvSpPr>
@@ -191,8 +191,8 @@
         </p:nvSpPr>
         <p:spPr>
           <a:xfrm>
-            <a:off x="1524000" y="3602038"/>
-            <a:ext cx="9144000" cy="1655762"/>
+            <a:off x="1143000" y="3602038"/>
+            <a:ext cx="6858000" cy="1655762"/>
           </a:xfrm>
         </p:spPr>
         <p:txBody>
@@ -240,18 +240,13 @@
               <a:rPr lang="en-US"/>
               <a:t>Click to edit Master subtitle style</a:t>
             </a:r>
-          </a:p>
-        </p:txBody>
-      </p:sp>
-      <p:sp>
-        <p:nvSpPr>
-          <p:cNvPr id="4" name="Date Placeholder 3">
-            <a:extLst>
-              <a:ext uri="{FF2B5EF4-FFF2-40B4-BE49-F238E27FC236}">
-                <a16:creationId xmlns:a16="http://schemas.microsoft.com/office/drawing/2014/main" id="{7F7EB6AD-BBFB-4A06-8EB2-F58C71C5279C}"/>
-              </a:ext>
-            </a:extLst>
-          </p:cNvPr>
+            <a:endParaRPr lang="en-US" dirty="0"/>
+          </a:p>
+        </p:txBody>
+      </p:sp>
+      <p:sp>
+        <p:nvSpPr>
+          <p:cNvPr id="4" name="Date Placeholder 3"/>
           <p:cNvSpPr>
             <a:spLocks noGrp="1"/>
           </p:cNvSpPr>
@@ -266,7 +261,7 @@
           <a:p>
             <a:fld id="{D98ADB59-0FC3-4F23-98C1-896570F2CCB9}" type="datetimeFigureOut">
               <a:rPr lang="en-US" smtClean="0"/>
-              <a:t>5/1/20</a:t>
+              <a:t>5/3/20</a:t>
             </a:fld>
             <a:endParaRPr lang="en-US"/>
           </a:p>
@@ -274,13 +269,7 @@
       </p:sp>
       <p:sp>
         <p:nvSpPr>
-          <p:cNvPr id="5" name="Footer Placeholder 4">
-            <a:extLst>
-              <a:ext uri="{FF2B5EF4-FFF2-40B4-BE49-F238E27FC236}">
-                <a16:creationId xmlns:a16="http://schemas.microsoft.com/office/drawing/2014/main" id="{5A2B95DF-0421-43D1-82BD-267A5CD7E4CD}"/>
-              </a:ext>
-            </a:extLst>
-          </p:cNvPr>
+          <p:cNvPr id="5" name="Footer Placeholder 4"/>
           <p:cNvSpPr>
             <a:spLocks noGrp="1"/>
           </p:cNvSpPr>
@@ -299,13 +288,7 @@
       </p:sp>
       <p:sp>
         <p:nvSpPr>
-          <p:cNvPr id="6" name="Slide Number Placeholder 5">
-            <a:extLst>
-              <a:ext uri="{FF2B5EF4-FFF2-40B4-BE49-F238E27FC236}">
-                <a16:creationId xmlns:a16="http://schemas.microsoft.com/office/drawing/2014/main" id="{08ECD891-D013-4A58-9FBF-B39F2A47E023}"/>
-              </a:ext>
-            </a:extLst>
-          </p:cNvPr>
+          <p:cNvPr id="6" name="Slide Number Placeholder 5"/>
           <p:cNvSpPr>
             <a:spLocks noGrp="1"/>
           </p:cNvSpPr>
@@ -329,7 +312,7 @@
     </p:spTree>
     <p:extLst>
       <p:ext uri="{BB962C8B-B14F-4D97-AF65-F5344CB8AC3E}">
-        <p14:creationId xmlns:p14="http://schemas.microsoft.com/office/powerpoint/2010/main" val="649567722"/>
+        <p14:creationId xmlns:p14="http://schemas.microsoft.com/office/powerpoint/2010/main" val="1514227172"/>
       </p:ext>
     </p:extLst>
   </p:cSld>
@@ -358,13 +341,7 @@
       </p:grpSpPr>
       <p:sp>
         <p:nvSpPr>
-          <p:cNvPr id="2" name="Title 1">
-            <a:extLst>
-              <a:ext uri="{FF2B5EF4-FFF2-40B4-BE49-F238E27FC236}">
-                <a16:creationId xmlns:a16="http://schemas.microsoft.com/office/drawing/2014/main" id="{109C24B8-2E7F-4827-A94E-A857094CC47F}"/>
-              </a:ext>
-            </a:extLst>
-          </p:cNvPr>
+          <p:cNvPr id="2" name="Title 1"/>
           <p:cNvSpPr>
             <a:spLocks noGrp="1"/>
           </p:cNvSpPr>
@@ -381,18 +358,13 @@
               <a:rPr lang="en-US"/>
               <a:t>Click to edit Master title style</a:t>
             </a:r>
-          </a:p>
-        </p:txBody>
-      </p:sp>
-      <p:sp>
-        <p:nvSpPr>
-          <p:cNvPr id="3" name="Vertical Text Placeholder 2">
-            <a:extLst>
-              <a:ext uri="{FF2B5EF4-FFF2-40B4-BE49-F238E27FC236}">
-                <a16:creationId xmlns:a16="http://schemas.microsoft.com/office/drawing/2014/main" id="{EEB30604-6093-4236-A0A2-02BAE19FFD1F}"/>
-              </a:ext>
-            </a:extLst>
-          </p:cNvPr>
+            <a:endParaRPr lang="en-US" dirty="0"/>
+          </a:p>
+        </p:txBody>
+      </p:sp>
+      <p:sp>
+        <p:nvSpPr>
+          <p:cNvPr id="3" name="Vertical Text Placeholder 2"/>
           <p:cNvSpPr>
             <a:spLocks noGrp="1"/>
           </p:cNvSpPr>
@@ -438,18 +410,13 @@
               <a:rPr lang="en-US"/>
               <a:t>Fifth level</a:t>
             </a:r>
-          </a:p>
-        </p:txBody>
-      </p:sp>
-      <p:sp>
-        <p:nvSpPr>
-          <p:cNvPr id="4" name="Date Placeholder 3">
-            <a:extLst>
-              <a:ext uri="{FF2B5EF4-FFF2-40B4-BE49-F238E27FC236}">
-                <a16:creationId xmlns:a16="http://schemas.microsoft.com/office/drawing/2014/main" id="{55B4C416-6075-466B-B3C9-46B2C78DD098}"/>
-              </a:ext>
-            </a:extLst>
-          </p:cNvPr>
+            <a:endParaRPr lang="en-US" dirty="0"/>
+          </a:p>
+        </p:txBody>
+      </p:sp>
+      <p:sp>
+        <p:nvSpPr>
+          <p:cNvPr id="4" name="Date Placeholder 3"/>
           <p:cNvSpPr>
             <a:spLocks noGrp="1"/>
           </p:cNvSpPr>
@@ -464,7 +431,7 @@
           <a:p>
             <a:fld id="{D98ADB59-0FC3-4F23-98C1-896570F2CCB9}" type="datetimeFigureOut">
               <a:rPr lang="en-US" smtClean="0"/>
-              <a:t>5/1/20</a:t>
+              <a:t>5/3/20</a:t>
             </a:fld>
             <a:endParaRPr lang="en-US"/>
           </a:p>
@@ -472,13 +439,7 @@
       </p:sp>
       <p:sp>
         <p:nvSpPr>
-          <p:cNvPr id="5" name="Footer Placeholder 4">
-            <a:extLst>
-              <a:ext uri="{FF2B5EF4-FFF2-40B4-BE49-F238E27FC236}">
-                <a16:creationId xmlns:a16="http://schemas.microsoft.com/office/drawing/2014/main" id="{1E6D8C00-1401-4EB0-8FBC-E3872404B3D2}"/>
-              </a:ext>
-            </a:extLst>
-          </p:cNvPr>
+          <p:cNvPr id="5" name="Footer Placeholder 4"/>
           <p:cNvSpPr>
             <a:spLocks noGrp="1"/>
           </p:cNvSpPr>
@@ -497,13 +458,7 @@
       </p:sp>
       <p:sp>
         <p:nvSpPr>
-          <p:cNvPr id="6" name="Slide Number Placeholder 5">
-            <a:extLst>
-              <a:ext uri="{FF2B5EF4-FFF2-40B4-BE49-F238E27FC236}">
-                <a16:creationId xmlns:a16="http://schemas.microsoft.com/office/drawing/2014/main" id="{74DEEF60-7EDD-4ACC-AAC4-4E0C797C6264}"/>
-              </a:ext>
-            </a:extLst>
-          </p:cNvPr>
+          <p:cNvPr id="6" name="Slide Number Placeholder 5"/>
           <p:cNvSpPr>
             <a:spLocks noGrp="1"/>
           </p:cNvSpPr>
@@ -527,7 +482,7 @@
     </p:spTree>
     <p:extLst>
       <p:ext uri="{BB962C8B-B14F-4D97-AF65-F5344CB8AC3E}">
-        <p14:creationId xmlns:p14="http://schemas.microsoft.com/office/powerpoint/2010/main" val="1115493634"/>
+        <p14:creationId xmlns:p14="http://schemas.microsoft.com/office/powerpoint/2010/main" val="3530784615"/>
       </p:ext>
     </p:extLst>
   </p:cSld>
@@ -556,13 +511,7 @@
       </p:grpSpPr>
       <p:sp>
         <p:nvSpPr>
-          <p:cNvPr id="2" name="Vertical Title 1">
-            <a:extLst>
-              <a:ext uri="{FF2B5EF4-FFF2-40B4-BE49-F238E27FC236}">
-                <a16:creationId xmlns:a16="http://schemas.microsoft.com/office/drawing/2014/main" id="{27072FC9-D988-4E4F-88F5-F85893B3D28B}"/>
-              </a:ext>
-            </a:extLst>
-          </p:cNvPr>
+          <p:cNvPr id="2" name="Vertical Title 1"/>
           <p:cNvSpPr>
             <a:spLocks noGrp="1"/>
           </p:cNvSpPr>
@@ -572,8 +521,8 @@
         </p:nvSpPr>
         <p:spPr>
           <a:xfrm>
-            <a:off x="8724900" y="365125"/>
-            <a:ext cx="2628900" cy="5811838"/>
+            <a:off x="6543675" y="365125"/>
+            <a:ext cx="1971675" cy="5811838"/>
           </a:xfrm>
         </p:spPr>
         <p:txBody>
@@ -584,18 +533,13 @@
               <a:rPr lang="en-US"/>
               <a:t>Click to edit Master title style</a:t>
             </a:r>
-          </a:p>
-        </p:txBody>
-      </p:sp>
-      <p:sp>
-        <p:nvSpPr>
-          <p:cNvPr id="3" name="Vertical Text Placeholder 2">
-            <a:extLst>
-              <a:ext uri="{FF2B5EF4-FFF2-40B4-BE49-F238E27FC236}">
-                <a16:creationId xmlns:a16="http://schemas.microsoft.com/office/drawing/2014/main" id="{CDC2DD3C-43D9-4762-B82E-A63937B657BC}"/>
-              </a:ext>
-            </a:extLst>
-          </p:cNvPr>
+            <a:endParaRPr lang="en-US" dirty="0"/>
+          </a:p>
+        </p:txBody>
+      </p:sp>
+      <p:sp>
+        <p:nvSpPr>
+          <p:cNvPr id="3" name="Vertical Text Placeholder 2"/>
           <p:cNvSpPr>
             <a:spLocks noGrp="1"/>
           </p:cNvSpPr>
@@ -605,8 +549,8 @@
         </p:nvSpPr>
         <p:spPr>
           <a:xfrm>
-            <a:off x="838200" y="365125"/>
-            <a:ext cx="7734300" cy="5811838"/>
+            <a:off x="628650" y="365125"/>
+            <a:ext cx="5800725" cy="5811838"/>
           </a:xfrm>
         </p:spPr>
         <p:txBody>
@@ -646,18 +590,13 @@
               <a:rPr lang="en-US"/>
               <a:t>Fifth level</a:t>
             </a:r>
-          </a:p>
-        </p:txBody>
-      </p:sp>
-      <p:sp>
-        <p:nvSpPr>
-          <p:cNvPr id="4" name="Date Placeholder 3">
-            <a:extLst>
-              <a:ext uri="{FF2B5EF4-FFF2-40B4-BE49-F238E27FC236}">
-                <a16:creationId xmlns:a16="http://schemas.microsoft.com/office/drawing/2014/main" id="{E4DCE014-75BA-4938-A833-2B77FD1B8225}"/>
-              </a:ext>
-            </a:extLst>
-          </p:cNvPr>
+            <a:endParaRPr lang="en-US" dirty="0"/>
+          </a:p>
+        </p:txBody>
+      </p:sp>
+      <p:sp>
+        <p:nvSpPr>
+          <p:cNvPr id="4" name="Date Placeholder 3"/>
           <p:cNvSpPr>
             <a:spLocks noGrp="1"/>
           </p:cNvSpPr>
@@ -672,7 +611,7 @@
           <a:p>
             <a:fld id="{D98ADB59-0FC3-4F23-98C1-896570F2CCB9}" type="datetimeFigureOut">
               <a:rPr lang="en-US" smtClean="0"/>
-              <a:t>5/1/20</a:t>
+              <a:t>5/3/20</a:t>
             </a:fld>
             <a:endParaRPr lang="en-US"/>
           </a:p>
@@ -680,13 +619,7 @@
       </p:sp>
       <p:sp>
         <p:nvSpPr>
-          <p:cNvPr id="5" name="Footer Placeholder 4">
-            <a:extLst>
-              <a:ext uri="{FF2B5EF4-FFF2-40B4-BE49-F238E27FC236}">
-                <a16:creationId xmlns:a16="http://schemas.microsoft.com/office/drawing/2014/main" id="{346216F5-F805-4251-B9DB-21968403B0CA}"/>
-              </a:ext>
-            </a:extLst>
-          </p:cNvPr>
+          <p:cNvPr id="5" name="Footer Placeholder 4"/>
           <p:cNvSpPr>
             <a:spLocks noGrp="1"/>
           </p:cNvSpPr>
@@ -705,13 +638,7 @@
       </p:sp>
       <p:sp>
         <p:nvSpPr>
-          <p:cNvPr id="6" name="Slide Number Placeholder 5">
-            <a:extLst>
-              <a:ext uri="{FF2B5EF4-FFF2-40B4-BE49-F238E27FC236}">
-                <a16:creationId xmlns:a16="http://schemas.microsoft.com/office/drawing/2014/main" id="{4912F694-1734-4874-A12E-D15F1B63B6FF}"/>
-              </a:ext>
-            </a:extLst>
-          </p:cNvPr>
+          <p:cNvPr id="6" name="Slide Number Placeholder 5"/>
           <p:cNvSpPr>
             <a:spLocks noGrp="1"/>
           </p:cNvSpPr>
@@ -735,7 +662,7 @@
     </p:spTree>
     <p:extLst>
       <p:ext uri="{BB962C8B-B14F-4D97-AF65-F5344CB8AC3E}">
-        <p14:creationId xmlns:p14="http://schemas.microsoft.com/office/powerpoint/2010/main" val="1861698729"/>
+        <p14:creationId xmlns:p14="http://schemas.microsoft.com/office/powerpoint/2010/main" val="1275039057"/>
       </p:ext>
     </p:extLst>
   </p:cSld>
@@ -764,13 +691,7 @@
       </p:grpSpPr>
       <p:sp>
         <p:nvSpPr>
-          <p:cNvPr id="2" name="Title 1">
-            <a:extLst>
-              <a:ext uri="{FF2B5EF4-FFF2-40B4-BE49-F238E27FC236}">
-                <a16:creationId xmlns:a16="http://schemas.microsoft.com/office/drawing/2014/main" id="{78F269E1-9FF6-4A48-BF08-52363EB50046}"/>
-              </a:ext>
-            </a:extLst>
-          </p:cNvPr>
+          <p:cNvPr id="2" name="Title 1"/>
           <p:cNvSpPr>
             <a:spLocks noGrp="1"/>
           </p:cNvSpPr>
@@ -787,18 +708,13 @@
               <a:rPr lang="en-US"/>
               <a:t>Click to edit Master title style</a:t>
             </a:r>
-          </a:p>
-        </p:txBody>
-      </p:sp>
-      <p:sp>
-        <p:nvSpPr>
-          <p:cNvPr id="3" name="Content Placeholder 2">
-            <a:extLst>
-              <a:ext uri="{FF2B5EF4-FFF2-40B4-BE49-F238E27FC236}">
-                <a16:creationId xmlns:a16="http://schemas.microsoft.com/office/drawing/2014/main" id="{603BFA85-9363-43DC-878B-D03A03C1B6AE}"/>
-              </a:ext>
-            </a:extLst>
-          </p:cNvPr>
+            <a:endParaRPr lang="en-US" dirty="0"/>
+          </a:p>
+        </p:txBody>
+      </p:sp>
+      <p:sp>
+        <p:nvSpPr>
+          <p:cNvPr id="3" name="Content Placeholder 2"/>
           <p:cNvSpPr>
             <a:spLocks noGrp="1"/>
           </p:cNvSpPr>
@@ -844,18 +760,13 @@
               <a:rPr lang="en-US"/>
               <a:t>Fifth level</a:t>
             </a:r>
-          </a:p>
-        </p:txBody>
-      </p:sp>
-      <p:sp>
-        <p:nvSpPr>
-          <p:cNvPr id="4" name="Date Placeholder 3">
-            <a:extLst>
-              <a:ext uri="{FF2B5EF4-FFF2-40B4-BE49-F238E27FC236}">
-                <a16:creationId xmlns:a16="http://schemas.microsoft.com/office/drawing/2014/main" id="{ED2C937A-3A36-4FCC-8315-F8C8E45DD28D}"/>
-              </a:ext>
-            </a:extLst>
-          </p:cNvPr>
+            <a:endParaRPr lang="en-US" dirty="0"/>
+          </a:p>
+        </p:txBody>
+      </p:sp>
+      <p:sp>
+        <p:nvSpPr>
+          <p:cNvPr id="4" name="Date Placeholder 3"/>
           <p:cNvSpPr>
             <a:spLocks noGrp="1"/>
           </p:cNvSpPr>
@@ -870,7 +781,7 @@
           <a:p>
             <a:fld id="{D98ADB59-0FC3-4F23-98C1-896570F2CCB9}" type="datetimeFigureOut">
               <a:rPr lang="en-US" smtClean="0"/>
-              <a:t>5/1/20</a:t>
+              <a:t>5/3/20</a:t>
             </a:fld>
             <a:endParaRPr lang="en-US"/>
           </a:p>
@@ -878,13 +789,7 @@
       </p:sp>
       <p:sp>
         <p:nvSpPr>
-          <p:cNvPr id="5" name="Footer Placeholder 4">
-            <a:extLst>
-              <a:ext uri="{FF2B5EF4-FFF2-40B4-BE49-F238E27FC236}">
-                <a16:creationId xmlns:a16="http://schemas.microsoft.com/office/drawing/2014/main" id="{BB5F3EDD-EF42-4D67-9360-B8DAD3AAE190}"/>
-              </a:ext>
-            </a:extLst>
-          </p:cNvPr>
+          <p:cNvPr id="5" name="Footer Placeholder 4"/>
           <p:cNvSpPr>
             <a:spLocks noGrp="1"/>
           </p:cNvSpPr>
@@ -903,13 +808,7 @@
       </p:sp>
       <p:sp>
         <p:nvSpPr>
-          <p:cNvPr id="6" name="Slide Number Placeholder 5">
-            <a:extLst>
-              <a:ext uri="{FF2B5EF4-FFF2-40B4-BE49-F238E27FC236}">
-                <a16:creationId xmlns:a16="http://schemas.microsoft.com/office/drawing/2014/main" id="{9A7C0BA9-E461-4698-AC02-8963E3ACECC2}"/>
-              </a:ext>
-            </a:extLst>
-          </p:cNvPr>
+          <p:cNvPr id="6" name="Slide Number Placeholder 5"/>
           <p:cNvSpPr>
             <a:spLocks noGrp="1"/>
           </p:cNvSpPr>
@@ -933,7 +832,7 @@
     </p:spTree>
     <p:extLst>
       <p:ext uri="{BB962C8B-B14F-4D97-AF65-F5344CB8AC3E}">
-        <p14:creationId xmlns:p14="http://schemas.microsoft.com/office/powerpoint/2010/main" val="777408734"/>
+        <p14:creationId xmlns:p14="http://schemas.microsoft.com/office/powerpoint/2010/main" val="831407994"/>
       </p:ext>
     </p:extLst>
   </p:cSld>
@@ -962,13 +861,7 @@
       </p:grpSpPr>
       <p:sp>
         <p:nvSpPr>
-          <p:cNvPr id="2" name="Title 1">
-            <a:extLst>
-              <a:ext uri="{FF2B5EF4-FFF2-40B4-BE49-F238E27FC236}">
-                <a16:creationId xmlns:a16="http://schemas.microsoft.com/office/drawing/2014/main" id="{7B95D023-B3F1-400B-9959-7A04E2AF5AC5}"/>
-              </a:ext>
-            </a:extLst>
-          </p:cNvPr>
+          <p:cNvPr id="2" name="Title 1"/>
           <p:cNvSpPr>
             <a:spLocks noGrp="1"/>
           </p:cNvSpPr>
@@ -978,8 +871,8 @@
         </p:nvSpPr>
         <p:spPr>
           <a:xfrm>
-            <a:off x="831850" y="1709738"/>
-            <a:ext cx="10515600" cy="2852737"/>
+            <a:off x="623888" y="1709739"/>
+            <a:ext cx="7886700" cy="2852737"/>
           </a:xfrm>
         </p:spPr>
         <p:txBody>
@@ -994,18 +887,13 @@
               <a:rPr lang="en-US"/>
               <a:t>Click to edit Master title style</a:t>
             </a:r>
-          </a:p>
-        </p:txBody>
-      </p:sp>
-      <p:sp>
-        <p:nvSpPr>
-          <p:cNvPr id="3" name="Text Placeholder 2">
-            <a:extLst>
-              <a:ext uri="{FF2B5EF4-FFF2-40B4-BE49-F238E27FC236}">
-                <a16:creationId xmlns:a16="http://schemas.microsoft.com/office/drawing/2014/main" id="{8F14BAB1-1A7B-4A05-ABB4-C60F11431BDA}"/>
-              </a:ext>
-            </a:extLst>
-          </p:cNvPr>
+            <a:endParaRPr lang="en-US" dirty="0"/>
+          </a:p>
+        </p:txBody>
+      </p:sp>
+      <p:sp>
+        <p:nvSpPr>
+          <p:cNvPr id="3" name="Text Placeholder 2"/>
           <p:cNvSpPr>
             <a:spLocks noGrp="1"/>
           </p:cNvSpPr>
@@ -1015,8 +903,8 @@
         </p:nvSpPr>
         <p:spPr>
           <a:xfrm>
-            <a:off x="831850" y="4589463"/>
-            <a:ext cx="10515600" cy="1500187"/>
+            <a:off x="623888" y="4589464"/>
+            <a:ext cx="7886700" cy="1500187"/>
           </a:xfrm>
         </p:spPr>
         <p:txBody>
@@ -1026,9 +914,7 @@
               <a:buNone/>
               <a:defRPr sz="2400">
                 <a:solidFill>
-                  <a:schemeClr val="tx1">
-                    <a:tint val="75000"/>
-                  </a:schemeClr>
+                  <a:schemeClr val="tx1"/>
                 </a:solidFill>
               </a:defRPr>
             </a:lvl1pPr>
@@ -1124,13 +1010,7 @@
       </p:sp>
       <p:sp>
         <p:nvSpPr>
-          <p:cNvPr id="4" name="Date Placeholder 3">
-            <a:extLst>
-              <a:ext uri="{FF2B5EF4-FFF2-40B4-BE49-F238E27FC236}">
-                <a16:creationId xmlns:a16="http://schemas.microsoft.com/office/drawing/2014/main" id="{261136A1-3CDC-4E9D-A03E-62A22EED58F5}"/>
-              </a:ext>
-            </a:extLst>
-          </p:cNvPr>
+          <p:cNvPr id="4" name="Date Placeholder 3"/>
           <p:cNvSpPr>
             <a:spLocks noGrp="1"/>
           </p:cNvSpPr>
@@ -1145,7 +1025,7 @@
           <a:p>
             <a:fld id="{D98ADB59-0FC3-4F23-98C1-896570F2CCB9}" type="datetimeFigureOut">
               <a:rPr lang="en-US" smtClean="0"/>
-              <a:t>5/1/20</a:t>
+              <a:t>5/3/20</a:t>
             </a:fld>
             <a:endParaRPr lang="en-US"/>
           </a:p>
@@ -1153,13 +1033,7 @@
       </p:sp>
       <p:sp>
         <p:nvSpPr>
-          <p:cNvPr id="5" name="Footer Placeholder 4">
-            <a:extLst>
-              <a:ext uri="{FF2B5EF4-FFF2-40B4-BE49-F238E27FC236}">
-                <a16:creationId xmlns:a16="http://schemas.microsoft.com/office/drawing/2014/main" id="{80400F81-8F8C-458B-8249-3A962B97053F}"/>
-              </a:ext>
-            </a:extLst>
-          </p:cNvPr>
+          <p:cNvPr id="5" name="Footer Placeholder 4"/>
           <p:cNvSpPr>
             <a:spLocks noGrp="1"/>
           </p:cNvSpPr>
@@ -1178,13 +1052,7 @@
       </p:sp>
       <p:sp>
         <p:nvSpPr>
-          <p:cNvPr id="6" name="Slide Number Placeholder 5">
-            <a:extLst>
-              <a:ext uri="{FF2B5EF4-FFF2-40B4-BE49-F238E27FC236}">
-                <a16:creationId xmlns:a16="http://schemas.microsoft.com/office/drawing/2014/main" id="{50215DE9-104D-4017-AE8E-5B7D9F1D9DFC}"/>
-              </a:ext>
-            </a:extLst>
-          </p:cNvPr>
+          <p:cNvPr id="6" name="Slide Number Placeholder 5"/>
           <p:cNvSpPr>
             <a:spLocks noGrp="1"/>
           </p:cNvSpPr>
@@ -1208,7 +1076,7 @@
     </p:spTree>
     <p:extLst>
       <p:ext uri="{BB962C8B-B14F-4D97-AF65-F5344CB8AC3E}">
-        <p14:creationId xmlns:p14="http://schemas.microsoft.com/office/powerpoint/2010/main" val="95497814"/>
+        <p14:creationId xmlns:p14="http://schemas.microsoft.com/office/powerpoint/2010/main" val="2138005151"/>
       </p:ext>
     </p:extLst>
   </p:cSld>
@@ -1237,13 +1105,7 @@
       </p:grpSpPr>
       <p:sp>
         <p:nvSpPr>
-          <p:cNvPr id="2" name="Title 1">
-            <a:extLst>
-              <a:ext uri="{FF2B5EF4-FFF2-40B4-BE49-F238E27FC236}">
-                <a16:creationId xmlns:a16="http://schemas.microsoft.com/office/drawing/2014/main" id="{9A9EA250-4B30-415D-B495-A58444838389}"/>
-              </a:ext>
-            </a:extLst>
-          </p:cNvPr>
+          <p:cNvPr id="2" name="Title 1"/>
           <p:cNvSpPr>
             <a:spLocks noGrp="1"/>
           </p:cNvSpPr>
@@ -1260,18 +1122,13 @@
               <a:rPr lang="en-US"/>
               <a:t>Click to edit Master title style</a:t>
             </a:r>
-          </a:p>
-        </p:txBody>
-      </p:sp>
-      <p:sp>
-        <p:nvSpPr>
-          <p:cNvPr id="3" name="Content Placeholder 2">
-            <a:extLst>
-              <a:ext uri="{FF2B5EF4-FFF2-40B4-BE49-F238E27FC236}">
-                <a16:creationId xmlns:a16="http://schemas.microsoft.com/office/drawing/2014/main" id="{A6048530-905D-4740-85C1-23C17CFA1DA0}"/>
-              </a:ext>
-            </a:extLst>
-          </p:cNvPr>
+            <a:endParaRPr lang="en-US" dirty="0"/>
+          </a:p>
+        </p:txBody>
+      </p:sp>
+      <p:sp>
+        <p:nvSpPr>
+          <p:cNvPr id="3" name="Content Placeholder 2"/>
           <p:cNvSpPr>
             <a:spLocks noGrp="1"/>
           </p:cNvSpPr>
@@ -1281,8 +1138,8 @@
         </p:nvSpPr>
         <p:spPr>
           <a:xfrm>
-            <a:off x="838200" y="1825625"/>
-            <a:ext cx="5181600" cy="4351338"/>
+            <a:off x="628650" y="1825625"/>
+            <a:ext cx="3886200" cy="4351338"/>
           </a:xfrm>
         </p:spPr>
         <p:txBody>
@@ -1322,18 +1179,13 @@
               <a:rPr lang="en-US"/>
               <a:t>Fifth level</a:t>
             </a:r>
-          </a:p>
-        </p:txBody>
-      </p:sp>
-      <p:sp>
-        <p:nvSpPr>
-          <p:cNvPr id="4" name="Content Placeholder 3">
-            <a:extLst>
-              <a:ext uri="{FF2B5EF4-FFF2-40B4-BE49-F238E27FC236}">
-                <a16:creationId xmlns:a16="http://schemas.microsoft.com/office/drawing/2014/main" id="{27230534-6AB7-4500-AB70-DBF3FD141111}"/>
-              </a:ext>
-            </a:extLst>
-          </p:cNvPr>
+            <a:endParaRPr lang="en-US" dirty="0"/>
+          </a:p>
+        </p:txBody>
+      </p:sp>
+      <p:sp>
+        <p:nvSpPr>
+          <p:cNvPr id="4" name="Content Placeholder 3"/>
           <p:cNvSpPr>
             <a:spLocks noGrp="1"/>
           </p:cNvSpPr>
@@ -1343,8 +1195,8 @@
         </p:nvSpPr>
         <p:spPr>
           <a:xfrm>
-            <a:off x="6172200" y="1825625"/>
-            <a:ext cx="5181600" cy="4351338"/>
+            <a:off x="4629150" y="1825625"/>
+            <a:ext cx="3886200" cy="4351338"/>
           </a:xfrm>
         </p:spPr>
         <p:txBody>
@@ -1384,18 +1236,13 @@
               <a:rPr lang="en-US"/>
               <a:t>Fifth level</a:t>
             </a:r>
-          </a:p>
-        </p:txBody>
-      </p:sp>
-      <p:sp>
-        <p:nvSpPr>
-          <p:cNvPr id="5" name="Date Placeholder 4">
-            <a:extLst>
-              <a:ext uri="{FF2B5EF4-FFF2-40B4-BE49-F238E27FC236}">
-                <a16:creationId xmlns:a16="http://schemas.microsoft.com/office/drawing/2014/main" id="{B834FF8B-83DC-4372-A7BD-A77D20C245F6}"/>
-              </a:ext>
-            </a:extLst>
-          </p:cNvPr>
+            <a:endParaRPr lang="en-US" dirty="0"/>
+          </a:p>
+        </p:txBody>
+      </p:sp>
+      <p:sp>
+        <p:nvSpPr>
+          <p:cNvPr id="5" name="Date Placeholder 4"/>
           <p:cNvSpPr>
             <a:spLocks noGrp="1"/>
           </p:cNvSpPr>
@@ -1410,7 +1257,7 @@
           <a:p>
             <a:fld id="{D98ADB59-0FC3-4F23-98C1-896570F2CCB9}" type="datetimeFigureOut">
               <a:rPr lang="en-US" smtClean="0"/>
-              <a:t>5/1/20</a:t>
+              <a:t>5/3/20</a:t>
             </a:fld>
             <a:endParaRPr lang="en-US"/>
           </a:p>
@@ -1418,13 +1265,7 @@
       </p:sp>
       <p:sp>
         <p:nvSpPr>
-          <p:cNvPr id="6" name="Footer Placeholder 5">
-            <a:extLst>
-              <a:ext uri="{FF2B5EF4-FFF2-40B4-BE49-F238E27FC236}">
-                <a16:creationId xmlns:a16="http://schemas.microsoft.com/office/drawing/2014/main" id="{BA47386A-4261-46AB-9E69-C5E2F9C4DD52}"/>
-              </a:ext>
-            </a:extLst>
-          </p:cNvPr>
+          <p:cNvPr id="6" name="Footer Placeholder 5"/>
           <p:cNvSpPr>
             <a:spLocks noGrp="1"/>
           </p:cNvSpPr>
@@ -1443,13 +1284,7 @@
       </p:sp>
       <p:sp>
         <p:nvSpPr>
-          <p:cNvPr id="7" name="Slide Number Placeholder 6">
-            <a:extLst>
-              <a:ext uri="{FF2B5EF4-FFF2-40B4-BE49-F238E27FC236}">
-                <a16:creationId xmlns:a16="http://schemas.microsoft.com/office/drawing/2014/main" id="{92E8E7AA-A67D-4014-B770-8501CCA48CF3}"/>
-              </a:ext>
-            </a:extLst>
-          </p:cNvPr>
+          <p:cNvPr id="7" name="Slide Number Placeholder 6"/>
           <p:cNvSpPr>
             <a:spLocks noGrp="1"/>
           </p:cNvSpPr>
@@ -1473,7 +1308,7 @@
     </p:spTree>
     <p:extLst>
       <p:ext uri="{BB962C8B-B14F-4D97-AF65-F5344CB8AC3E}">
-        <p14:creationId xmlns:p14="http://schemas.microsoft.com/office/powerpoint/2010/main" val="3517512363"/>
+        <p14:creationId xmlns:p14="http://schemas.microsoft.com/office/powerpoint/2010/main" val="2404383311"/>
       </p:ext>
     </p:extLst>
   </p:cSld>
@@ -1502,13 +1337,7 @@
       </p:grpSpPr>
       <p:sp>
         <p:nvSpPr>
-          <p:cNvPr id="2" name="Title 1">
-            <a:extLst>
-              <a:ext uri="{FF2B5EF4-FFF2-40B4-BE49-F238E27FC236}">
-                <a16:creationId xmlns:a16="http://schemas.microsoft.com/office/drawing/2014/main" id="{B0C172D4-867B-402D-B0F9-7322ADEC85E3}"/>
-              </a:ext>
-            </a:extLst>
-          </p:cNvPr>
+          <p:cNvPr id="2" name="Title 1"/>
           <p:cNvSpPr>
             <a:spLocks noGrp="1"/>
           </p:cNvSpPr>
@@ -1518,8 +1347,8 @@
         </p:nvSpPr>
         <p:spPr>
           <a:xfrm>
-            <a:off x="839788" y="365125"/>
-            <a:ext cx="10515600" cy="1325563"/>
+            <a:off x="629841" y="365126"/>
+            <a:ext cx="7886700" cy="1325563"/>
           </a:xfrm>
         </p:spPr>
         <p:txBody>
@@ -1530,18 +1359,13 @@
               <a:rPr lang="en-US"/>
               <a:t>Click to edit Master title style</a:t>
             </a:r>
-          </a:p>
-        </p:txBody>
-      </p:sp>
-      <p:sp>
-        <p:nvSpPr>
-          <p:cNvPr id="3" name="Text Placeholder 2">
-            <a:extLst>
-              <a:ext uri="{FF2B5EF4-FFF2-40B4-BE49-F238E27FC236}">
-                <a16:creationId xmlns:a16="http://schemas.microsoft.com/office/drawing/2014/main" id="{D7694752-75C9-4511-B358-7BB3290BBCE7}"/>
-              </a:ext>
-            </a:extLst>
-          </p:cNvPr>
+            <a:endParaRPr lang="en-US" dirty="0"/>
+          </a:p>
+        </p:txBody>
+      </p:sp>
+      <p:sp>
+        <p:nvSpPr>
+          <p:cNvPr id="3" name="Text Placeholder 2"/>
           <p:cNvSpPr>
             <a:spLocks noGrp="1"/>
           </p:cNvSpPr>
@@ -1551,8 +1375,8 @@
         </p:nvSpPr>
         <p:spPr>
           <a:xfrm>
-            <a:off x="839788" y="1681163"/>
-            <a:ext cx="5157787" cy="823912"/>
+            <a:off x="629842" y="1681163"/>
+            <a:ext cx="3868340" cy="823912"/>
           </a:xfrm>
         </p:spPr>
         <p:txBody>
@@ -1606,13 +1430,7 @@
       </p:sp>
       <p:sp>
         <p:nvSpPr>
-          <p:cNvPr id="4" name="Content Placeholder 3">
-            <a:extLst>
-              <a:ext uri="{FF2B5EF4-FFF2-40B4-BE49-F238E27FC236}">
-                <a16:creationId xmlns:a16="http://schemas.microsoft.com/office/drawing/2014/main" id="{6807A33B-9B7A-4027-B2C3-9914783763DB}"/>
-              </a:ext>
-            </a:extLst>
-          </p:cNvPr>
+          <p:cNvPr id="4" name="Content Placeholder 3"/>
           <p:cNvSpPr>
             <a:spLocks noGrp="1"/>
           </p:cNvSpPr>
@@ -1622,8 +1440,8 @@
         </p:nvSpPr>
         <p:spPr>
           <a:xfrm>
-            <a:off x="839788" y="2505075"/>
-            <a:ext cx="5157787" cy="3684588"/>
+            <a:off x="629842" y="2505075"/>
+            <a:ext cx="3868340" cy="3684588"/>
           </a:xfrm>
         </p:spPr>
         <p:txBody>
@@ -1663,18 +1481,13 @@
               <a:rPr lang="en-US"/>
               <a:t>Fifth level</a:t>
             </a:r>
-          </a:p>
-        </p:txBody>
-      </p:sp>
-      <p:sp>
-        <p:nvSpPr>
-          <p:cNvPr id="5" name="Text Placeholder 4">
-            <a:extLst>
-              <a:ext uri="{FF2B5EF4-FFF2-40B4-BE49-F238E27FC236}">
-                <a16:creationId xmlns:a16="http://schemas.microsoft.com/office/drawing/2014/main" id="{80EBD8B8-07B1-4416-88AE-A22D7EB69361}"/>
-              </a:ext>
-            </a:extLst>
-          </p:cNvPr>
+            <a:endParaRPr lang="en-US" dirty="0"/>
+          </a:p>
+        </p:txBody>
+      </p:sp>
+      <p:sp>
+        <p:nvSpPr>
+          <p:cNvPr id="5" name="Text Placeholder 4"/>
           <p:cNvSpPr>
             <a:spLocks noGrp="1"/>
           </p:cNvSpPr>
@@ -1684,8 +1497,8 @@
         </p:nvSpPr>
         <p:spPr>
           <a:xfrm>
-            <a:off x="6172200" y="1681163"/>
-            <a:ext cx="5183188" cy="823912"/>
+            <a:off x="4629150" y="1681163"/>
+            <a:ext cx="3887391" cy="823912"/>
           </a:xfrm>
         </p:spPr>
         <p:txBody>
@@ -1739,13 +1552,7 @@
       </p:sp>
       <p:sp>
         <p:nvSpPr>
-          <p:cNvPr id="6" name="Content Placeholder 5">
-            <a:extLst>
-              <a:ext uri="{FF2B5EF4-FFF2-40B4-BE49-F238E27FC236}">
-                <a16:creationId xmlns:a16="http://schemas.microsoft.com/office/drawing/2014/main" id="{F4932482-510D-441D-A93D-FFE11C7418E4}"/>
-              </a:ext>
-            </a:extLst>
-          </p:cNvPr>
+          <p:cNvPr id="6" name="Content Placeholder 5"/>
           <p:cNvSpPr>
             <a:spLocks noGrp="1"/>
           </p:cNvSpPr>
@@ -1755,8 +1562,8 @@
         </p:nvSpPr>
         <p:spPr>
           <a:xfrm>
-            <a:off x="6172200" y="2505075"/>
-            <a:ext cx="5183188" cy="3684588"/>
+            <a:off x="4629150" y="2505075"/>
+            <a:ext cx="3887391" cy="3684588"/>
           </a:xfrm>
         </p:spPr>
         <p:txBody>
@@ -1796,18 +1603,13 @@
               <a:rPr lang="en-US"/>
               <a:t>Fifth level</a:t>
             </a:r>
-          </a:p>
-        </p:txBody>
-      </p:sp>
-      <p:sp>
-        <p:nvSpPr>
-          <p:cNvPr id="7" name="Date Placeholder 6">
-            <a:extLst>
-              <a:ext uri="{FF2B5EF4-FFF2-40B4-BE49-F238E27FC236}">
-                <a16:creationId xmlns:a16="http://schemas.microsoft.com/office/drawing/2014/main" id="{333D2756-37EB-427F-88B0-39F2A88DFF9F}"/>
-              </a:ext>
-            </a:extLst>
-          </p:cNvPr>
+            <a:endParaRPr lang="en-US" dirty="0"/>
+          </a:p>
+        </p:txBody>
+      </p:sp>
+      <p:sp>
+        <p:nvSpPr>
+          <p:cNvPr id="7" name="Date Placeholder 6"/>
           <p:cNvSpPr>
             <a:spLocks noGrp="1"/>
           </p:cNvSpPr>
@@ -1822,7 +1624,7 @@
           <a:p>
             <a:fld id="{D98ADB59-0FC3-4F23-98C1-896570F2CCB9}" type="datetimeFigureOut">
               <a:rPr lang="en-US" smtClean="0"/>
-              <a:t>5/1/20</a:t>
+              <a:t>5/3/20</a:t>
             </a:fld>
             <a:endParaRPr lang="en-US"/>
           </a:p>
@@ -1830,13 +1632,7 @@
       </p:sp>
       <p:sp>
         <p:nvSpPr>
-          <p:cNvPr id="8" name="Footer Placeholder 7">
-            <a:extLst>
-              <a:ext uri="{FF2B5EF4-FFF2-40B4-BE49-F238E27FC236}">
-                <a16:creationId xmlns:a16="http://schemas.microsoft.com/office/drawing/2014/main" id="{257E893F-F564-4D6C-A9C2-21586ED4A773}"/>
-              </a:ext>
-            </a:extLst>
-          </p:cNvPr>
+          <p:cNvPr id="8" name="Footer Placeholder 7"/>
           <p:cNvSpPr>
             <a:spLocks noGrp="1"/>
           </p:cNvSpPr>
@@ -1855,13 +1651,7 @@
       </p:sp>
       <p:sp>
         <p:nvSpPr>
-          <p:cNvPr id="9" name="Slide Number Placeholder 8">
-            <a:extLst>
-              <a:ext uri="{FF2B5EF4-FFF2-40B4-BE49-F238E27FC236}">
-                <a16:creationId xmlns:a16="http://schemas.microsoft.com/office/drawing/2014/main" id="{CB3AF130-27AB-4B4F-A9CA-087FFACC44C3}"/>
-              </a:ext>
-            </a:extLst>
-          </p:cNvPr>
+          <p:cNvPr id="9" name="Slide Number Placeholder 8"/>
           <p:cNvSpPr>
             <a:spLocks noGrp="1"/>
           </p:cNvSpPr>
@@ -1885,7 +1675,7 @@
     </p:spTree>
     <p:extLst>
       <p:ext uri="{BB962C8B-B14F-4D97-AF65-F5344CB8AC3E}">
-        <p14:creationId xmlns:p14="http://schemas.microsoft.com/office/powerpoint/2010/main" val="1677646910"/>
+        <p14:creationId xmlns:p14="http://schemas.microsoft.com/office/powerpoint/2010/main" val="91706497"/>
       </p:ext>
     </p:extLst>
   </p:cSld>
@@ -1914,13 +1704,7 @@
       </p:grpSpPr>
       <p:sp>
         <p:nvSpPr>
-          <p:cNvPr id="2" name="Title 1">
-            <a:extLst>
-              <a:ext uri="{FF2B5EF4-FFF2-40B4-BE49-F238E27FC236}">
-                <a16:creationId xmlns:a16="http://schemas.microsoft.com/office/drawing/2014/main" id="{F83C8DFD-5CBC-492A-98C2-071A45F3A38C}"/>
-              </a:ext>
-            </a:extLst>
-          </p:cNvPr>
+          <p:cNvPr id="2" name="Title 1"/>
           <p:cNvSpPr>
             <a:spLocks noGrp="1"/>
           </p:cNvSpPr>
@@ -1937,18 +1721,13 @@
               <a:rPr lang="en-US"/>
               <a:t>Click to edit Master title style</a:t>
             </a:r>
-          </a:p>
-        </p:txBody>
-      </p:sp>
-      <p:sp>
-        <p:nvSpPr>
-          <p:cNvPr id="3" name="Date Placeholder 2">
-            <a:extLst>
-              <a:ext uri="{FF2B5EF4-FFF2-40B4-BE49-F238E27FC236}">
-                <a16:creationId xmlns:a16="http://schemas.microsoft.com/office/drawing/2014/main" id="{648A3A99-7AC3-46A5-8904-823911277135}"/>
-              </a:ext>
-            </a:extLst>
-          </p:cNvPr>
+            <a:endParaRPr lang="en-US" dirty="0"/>
+          </a:p>
+        </p:txBody>
+      </p:sp>
+      <p:sp>
+        <p:nvSpPr>
+          <p:cNvPr id="3" name="Date Placeholder 2"/>
           <p:cNvSpPr>
             <a:spLocks noGrp="1"/>
           </p:cNvSpPr>
@@ -1963,7 +1742,7 @@
           <a:p>
             <a:fld id="{D98ADB59-0FC3-4F23-98C1-896570F2CCB9}" type="datetimeFigureOut">
               <a:rPr lang="en-US" smtClean="0"/>
-              <a:t>5/1/20</a:t>
+              <a:t>5/3/20</a:t>
             </a:fld>
             <a:endParaRPr lang="en-US"/>
           </a:p>
@@ -1971,13 +1750,7 @@
       </p:sp>
       <p:sp>
         <p:nvSpPr>
-          <p:cNvPr id="4" name="Footer Placeholder 3">
-            <a:extLst>
-              <a:ext uri="{FF2B5EF4-FFF2-40B4-BE49-F238E27FC236}">
-                <a16:creationId xmlns:a16="http://schemas.microsoft.com/office/drawing/2014/main" id="{6C51FBA3-0277-4333-9252-6BC1CF5BD665}"/>
-              </a:ext>
-            </a:extLst>
-          </p:cNvPr>
+          <p:cNvPr id="4" name="Footer Placeholder 3"/>
           <p:cNvSpPr>
             <a:spLocks noGrp="1"/>
           </p:cNvSpPr>
@@ -1996,13 +1769,7 @@
       </p:sp>
       <p:sp>
         <p:nvSpPr>
-          <p:cNvPr id="5" name="Slide Number Placeholder 4">
-            <a:extLst>
-              <a:ext uri="{FF2B5EF4-FFF2-40B4-BE49-F238E27FC236}">
-                <a16:creationId xmlns:a16="http://schemas.microsoft.com/office/drawing/2014/main" id="{E7E09C44-4247-4A90-9975-E64FE95EB834}"/>
-              </a:ext>
-            </a:extLst>
-          </p:cNvPr>
+          <p:cNvPr id="5" name="Slide Number Placeholder 4"/>
           <p:cNvSpPr>
             <a:spLocks noGrp="1"/>
           </p:cNvSpPr>
@@ -2026,7 +1793,7 @@
     </p:spTree>
     <p:extLst>
       <p:ext uri="{BB962C8B-B14F-4D97-AF65-F5344CB8AC3E}">
-        <p14:creationId xmlns:p14="http://schemas.microsoft.com/office/powerpoint/2010/main" val="244050939"/>
+        <p14:creationId xmlns:p14="http://schemas.microsoft.com/office/powerpoint/2010/main" val="1538376957"/>
       </p:ext>
     </p:extLst>
   </p:cSld>
@@ -2055,13 +1822,7 @@
       </p:grpSpPr>
       <p:sp>
         <p:nvSpPr>
-          <p:cNvPr id="2" name="Date Placeholder 1">
-            <a:extLst>
-              <a:ext uri="{FF2B5EF4-FFF2-40B4-BE49-F238E27FC236}">
-                <a16:creationId xmlns:a16="http://schemas.microsoft.com/office/drawing/2014/main" id="{D91A7D1E-1FDC-4171-B7C7-DBA54BCFA3B9}"/>
-              </a:ext>
-            </a:extLst>
-          </p:cNvPr>
+          <p:cNvPr id="2" name="Date Placeholder 1"/>
           <p:cNvSpPr>
             <a:spLocks noGrp="1"/>
           </p:cNvSpPr>
@@ -2076,7 +1837,7 @@
           <a:p>
             <a:fld id="{D98ADB59-0FC3-4F23-98C1-896570F2CCB9}" type="datetimeFigureOut">
               <a:rPr lang="en-US" smtClean="0"/>
-              <a:t>5/1/20</a:t>
+              <a:t>5/3/20</a:t>
             </a:fld>
             <a:endParaRPr lang="en-US"/>
           </a:p>
@@ -2084,13 +1845,7 @@
       </p:sp>
       <p:sp>
         <p:nvSpPr>
-          <p:cNvPr id="3" name="Footer Placeholder 2">
-            <a:extLst>
-              <a:ext uri="{FF2B5EF4-FFF2-40B4-BE49-F238E27FC236}">
-                <a16:creationId xmlns:a16="http://schemas.microsoft.com/office/drawing/2014/main" id="{BCA67442-8F76-4905-8019-9FAE4C2CF5B6}"/>
-              </a:ext>
-            </a:extLst>
-          </p:cNvPr>
+          <p:cNvPr id="3" name="Footer Placeholder 2"/>
           <p:cNvSpPr>
             <a:spLocks noGrp="1"/>
           </p:cNvSpPr>
@@ -2109,13 +1864,7 @@
       </p:sp>
       <p:sp>
         <p:nvSpPr>
-          <p:cNvPr id="4" name="Slide Number Placeholder 3">
-            <a:extLst>
-              <a:ext uri="{FF2B5EF4-FFF2-40B4-BE49-F238E27FC236}">
-                <a16:creationId xmlns:a16="http://schemas.microsoft.com/office/drawing/2014/main" id="{E07DC2EF-9E52-4681-9DD4-CC6FD441F524}"/>
-              </a:ext>
-            </a:extLst>
-          </p:cNvPr>
+          <p:cNvPr id="4" name="Slide Number Placeholder 3"/>
           <p:cNvSpPr>
             <a:spLocks noGrp="1"/>
           </p:cNvSpPr>
@@ -2139,7 +1888,7 @@
     </p:spTree>
     <p:extLst>
       <p:ext uri="{BB962C8B-B14F-4D97-AF65-F5344CB8AC3E}">
-        <p14:creationId xmlns:p14="http://schemas.microsoft.com/office/powerpoint/2010/main" val="4084701545"/>
+        <p14:creationId xmlns:p14="http://schemas.microsoft.com/office/powerpoint/2010/main" val="930187034"/>
       </p:ext>
     </p:extLst>
   </p:cSld>
@@ -2168,13 +1917,7 @@
       </p:grpSpPr>
       <p:sp>
         <p:nvSpPr>
-          <p:cNvPr id="2" name="Title 1">
-            <a:extLst>
-              <a:ext uri="{FF2B5EF4-FFF2-40B4-BE49-F238E27FC236}">
-                <a16:creationId xmlns:a16="http://schemas.microsoft.com/office/drawing/2014/main" id="{14F3AFD6-65FC-4422-9FF0-D320DA341673}"/>
-              </a:ext>
-            </a:extLst>
-          </p:cNvPr>
+          <p:cNvPr id="2" name="Title 1"/>
           <p:cNvSpPr>
             <a:spLocks noGrp="1"/>
           </p:cNvSpPr>
@@ -2184,8 +1927,8 @@
         </p:nvSpPr>
         <p:spPr>
           <a:xfrm>
-            <a:off x="839788" y="457200"/>
-            <a:ext cx="3932237" cy="1600200"/>
+            <a:off x="629841" y="457200"/>
+            <a:ext cx="2949178" cy="1600200"/>
           </a:xfrm>
         </p:spPr>
         <p:txBody>
@@ -2200,18 +1943,13 @@
               <a:rPr lang="en-US"/>
               <a:t>Click to edit Master title style</a:t>
             </a:r>
-          </a:p>
-        </p:txBody>
-      </p:sp>
-      <p:sp>
-        <p:nvSpPr>
-          <p:cNvPr id="3" name="Content Placeholder 2">
-            <a:extLst>
-              <a:ext uri="{FF2B5EF4-FFF2-40B4-BE49-F238E27FC236}">
-                <a16:creationId xmlns:a16="http://schemas.microsoft.com/office/drawing/2014/main" id="{5C8095E9-183B-4374-9FFD-30C437681384}"/>
-              </a:ext>
-            </a:extLst>
-          </p:cNvPr>
+            <a:endParaRPr lang="en-US" dirty="0"/>
+          </a:p>
+        </p:txBody>
+      </p:sp>
+      <p:sp>
+        <p:nvSpPr>
+          <p:cNvPr id="3" name="Content Placeholder 2"/>
           <p:cNvSpPr>
             <a:spLocks noGrp="1"/>
           </p:cNvSpPr>
@@ -2221,8 +1959,8 @@
         </p:nvSpPr>
         <p:spPr>
           <a:xfrm>
-            <a:off x="5183188" y="987425"/>
-            <a:ext cx="6172200" cy="4873625"/>
+            <a:off x="3887391" y="987426"/>
+            <a:ext cx="4629150" cy="4873625"/>
           </a:xfrm>
         </p:spPr>
         <p:txBody>
@@ -2290,18 +2028,13 @@
               <a:rPr lang="en-US"/>
               <a:t>Fifth level</a:t>
             </a:r>
-          </a:p>
-        </p:txBody>
-      </p:sp>
-      <p:sp>
-        <p:nvSpPr>
-          <p:cNvPr id="4" name="Text Placeholder 3">
-            <a:extLst>
-              <a:ext uri="{FF2B5EF4-FFF2-40B4-BE49-F238E27FC236}">
-                <a16:creationId xmlns:a16="http://schemas.microsoft.com/office/drawing/2014/main" id="{AD731463-B940-4259-A0F4-DFAECD9B193C}"/>
-              </a:ext>
-            </a:extLst>
-          </p:cNvPr>
+            <a:endParaRPr lang="en-US" dirty="0"/>
+          </a:p>
+        </p:txBody>
+      </p:sp>
+      <p:sp>
+        <p:nvSpPr>
+          <p:cNvPr id="4" name="Text Placeholder 3"/>
           <p:cNvSpPr>
             <a:spLocks noGrp="1"/>
           </p:cNvSpPr>
@@ -2311,8 +2044,8 @@
         </p:nvSpPr>
         <p:spPr>
           <a:xfrm>
-            <a:off x="839788" y="2057400"/>
-            <a:ext cx="3932237" cy="3811588"/>
+            <a:off x="629841" y="2057400"/>
+            <a:ext cx="2949178" cy="3811588"/>
           </a:xfrm>
         </p:spPr>
         <p:txBody>
@@ -2366,13 +2099,7 @@
       </p:sp>
       <p:sp>
         <p:nvSpPr>
-          <p:cNvPr id="5" name="Date Placeholder 4">
-            <a:extLst>
-              <a:ext uri="{FF2B5EF4-FFF2-40B4-BE49-F238E27FC236}">
-                <a16:creationId xmlns:a16="http://schemas.microsoft.com/office/drawing/2014/main" id="{C8F29A3B-DB19-49F1-9825-11C77AAA34D3}"/>
-              </a:ext>
-            </a:extLst>
-          </p:cNvPr>
+          <p:cNvPr id="5" name="Date Placeholder 4"/>
           <p:cNvSpPr>
             <a:spLocks noGrp="1"/>
           </p:cNvSpPr>
@@ -2387,7 +2114,7 @@
           <a:p>
             <a:fld id="{D98ADB59-0FC3-4F23-98C1-896570F2CCB9}" type="datetimeFigureOut">
               <a:rPr lang="en-US" smtClean="0"/>
-              <a:t>5/1/20</a:t>
+              <a:t>5/3/20</a:t>
             </a:fld>
             <a:endParaRPr lang="en-US"/>
           </a:p>
@@ -2395,13 +2122,7 @@
       </p:sp>
       <p:sp>
         <p:nvSpPr>
-          <p:cNvPr id="6" name="Footer Placeholder 5">
-            <a:extLst>
-              <a:ext uri="{FF2B5EF4-FFF2-40B4-BE49-F238E27FC236}">
-                <a16:creationId xmlns:a16="http://schemas.microsoft.com/office/drawing/2014/main" id="{B4A8A47B-68FA-4600-88D2-443C512CB2D7}"/>
-              </a:ext>
-            </a:extLst>
-          </p:cNvPr>
+          <p:cNvPr id="6" name="Footer Placeholder 5"/>
           <p:cNvSpPr>
             <a:spLocks noGrp="1"/>
           </p:cNvSpPr>
@@ -2420,13 +2141,7 @@
       </p:sp>
       <p:sp>
         <p:nvSpPr>
-          <p:cNvPr id="7" name="Slide Number Placeholder 6">
-            <a:extLst>
-              <a:ext uri="{FF2B5EF4-FFF2-40B4-BE49-F238E27FC236}">
-                <a16:creationId xmlns:a16="http://schemas.microsoft.com/office/drawing/2014/main" id="{19B98676-C77E-4267-8201-04126D00093F}"/>
-              </a:ext>
-            </a:extLst>
-          </p:cNvPr>
+          <p:cNvPr id="7" name="Slide Number Placeholder 6"/>
           <p:cNvSpPr>
             <a:spLocks noGrp="1"/>
           </p:cNvSpPr>
@@ -2450,7 +2165,7 @@
     </p:spTree>
     <p:extLst>
       <p:ext uri="{BB962C8B-B14F-4D97-AF65-F5344CB8AC3E}">
-        <p14:creationId xmlns:p14="http://schemas.microsoft.com/office/powerpoint/2010/main" val="3184549204"/>
+        <p14:creationId xmlns:p14="http://schemas.microsoft.com/office/powerpoint/2010/main" val="1500326876"/>
       </p:ext>
     </p:extLst>
   </p:cSld>
@@ -2479,13 +2194,7 @@
       </p:grpSpPr>
       <p:sp>
         <p:nvSpPr>
-          <p:cNvPr id="2" name="Title 1">
-            <a:extLst>
-              <a:ext uri="{FF2B5EF4-FFF2-40B4-BE49-F238E27FC236}">
-                <a16:creationId xmlns:a16="http://schemas.microsoft.com/office/drawing/2014/main" id="{39DFCCF5-2250-48F9-9FF6-C165C0EB3250}"/>
-              </a:ext>
-            </a:extLst>
-          </p:cNvPr>
+          <p:cNvPr id="2" name="Title 1"/>
           <p:cNvSpPr>
             <a:spLocks noGrp="1"/>
           </p:cNvSpPr>
@@ -2495,8 +2204,8 @@
         </p:nvSpPr>
         <p:spPr>
           <a:xfrm>
-            <a:off x="839788" y="457200"/>
-            <a:ext cx="3932237" cy="1600200"/>
+            <a:off x="629841" y="457200"/>
+            <a:ext cx="2949178" cy="1600200"/>
           </a:xfrm>
         </p:spPr>
         <p:txBody>
@@ -2511,20 +2220,15 @@
               <a:rPr lang="en-US"/>
               <a:t>Click to edit Master title style</a:t>
             </a:r>
-          </a:p>
-        </p:txBody>
-      </p:sp>
-      <p:sp>
-        <p:nvSpPr>
-          <p:cNvPr id="3" name="Picture Placeholder 2">
-            <a:extLst>
-              <a:ext uri="{FF2B5EF4-FFF2-40B4-BE49-F238E27FC236}">
-                <a16:creationId xmlns:a16="http://schemas.microsoft.com/office/drawing/2014/main" id="{AAD858DB-3533-4290-96F2-B5F300D7F20E}"/>
-              </a:ext>
-            </a:extLst>
-          </p:cNvPr>
+            <a:endParaRPr lang="en-US" dirty="0"/>
+          </a:p>
+        </p:txBody>
+      </p:sp>
+      <p:sp>
+        <p:nvSpPr>
+          <p:cNvPr id="3" name="Picture Placeholder 2"/>
           <p:cNvSpPr>
-            <a:spLocks noGrp="1"/>
+            <a:spLocks noGrp="1" noChangeAspect="1"/>
           </p:cNvSpPr>
           <p:nvPr>
             <p:ph type="pic" idx="1"/>
@@ -2532,12 +2236,12 @@
         </p:nvSpPr>
         <p:spPr>
           <a:xfrm>
-            <a:off x="5183188" y="987425"/>
-            <a:ext cx="6172200" cy="4873625"/>
-          </a:xfrm>
-        </p:spPr>
-        <p:txBody>
-          <a:bodyPr/>
+            <a:off x="3887391" y="987426"/>
+            <a:ext cx="4629150" cy="4873625"/>
+          </a:xfrm>
+        </p:spPr>
+        <p:txBody>
+          <a:bodyPr anchor="t"/>
           <a:lstStyle>
             <a:lvl1pPr marL="0" indent="0">
               <a:buNone/>
@@ -2577,19 +2281,17 @@
             </a:lvl9pPr>
           </a:lstStyle>
           <a:p>
-            <a:endParaRPr lang="en-US"/>
-          </a:p>
-        </p:txBody>
-      </p:sp>
-      <p:sp>
-        <p:nvSpPr>
-          <p:cNvPr id="4" name="Text Placeholder 3">
-            <a:extLst>
-              <a:ext uri="{FF2B5EF4-FFF2-40B4-BE49-F238E27FC236}">
-                <a16:creationId xmlns:a16="http://schemas.microsoft.com/office/drawing/2014/main" id="{B18D4778-C063-433C-96D9-F0CE221455A8}"/>
-              </a:ext>
-            </a:extLst>
-          </p:cNvPr>
+            <a:r>
+              <a:rPr lang="en-US"/>
+              <a:t>Click icon to add picture</a:t>
+            </a:r>
+            <a:endParaRPr lang="en-US" dirty="0"/>
+          </a:p>
+        </p:txBody>
+      </p:sp>
+      <p:sp>
+        <p:nvSpPr>
+          <p:cNvPr id="4" name="Text Placeholder 3"/>
           <p:cNvSpPr>
             <a:spLocks noGrp="1"/>
           </p:cNvSpPr>
@@ -2599,8 +2301,8 @@
         </p:nvSpPr>
         <p:spPr>
           <a:xfrm>
-            <a:off x="839788" y="2057400"/>
-            <a:ext cx="3932237" cy="3811588"/>
+            <a:off x="629841" y="2057400"/>
+            <a:ext cx="2949178" cy="3811588"/>
           </a:xfrm>
         </p:spPr>
         <p:txBody>
@@ -2654,13 +2356,7 @@
       </p:sp>
       <p:sp>
         <p:nvSpPr>
-          <p:cNvPr id="5" name="Date Placeholder 4">
-            <a:extLst>
-              <a:ext uri="{FF2B5EF4-FFF2-40B4-BE49-F238E27FC236}">
-                <a16:creationId xmlns:a16="http://schemas.microsoft.com/office/drawing/2014/main" id="{CC19FC88-9B5B-4C18-B236-68A2C899A10D}"/>
-              </a:ext>
-            </a:extLst>
-          </p:cNvPr>
+          <p:cNvPr id="5" name="Date Placeholder 4"/>
           <p:cNvSpPr>
             <a:spLocks noGrp="1"/>
           </p:cNvSpPr>
@@ -2675,7 +2371,7 @@
           <a:p>
             <a:fld id="{D98ADB59-0FC3-4F23-98C1-896570F2CCB9}" type="datetimeFigureOut">
               <a:rPr lang="en-US" smtClean="0"/>
-              <a:t>5/1/20</a:t>
+              <a:t>5/3/20</a:t>
             </a:fld>
             <a:endParaRPr lang="en-US"/>
           </a:p>
@@ -2683,13 +2379,7 @@
       </p:sp>
       <p:sp>
         <p:nvSpPr>
-          <p:cNvPr id="6" name="Footer Placeholder 5">
-            <a:extLst>
-              <a:ext uri="{FF2B5EF4-FFF2-40B4-BE49-F238E27FC236}">
-                <a16:creationId xmlns:a16="http://schemas.microsoft.com/office/drawing/2014/main" id="{D5D074EF-1273-46A2-AC07-52BEB55B7D41}"/>
-              </a:ext>
-            </a:extLst>
-          </p:cNvPr>
+          <p:cNvPr id="6" name="Footer Placeholder 5"/>
           <p:cNvSpPr>
             <a:spLocks noGrp="1"/>
           </p:cNvSpPr>
@@ -2708,13 +2398,7 @@
       </p:sp>
       <p:sp>
         <p:nvSpPr>
-          <p:cNvPr id="7" name="Slide Number Placeholder 6">
-            <a:extLst>
-              <a:ext uri="{FF2B5EF4-FFF2-40B4-BE49-F238E27FC236}">
-                <a16:creationId xmlns:a16="http://schemas.microsoft.com/office/drawing/2014/main" id="{F4773613-394B-40F6-A6C9-688AB5F358CF}"/>
-              </a:ext>
-            </a:extLst>
-          </p:cNvPr>
+          <p:cNvPr id="7" name="Slide Number Placeholder 6"/>
           <p:cNvSpPr>
             <a:spLocks noGrp="1"/>
           </p:cNvSpPr>
@@ -2738,7 +2422,7 @@
     </p:spTree>
     <p:extLst>
       <p:ext uri="{BB962C8B-B14F-4D97-AF65-F5344CB8AC3E}">
-        <p14:creationId xmlns:p14="http://schemas.microsoft.com/office/powerpoint/2010/main" val="2561093658"/>
+        <p14:creationId xmlns:p14="http://schemas.microsoft.com/office/powerpoint/2010/main" val="134827808"/>
       </p:ext>
     </p:extLst>
   </p:cSld>
@@ -2772,13 +2456,7 @@
       </p:grpSpPr>
       <p:sp>
         <p:nvSpPr>
-          <p:cNvPr id="2" name="Title Placeholder 1">
-            <a:extLst>
-              <a:ext uri="{FF2B5EF4-FFF2-40B4-BE49-F238E27FC236}">
-                <a16:creationId xmlns:a16="http://schemas.microsoft.com/office/drawing/2014/main" id="{3D97BAD5-4E9D-41CF-923C-1439397CBFDA}"/>
-              </a:ext>
-            </a:extLst>
-          </p:cNvPr>
+          <p:cNvPr id="2" name="Title Placeholder 1"/>
           <p:cNvSpPr>
             <a:spLocks noGrp="1"/>
           </p:cNvSpPr>
@@ -2788,8 +2466,8 @@
         </p:nvSpPr>
         <p:spPr>
           <a:xfrm>
-            <a:off x="838200" y="365125"/>
-            <a:ext cx="10515600" cy="1325563"/>
+            <a:off x="628650" y="365126"/>
+            <a:ext cx="7886700" cy="1325563"/>
           </a:xfrm>
           <a:prstGeom prst="rect">
             <a:avLst/>
@@ -2805,18 +2483,13 @@
               <a:rPr lang="en-US"/>
               <a:t>Click to edit Master title style</a:t>
             </a:r>
-          </a:p>
-        </p:txBody>
-      </p:sp>
-      <p:sp>
-        <p:nvSpPr>
-          <p:cNvPr id="3" name="Text Placeholder 2">
-            <a:extLst>
-              <a:ext uri="{FF2B5EF4-FFF2-40B4-BE49-F238E27FC236}">
-                <a16:creationId xmlns:a16="http://schemas.microsoft.com/office/drawing/2014/main" id="{05F3D4FE-EE5C-404C-B193-1BB0C6523CAC}"/>
-              </a:ext>
-            </a:extLst>
-          </p:cNvPr>
+            <a:endParaRPr lang="en-US" dirty="0"/>
+          </a:p>
+        </p:txBody>
+      </p:sp>
+      <p:sp>
+        <p:nvSpPr>
+          <p:cNvPr id="3" name="Text Placeholder 2"/>
           <p:cNvSpPr>
             <a:spLocks noGrp="1"/>
           </p:cNvSpPr>
@@ -2826,8 +2499,8 @@
         </p:nvSpPr>
         <p:spPr>
           <a:xfrm>
-            <a:off x="838200" y="1825625"/>
-            <a:ext cx="10515600" cy="4351338"/>
+            <a:off x="628650" y="1825625"/>
+            <a:ext cx="7886700" cy="4351338"/>
           </a:xfrm>
           <a:prstGeom prst="rect">
             <a:avLst/>
@@ -2872,18 +2545,13 @@
               <a:rPr lang="en-US"/>
               <a:t>Fifth level</a:t>
             </a:r>
-          </a:p>
-        </p:txBody>
-      </p:sp>
-      <p:sp>
-        <p:nvSpPr>
-          <p:cNvPr id="4" name="Date Placeholder 3">
-            <a:extLst>
-              <a:ext uri="{FF2B5EF4-FFF2-40B4-BE49-F238E27FC236}">
-                <a16:creationId xmlns:a16="http://schemas.microsoft.com/office/drawing/2014/main" id="{CB5FC2C0-00A7-4315-9202-47916EB4B955}"/>
-              </a:ext>
-            </a:extLst>
-          </p:cNvPr>
+            <a:endParaRPr lang="en-US" dirty="0"/>
+          </a:p>
+        </p:txBody>
+      </p:sp>
+      <p:sp>
+        <p:nvSpPr>
+          <p:cNvPr id="4" name="Date Placeholder 3"/>
           <p:cNvSpPr>
             <a:spLocks noGrp="1"/>
           </p:cNvSpPr>
@@ -2893,8 +2561,8 @@
         </p:nvSpPr>
         <p:spPr>
           <a:xfrm>
-            <a:off x="838200" y="6356350"/>
-            <a:ext cx="2743200" cy="365125"/>
+            <a:off x="628650" y="6356351"/>
+            <a:ext cx="2057400" cy="365125"/>
           </a:xfrm>
           <a:prstGeom prst="rect">
             <a:avLst/>
@@ -2916,7 +2584,7 @@
           <a:p>
             <a:fld id="{D98ADB59-0FC3-4F23-98C1-896570F2CCB9}" type="datetimeFigureOut">
               <a:rPr lang="en-US" smtClean="0"/>
-              <a:t>5/1/20</a:t>
+              <a:t>5/3/20</a:t>
             </a:fld>
             <a:endParaRPr lang="en-US"/>
           </a:p>
@@ -2924,13 +2592,7 @@
       </p:sp>
       <p:sp>
         <p:nvSpPr>
-          <p:cNvPr id="5" name="Footer Placeholder 4">
-            <a:extLst>
-              <a:ext uri="{FF2B5EF4-FFF2-40B4-BE49-F238E27FC236}">
-                <a16:creationId xmlns:a16="http://schemas.microsoft.com/office/drawing/2014/main" id="{FC40BDFF-F020-4488-8B71-128E2068B27A}"/>
-              </a:ext>
-            </a:extLst>
-          </p:cNvPr>
+          <p:cNvPr id="5" name="Footer Placeholder 4"/>
           <p:cNvSpPr>
             <a:spLocks noGrp="1"/>
           </p:cNvSpPr>
@@ -2940,8 +2602,8 @@
         </p:nvSpPr>
         <p:spPr>
           <a:xfrm>
-            <a:off x="4038600" y="6356350"/>
-            <a:ext cx="4114800" cy="365125"/>
+            <a:off x="3028950" y="6356351"/>
+            <a:ext cx="3086100" cy="365125"/>
           </a:xfrm>
           <a:prstGeom prst="rect">
             <a:avLst/>
@@ -2967,13 +2629,7 @@
       </p:sp>
       <p:sp>
         <p:nvSpPr>
-          <p:cNvPr id="6" name="Slide Number Placeholder 5">
-            <a:extLst>
-              <a:ext uri="{FF2B5EF4-FFF2-40B4-BE49-F238E27FC236}">
-                <a16:creationId xmlns:a16="http://schemas.microsoft.com/office/drawing/2014/main" id="{7FA570F8-E54D-4B01-A4D6-7897289E8C57}"/>
-              </a:ext>
-            </a:extLst>
-          </p:cNvPr>
+          <p:cNvPr id="6" name="Slide Number Placeholder 5"/>
           <p:cNvSpPr>
             <a:spLocks noGrp="1"/>
           </p:cNvSpPr>
@@ -2983,8 +2639,8 @@
         </p:nvSpPr>
         <p:spPr>
           <a:xfrm>
-            <a:off x="8610600" y="6356350"/>
-            <a:ext cx="2743200" cy="365125"/>
+            <a:off x="6457950" y="6356351"/>
+            <a:ext cx="2057400" cy="365125"/>
           </a:xfrm>
           <a:prstGeom prst="rect">
             <a:avLst/>
@@ -3015,23 +2671,23 @@
     </p:spTree>
     <p:extLst>
       <p:ext uri="{BB962C8B-B14F-4D97-AF65-F5344CB8AC3E}">
-        <p14:creationId xmlns:p14="http://schemas.microsoft.com/office/powerpoint/2010/main" val="3538295862"/>
+        <p14:creationId xmlns:p14="http://schemas.microsoft.com/office/powerpoint/2010/main" val="3274080250"/>
       </p:ext>
     </p:extLst>
   </p:cSld>
   <p:clrMap bg1="lt1" tx1="dk1" bg2="lt2" tx2="dk2" accent1="accent1" accent2="accent2" accent3="accent3" accent4="accent4" accent5="accent5" accent6="accent6" hlink="hlink" folHlink="folHlink"/>
   <p:sldLayoutIdLst>
-    <p:sldLayoutId id="2147483649" r:id="rId1"/>
-    <p:sldLayoutId id="2147483650" r:id="rId2"/>
-    <p:sldLayoutId id="2147483651" r:id="rId3"/>
-    <p:sldLayoutId id="2147483652" r:id="rId4"/>
-    <p:sldLayoutId id="2147483653" r:id="rId5"/>
-    <p:sldLayoutId id="2147483654" r:id="rId6"/>
-    <p:sldLayoutId id="2147483655" r:id="rId7"/>
-    <p:sldLayoutId id="2147483656" r:id="rId8"/>
-    <p:sldLayoutId id="2147483657" r:id="rId9"/>
-    <p:sldLayoutId id="2147483658" r:id="rId10"/>
-    <p:sldLayoutId id="2147483659" r:id="rId11"/>
+    <p:sldLayoutId id="2147483661" r:id="rId1"/>
+    <p:sldLayoutId id="2147483662" r:id="rId2"/>
+    <p:sldLayoutId id="2147483663" r:id="rId3"/>
+    <p:sldLayoutId id="2147483664" r:id="rId4"/>
+    <p:sldLayoutId id="2147483665" r:id="rId5"/>
+    <p:sldLayoutId id="2147483666" r:id="rId6"/>
+    <p:sldLayoutId id="2147483667" r:id="rId7"/>
+    <p:sldLayoutId id="2147483668" r:id="rId8"/>
+    <p:sldLayoutId id="2147483669" r:id="rId9"/>
+    <p:sldLayoutId id="2147483670" r:id="rId10"/>
+    <p:sldLayoutId id="2147483671" r:id="rId11"/>
   </p:sldLayoutIdLst>
   <p:txStyles>
     <p:titleStyle>
@@ -3355,7 +3011,7 @@
         </p:blipFill>
         <p:spPr>
           <a:xfrm rot="16200000">
-            <a:off x="5279715" y="3291536"/>
+            <a:off x="3755716" y="3291536"/>
             <a:ext cx="2135385" cy="274926"/>
           </a:xfrm>
           <a:prstGeom prst="rect">
@@ -3401,7 +3057,7 @@
         </p:blipFill>
         <p:spPr bwMode="auto">
           <a:xfrm>
-            <a:off x="2295862" y="2070450"/>
+            <a:off x="771863" y="2070451"/>
             <a:ext cx="4198653" cy="2717097"/>
           </a:xfrm>
           <a:prstGeom prst="rect">
@@ -3435,7 +3091,7 @@
         </p:nvCxnSpPr>
         <p:spPr>
           <a:xfrm>
-            <a:off x="6484871" y="2468882"/>
+            <a:off x="4960872" y="2468882"/>
             <a:ext cx="444867" cy="0"/>
           </a:xfrm>
           <a:prstGeom prst="straightConnector1">
@@ -3479,7 +3135,7 @@
         </p:nvCxnSpPr>
         <p:spPr>
           <a:xfrm>
-            <a:off x="6484870" y="4386074"/>
+            <a:off x="4960870" y="4386074"/>
             <a:ext cx="444868" cy="0"/>
           </a:xfrm>
           <a:prstGeom prst="straightConnector1">
@@ -3523,7 +3179,7 @@
         </p:nvCxnSpPr>
         <p:spPr>
           <a:xfrm flipH="1" flipV="1">
-            <a:off x="3566160" y="2284214"/>
+            <a:off x="2042160" y="2284214"/>
             <a:ext cx="829028" cy="1123448"/>
           </a:xfrm>
           <a:prstGeom prst="straightConnector1">
@@ -3568,7 +3224,7 @@
         </p:nvCxnSpPr>
         <p:spPr>
           <a:xfrm flipH="1">
-            <a:off x="5301746" y="3854947"/>
+            <a:off x="3777747" y="3854948"/>
             <a:ext cx="547" cy="641743"/>
           </a:xfrm>
           <a:prstGeom prst="straightConnector1">
@@ -3611,7 +3267,7 @@
         </p:nvSpPr>
         <p:spPr>
           <a:xfrm>
-            <a:off x="6929738" y="2284216"/>
+            <a:off x="5405738" y="2284216"/>
             <a:ext cx="2286000" cy="369332"/>
           </a:xfrm>
           <a:prstGeom prst="rect">
@@ -3646,7 +3302,7 @@
         </p:nvSpPr>
         <p:spPr>
           <a:xfrm>
-            <a:off x="6929738" y="4211816"/>
+            <a:off x="5405738" y="4211816"/>
             <a:ext cx="2286000" cy="369332"/>
           </a:xfrm>
           <a:prstGeom prst="rect">
@@ -3681,7 +3337,7 @@
         </p:nvSpPr>
         <p:spPr>
           <a:xfrm>
-            <a:off x="2898101" y="1885784"/>
+            <a:off x="1374101" y="1885784"/>
             <a:ext cx="2286000" cy="369332"/>
           </a:xfrm>
           <a:prstGeom prst="rect">
@@ -3716,7 +3372,7 @@
         </p:nvSpPr>
         <p:spPr>
           <a:xfrm>
-            <a:off x="3696058" y="4496690"/>
+            <a:off x="2172058" y="4496690"/>
             <a:ext cx="2286000" cy="369332"/>
           </a:xfrm>
           <a:prstGeom prst="rect">
@@ -3795,7 +3451,7 @@
         </p:blipFill>
         <p:spPr>
           <a:xfrm>
-            <a:off x="3265630" y="685800"/>
+            <a:off x="1393122" y="685800"/>
             <a:ext cx="4626370" cy="5486400"/>
           </a:xfrm>
           <a:prstGeom prst="rect">
@@ -3805,10 +3461,10 @@
       </p:pic>
       <p:sp>
         <p:nvSpPr>
-          <p:cNvPr id="22" name="TextBox 21">
+          <p:cNvPr id="12" name="TextBox 11">
             <a:extLst>
               <a:ext uri="{FF2B5EF4-FFF2-40B4-BE49-F238E27FC236}">
-                <a16:creationId xmlns:a16="http://schemas.microsoft.com/office/drawing/2014/main" id="{13617C29-7C4C-4D91-8858-747749E47ED2}"/>
+                <a16:creationId xmlns:a16="http://schemas.microsoft.com/office/drawing/2014/main" id="{6F47644D-4FE7-4674-9EFA-0ACF336A3139}"/>
               </a:ext>
             </a:extLst>
           </p:cNvPr>
@@ -3817,32 +3473,21 @@
         </p:nvSpPr>
         <p:spPr>
           <a:xfrm>
-            <a:off x="4191000" y="187036"/>
-            <a:ext cx="3352800" cy="646331"/>
+            <a:off x="2242292" y="5571810"/>
+            <a:ext cx="3015570" cy="369332"/>
           </a:xfrm>
           <a:prstGeom prst="rect">
             <a:avLst/>
           </a:prstGeom>
+          <a:solidFill>
+            <a:schemeClr val="bg1"/>
+          </a:solidFill>
           <a:ln>
             <a:solidFill>
               <a:srgbClr val="FF0000"/>
             </a:solidFill>
           </a:ln>
         </p:spPr>
-        <p:style>
-          <a:lnRef idx="2">
-            <a:schemeClr val="accent2"/>
-          </a:lnRef>
-          <a:fillRef idx="1">
-            <a:schemeClr val="lt1"/>
-          </a:fillRef>
-          <a:effectRef idx="0">
-            <a:schemeClr val="accent2"/>
-          </a:effectRef>
-          <a:fontRef idx="minor">
-            <a:schemeClr val="dk1"/>
-          </a:fontRef>
-        </p:style>
         <p:txBody>
           <a:bodyPr wrap="square" rtlCol="0">
             <a:spAutoFit/>
@@ -3851,31 +3496,84 @@
           <a:p>
             <a:r>
               <a:rPr lang="en-US" dirty="0"/>
-              <a:t>Heatmap shows the important regions the AI uses to detect pets.</a:t>
-            </a:r>
+              <a:t>Your Rating on scale of 1 to 10</a:t>
+            </a:r>
+          </a:p>
+        </p:txBody>
+      </p:sp>
+      <p:sp>
+        <p:nvSpPr>
+          <p:cNvPr id="3" name="Rectangle: Rounded Corners 2">
+            <a:extLst>
+              <a:ext uri="{FF2B5EF4-FFF2-40B4-BE49-F238E27FC236}">
+                <a16:creationId xmlns:a16="http://schemas.microsoft.com/office/drawing/2014/main" id="{DDF11BA7-53E3-4E47-B996-3EDC15F2BFCA}"/>
+              </a:ext>
+            </a:extLst>
+          </p:cNvPr>
+          <p:cNvSpPr/>
+          <p:nvPr/>
+        </p:nvSpPr>
+        <p:spPr>
+          <a:xfrm>
+            <a:off x="1556494" y="5105401"/>
+            <a:ext cx="4272713" cy="304800"/>
+          </a:xfrm>
+          <a:prstGeom prst="roundRect">
+            <a:avLst/>
+          </a:prstGeom>
+          <a:noFill/>
+          <a:ln w="28575" cap="flat" cmpd="sng" algn="ctr">
+            <a:solidFill>
+              <a:srgbClr val="FF0000"/>
+            </a:solidFill>
+            <a:prstDash val="solid"/>
+            <a:round/>
+            <a:headEnd type="none" w="med" len="med"/>
+            <a:tailEnd type="none" w="med" len="med"/>
+          </a:ln>
+        </p:spPr>
+        <p:style>
+          <a:lnRef idx="0">
+            <a:scrgbClr r="0" g="0" b="0"/>
+          </a:lnRef>
+          <a:fillRef idx="0">
+            <a:scrgbClr r="0" g="0" b="0"/>
+          </a:fillRef>
+          <a:effectRef idx="0">
+            <a:scrgbClr r="0" g="0" b="0"/>
+          </a:effectRef>
+          <a:fontRef idx="minor">
+            <a:schemeClr val="accent2"/>
+          </a:fontRef>
+        </p:style>
+        <p:txBody>
+          <a:bodyPr rtlCol="0" anchor="ctr"/>
+          <a:lstStyle/>
+          <a:p>
+            <a:pPr algn="ctr"/>
+            <a:endParaRPr lang="en-US"/>
           </a:p>
         </p:txBody>
       </p:sp>
       <p:cxnSp>
         <p:nvCxnSpPr>
-          <p:cNvPr id="11" name="Straight Arrow Connector 10">
+          <p:cNvPr id="18" name="Straight Arrow Connector 17">
             <a:extLst>
               <a:ext uri="{FF2B5EF4-FFF2-40B4-BE49-F238E27FC236}">
-                <a16:creationId xmlns:a16="http://schemas.microsoft.com/office/drawing/2014/main" id="{96787E16-0E97-4C05-ADFC-3B93F407678A}"/>
+                <a16:creationId xmlns:a16="http://schemas.microsoft.com/office/drawing/2014/main" id="{6E020DE6-56F8-46C9-B444-D83EE302A217}"/>
               </a:ext>
             </a:extLst>
           </p:cNvPr>
           <p:cNvCxnSpPr>
             <a:cxnSpLocks/>
-            <a:stCxn id="3" idx="2"/>
-            <a:endCxn id="12" idx="0"/>
+            <a:stCxn id="22" idx="1"/>
           </p:cNvCxnSpPr>
           <p:nvPr/>
         </p:nvCxnSpPr>
         <p:spPr>
-          <a:xfrm>
-            <a:off x="5565358" y="5410201"/>
-            <a:ext cx="0" cy="891431"/>
+          <a:xfrm flipH="1">
+            <a:off x="4147293" y="2061865"/>
+            <a:ext cx="1371599" cy="377232"/>
           </a:xfrm>
           <a:prstGeom prst="straightConnector1">
             <a:avLst/>
@@ -3884,7 +3582,8 @@
             <a:solidFill>
               <a:srgbClr val="FF0000"/>
             </a:solidFill>
-            <a:tailEnd type="triangle"/>
+            <a:headEnd type="oval" w="med" len="med"/>
+            <a:tailEnd type="triangle" w="med" len="med"/>
           </a:ln>
         </p:spPr>
         <p:style>
@@ -3902,114 +3601,25 @@
           </a:fontRef>
         </p:style>
       </p:cxnSp>
-      <p:sp>
-        <p:nvSpPr>
-          <p:cNvPr id="12" name="TextBox 11">
-            <a:extLst>
-              <a:ext uri="{FF2B5EF4-FFF2-40B4-BE49-F238E27FC236}">
-                <a16:creationId xmlns:a16="http://schemas.microsoft.com/office/drawing/2014/main" id="{6F47644D-4FE7-4674-9EFA-0ACF336A3139}"/>
-              </a:ext>
-            </a:extLst>
-          </p:cNvPr>
-          <p:cNvSpPr txBox="1"/>
-          <p:nvPr/>
-        </p:nvSpPr>
-        <p:spPr>
-          <a:xfrm>
-            <a:off x="4044115" y="6301632"/>
-            <a:ext cx="3042486" cy="369332"/>
-          </a:xfrm>
-          <a:prstGeom prst="rect">
-            <a:avLst/>
-          </a:prstGeom>
-          <a:noFill/>
-        </p:spPr>
-        <p:txBody>
-          <a:bodyPr wrap="square" rtlCol="0">
-            <a:spAutoFit/>
-          </a:bodyPr>
-          <a:lstStyle/>
-          <a:p>
-            <a:r>
-              <a:rPr lang="en-US" dirty="0"/>
-              <a:t>Your Rating on scale of 1 to 10</a:t>
-            </a:r>
-          </a:p>
-        </p:txBody>
-      </p:sp>
-      <p:sp>
-        <p:nvSpPr>
-          <p:cNvPr id="3" name="Rectangle: Rounded Corners 2">
-            <a:extLst>
-              <a:ext uri="{FF2B5EF4-FFF2-40B4-BE49-F238E27FC236}">
-                <a16:creationId xmlns:a16="http://schemas.microsoft.com/office/drawing/2014/main" id="{DDF11BA7-53E3-4E47-B996-3EDC15F2BFCA}"/>
-              </a:ext>
-            </a:extLst>
-          </p:cNvPr>
-          <p:cNvSpPr/>
-          <p:nvPr/>
-        </p:nvSpPr>
-        <p:spPr>
-          <a:xfrm>
-            <a:off x="3429001" y="5105401"/>
-            <a:ext cx="4272713" cy="304800"/>
-          </a:xfrm>
-          <a:prstGeom prst="roundRect">
-            <a:avLst/>
-          </a:prstGeom>
-          <a:noFill/>
-          <a:ln w="28575" cap="flat" cmpd="sng" algn="ctr">
-            <a:solidFill>
-              <a:srgbClr val="FF0000"/>
-            </a:solidFill>
-            <a:prstDash val="solid"/>
-            <a:round/>
-            <a:headEnd type="none" w="med" len="med"/>
-            <a:tailEnd type="none" w="med" len="med"/>
-          </a:ln>
-        </p:spPr>
-        <p:style>
-          <a:lnRef idx="0">
-            <a:scrgbClr r="0" g="0" b="0"/>
-          </a:lnRef>
-          <a:fillRef idx="0">
-            <a:scrgbClr r="0" g="0" b="0"/>
-          </a:fillRef>
-          <a:effectRef idx="0">
-            <a:scrgbClr r="0" g="0" b="0"/>
-          </a:effectRef>
-          <a:fontRef idx="minor">
-            <a:schemeClr val="accent2"/>
-          </a:fontRef>
-        </p:style>
-        <p:txBody>
-          <a:bodyPr rtlCol="0" anchor="ctr"/>
-          <a:lstStyle/>
-          <a:p>
-            <a:pPr algn="ctr"/>
-            <a:endParaRPr lang="en-US"/>
-          </a:p>
-        </p:txBody>
-      </p:sp>
       <p:cxnSp>
         <p:nvCxnSpPr>
-          <p:cNvPr id="18" name="Straight Arrow Connector 17">
+          <p:cNvPr id="31" name="Straight Arrow Connector 30">
             <a:extLst>
               <a:ext uri="{FF2B5EF4-FFF2-40B4-BE49-F238E27FC236}">
-                <a16:creationId xmlns:a16="http://schemas.microsoft.com/office/drawing/2014/main" id="{6E020DE6-56F8-46C9-B444-D83EE302A217}"/>
+                <a16:creationId xmlns:a16="http://schemas.microsoft.com/office/drawing/2014/main" id="{39565834-1954-214E-A955-095122108C7D}"/>
               </a:ext>
             </a:extLst>
           </p:cNvPr>
           <p:cNvCxnSpPr>
             <a:cxnSpLocks/>
-            <a:endCxn id="22" idx="2"/>
+            <a:stCxn id="22" idx="1"/>
           </p:cNvCxnSpPr>
           <p:nvPr/>
         </p:nvCxnSpPr>
         <p:spPr>
           <a:xfrm flipH="1" flipV="1">
-            <a:off x="5867400" y="833367"/>
-            <a:ext cx="228600" cy="1605034"/>
+            <a:off x="4299692" y="1524000"/>
+            <a:ext cx="1219200" cy="537865"/>
           </a:xfrm>
           <a:prstGeom prst="straightConnector1">
             <a:avLst/>
@@ -4037,6 +3647,62 @@
           </a:fontRef>
         </p:style>
       </p:cxnSp>
+      <p:sp>
+        <p:nvSpPr>
+          <p:cNvPr id="22" name="TextBox 21">
+            <a:extLst>
+              <a:ext uri="{FF2B5EF4-FFF2-40B4-BE49-F238E27FC236}">
+                <a16:creationId xmlns:a16="http://schemas.microsoft.com/office/drawing/2014/main" id="{13617C29-7C4C-4D91-8858-747749E47ED2}"/>
+              </a:ext>
+            </a:extLst>
+          </p:cNvPr>
+          <p:cNvSpPr txBox="1"/>
+          <p:nvPr/>
+        </p:nvSpPr>
+        <p:spPr>
+          <a:xfrm>
+            <a:off x="5518892" y="1600200"/>
+            <a:ext cx="2231986" cy="923330"/>
+          </a:xfrm>
+          <a:prstGeom prst="rect">
+            <a:avLst/>
+          </a:prstGeom>
+          <a:solidFill>
+            <a:schemeClr val="bg1"/>
+          </a:solidFill>
+          <a:ln>
+            <a:solidFill>
+              <a:srgbClr val="FF0000"/>
+            </a:solidFill>
+          </a:ln>
+        </p:spPr>
+        <p:style>
+          <a:lnRef idx="2">
+            <a:schemeClr val="accent2"/>
+          </a:lnRef>
+          <a:fillRef idx="1">
+            <a:schemeClr val="lt1"/>
+          </a:fillRef>
+          <a:effectRef idx="0">
+            <a:schemeClr val="accent2"/>
+          </a:effectRef>
+          <a:fontRef idx="minor">
+            <a:schemeClr val="dk1"/>
+          </a:fontRef>
+        </p:style>
+        <p:txBody>
+          <a:bodyPr wrap="square" rtlCol="0">
+            <a:spAutoFit/>
+          </a:bodyPr>
+          <a:lstStyle/>
+          <a:p>
+            <a:r>
+              <a:rPr lang="en-US" dirty="0"/>
+              <a:t>Heatmap shows the important regions the AI uses to detect ‘cat’</a:t>
+            </a:r>
+          </a:p>
+        </p:txBody>
+      </p:sp>
     </p:spTree>
     <p:extLst>
       <p:ext uri="{BB962C8B-B14F-4D97-AF65-F5344CB8AC3E}">
@@ -4095,7 +3761,7 @@
         </p:blipFill>
         <p:spPr>
           <a:xfrm>
-            <a:off x="3265630" y="685800"/>
+            <a:off x="1362578" y="693596"/>
             <a:ext cx="4626370" cy="5486400"/>
           </a:xfrm>
           <a:prstGeom prst="rect">
@@ -4105,51 +3771,10 @@
       </p:pic>
       <p:sp>
         <p:nvSpPr>
-          <p:cNvPr id="8" name="TextBox 7">
+          <p:cNvPr id="13" name="Rectangle: Rounded Corners 12">
             <a:extLst>
               <a:ext uri="{FF2B5EF4-FFF2-40B4-BE49-F238E27FC236}">
-                <a16:creationId xmlns:a16="http://schemas.microsoft.com/office/drawing/2014/main" id="{27B104EE-D197-FB4A-B470-C26A803DC740}"/>
-              </a:ext>
-            </a:extLst>
-          </p:cNvPr>
-          <p:cNvSpPr txBox="1"/>
-          <p:nvPr/>
-        </p:nvSpPr>
-        <p:spPr>
-          <a:xfrm>
-            <a:off x="8153401" y="697968"/>
-            <a:ext cx="2438400" cy="646331"/>
-          </a:xfrm>
-          <a:prstGeom prst="rect">
-            <a:avLst/>
-          </a:prstGeom>
-          <a:noFill/>
-        </p:spPr>
-        <p:txBody>
-          <a:bodyPr wrap="square" rtlCol="0">
-            <a:spAutoFit/>
-          </a:bodyPr>
-          <a:lstStyle/>
-          <a:p>
-            <a:r>
-              <a:rPr lang="en-US" dirty="0"/>
-              <a:t>Click to rate next image.</a:t>
-            </a:r>
-          </a:p>
-          <a:p>
-            <a:r>
-              <a:rPr lang="en-US" dirty="0"/>
-              <a:t>HIT progress.</a:t>
-            </a:r>
-          </a:p>
-        </p:txBody>
-      </p:sp>
-      <p:sp>
-        <p:nvSpPr>
-          <p:cNvPr id="9" name="Rectangle: Rounded Corners 2">
-            <a:extLst>
-              <a:ext uri="{FF2B5EF4-FFF2-40B4-BE49-F238E27FC236}">
-                <a16:creationId xmlns:a16="http://schemas.microsoft.com/office/drawing/2014/main" id="{4020F0A0-5586-4141-B6E2-2C02667D0007}"/>
+                <a16:creationId xmlns:a16="http://schemas.microsoft.com/office/drawing/2014/main" id="{BF683DC5-3B78-284D-B497-6FBC7A95584C}"/>
               </a:ext>
             </a:extLst>
           </p:cNvPr>
@@ -4158,8 +3783,8 @@
         </p:nvSpPr>
         <p:spPr>
           <a:xfrm>
-            <a:off x="7086600" y="697968"/>
-            <a:ext cx="744422" cy="445032"/>
+            <a:off x="2321815" y="4903842"/>
+            <a:ext cx="2731008" cy="150642"/>
           </a:xfrm>
           <a:prstGeom prst="roundRect">
             <a:avLst/>
@@ -4198,25 +3823,66 @@
           </a:p>
         </p:txBody>
       </p:sp>
+      <p:sp>
+        <p:nvSpPr>
+          <p:cNvPr id="14" name="TextBox 13">
+            <a:extLst>
+              <a:ext uri="{FF2B5EF4-FFF2-40B4-BE49-F238E27FC236}">
+                <a16:creationId xmlns:a16="http://schemas.microsoft.com/office/drawing/2014/main" id="{A8A8093B-EF19-6249-A834-4706BCB2AF7F}"/>
+              </a:ext>
+            </a:extLst>
+          </p:cNvPr>
+          <p:cNvSpPr txBox="1"/>
+          <p:nvPr/>
+        </p:nvSpPr>
+        <p:spPr>
+          <a:xfrm>
+            <a:off x="6034245" y="4378998"/>
+            <a:ext cx="1661955" cy="1200329"/>
+          </a:xfrm>
+          <a:prstGeom prst="rect">
+            <a:avLst/>
+          </a:prstGeom>
+          <a:noFill/>
+          <a:ln>
+            <a:solidFill>
+              <a:srgbClr val="FF0000"/>
+            </a:solidFill>
+          </a:ln>
+        </p:spPr>
+        <p:txBody>
+          <a:bodyPr wrap="square" rtlCol="0">
+            <a:spAutoFit/>
+          </a:bodyPr>
+          <a:lstStyle/>
+          <a:p>
+            <a:r>
+              <a:rPr lang="en-US" dirty="0"/>
+              <a:t>Consider the image for at least 2 seconds before rating!</a:t>
+            </a:r>
+          </a:p>
+        </p:txBody>
+      </p:sp>
       <p:cxnSp>
         <p:nvCxnSpPr>
-          <p:cNvPr id="10" name="Straight Arrow Connector 9">
+          <p:cNvPr id="15" name="Straight Arrow Connector 14">
             <a:extLst>
               <a:ext uri="{FF2B5EF4-FFF2-40B4-BE49-F238E27FC236}">
-                <a16:creationId xmlns:a16="http://schemas.microsoft.com/office/drawing/2014/main" id="{1A89E58F-6070-DC49-8948-4C5A74EFCCC3}"/>
+                <a16:creationId xmlns:a16="http://schemas.microsoft.com/office/drawing/2014/main" id="{204B32CC-88DD-1C4E-8508-777474ED8B12}"/>
               </a:ext>
             </a:extLst>
           </p:cNvPr>
           <p:cNvCxnSpPr>
             <a:cxnSpLocks/>
-            <a:endCxn id="8" idx="1"/>
+            <a:stCxn id="13" idx="3"/>
+            <a:endCxn id="14" idx="1"/>
           </p:cNvCxnSpPr>
           <p:nvPr/>
         </p:nvCxnSpPr>
         <p:spPr>
           <a:xfrm>
-            <a:off x="7831023" y="920484"/>
-            <a:ext cx="322378" cy="100650"/>
+            <a:off x="5052823" y="4979163"/>
+            <a:ext cx="981422" cy="0"/>
           </a:xfrm>
           <a:prstGeom prst="straightConnector1">
             <a:avLst/>
@@ -4245,10 +3911,10 @@
       </p:cxnSp>
       <p:sp>
         <p:nvSpPr>
-          <p:cNvPr id="13" name="Rectangle: Rounded Corners 12">
+          <p:cNvPr id="11" name="Rectangle: Rounded Corners 2">
             <a:extLst>
               <a:ext uri="{FF2B5EF4-FFF2-40B4-BE49-F238E27FC236}">
-                <a16:creationId xmlns:a16="http://schemas.microsoft.com/office/drawing/2014/main" id="{BF683DC5-3B78-284D-B497-6FBC7A95584C}"/>
+                <a16:creationId xmlns:a16="http://schemas.microsoft.com/office/drawing/2014/main" id="{43E868FB-D229-B44E-A413-2F4949B34B43}"/>
               </a:ext>
             </a:extLst>
           </p:cNvPr>
@@ -4257,8 +3923,8 @@
         </p:nvSpPr>
         <p:spPr>
           <a:xfrm>
-            <a:off x="4224867" y="4896046"/>
-            <a:ext cx="2731008" cy="150642"/>
+            <a:off x="1472016" y="762738"/>
+            <a:ext cx="745018" cy="285710"/>
           </a:xfrm>
           <a:prstGeom prst="roundRect">
             <a:avLst/>
@@ -4299,64 +3965,78 @@
       </p:sp>
       <p:sp>
         <p:nvSpPr>
-          <p:cNvPr id="14" name="TextBox 13">
+          <p:cNvPr id="12" name="Rectangle: Rounded Corners 2">
             <a:extLst>
               <a:ext uri="{FF2B5EF4-FFF2-40B4-BE49-F238E27FC236}">
-                <a16:creationId xmlns:a16="http://schemas.microsoft.com/office/drawing/2014/main" id="{A8A8093B-EF19-6249-A834-4706BCB2AF7F}"/>
+                <a16:creationId xmlns:a16="http://schemas.microsoft.com/office/drawing/2014/main" id="{94945A46-CBAE-E043-92D5-B1382B60E301}"/>
               </a:ext>
             </a:extLst>
           </p:cNvPr>
-          <p:cNvSpPr txBox="1"/>
+          <p:cNvSpPr/>
           <p:nvPr/>
         </p:nvSpPr>
         <p:spPr>
           <a:xfrm>
-            <a:off x="8001000" y="4648200"/>
-            <a:ext cx="1747177" cy="646331"/>
-          </a:xfrm>
-          <a:prstGeom prst="rect">
+            <a:off x="5252590" y="782076"/>
+            <a:ext cx="622043" cy="266372"/>
+          </a:xfrm>
+          <a:prstGeom prst="roundRect">
             <a:avLst/>
           </a:prstGeom>
           <a:noFill/>
-          <a:ln>
+          <a:ln w="28575" cap="flat" cmpd="sng" algn="ctr">
             <a:solidFill>
               <a:srgbClr val="FF0000"/>
             </a:solidFill>
+            <a:prstDash val="solid"/>
+            <a:round/>
+            <a:headEnd type="none" w="med" len="med"/>
+            <a:tailEnd type="none" w="med" len="med"/>
           </a:ln>
         </p:spPr>
-        <p:txBody>
-          <a:bodyPr wrap="square" rtlCol="0">
-            <a:spAutoFit/>
-          </a:bodyPr>
-          <a:lstStyle/>
-          <a:p>
-            <a:r>
-              <a:rPr lang="en-US" dirty="0"/>
-              <a:t>Wait 2 seconds before rating!</a:t>
-            </a:r>
+        <p:style>
+          <a:lnRef idx="0">
+            <a:scrgbClr r="0" g="0" b="0"/>
+          </a:lnRef>
+          <a:fillRef idx="0">
+            <a:scrgbClr r="0" g="0" b="0"/>
+          </a:fillRef>
+          <a:effectRef idx="0">
+            <a:scrgbClr r="0" g="0" b="0"/>
+          </a:effectRef>
+          <a:fontRef idx="minor">
+            <a:schemeClr val="accent2"/>
+          </a:fontRef>
+        </p:style>
+        <p:txBody>
+          <a:bodyPr rtlCol="0" anchor="ctr"/>
+          <a:lstStyle/>
+          <a:p>
+            <a:pPr algn="ctr"/>
+            <a:endParaRPr lang="en-US"/>
           </a:p>
         </p:txBody>
       </p:sp>
       <p:cxnSp>
         <p:nvCxnSpPr>
-          <p:cNvPr id="15" name="Straight Arrow Connector 14">
+          <p:cNvPr id="16" name="Straight Arrow Connector 15">
             <a:extLst>
               <a:ext uri="{FF2B5EF4-FFF2-40B4-BE49-F238E27FC236}">
-                <a16:creationId xmlns:a16="http://schemas.microsoft.com/office/drawing/2014/main" id="{204B32CC-88DD-1C4E-8508-777474ED8B12}"/>
+                <a16:creationId xmlns:a16="http://schemas.microsoft.com/office/drawing/2014/main" id="{D3E57CE6-3B65-F94F-B048-5AC0E5F41F07}"/>
               </a:ext>
             </a:extLst>
           </p:cNvPr>
           <p:cNvCxnSpPr>
             <a:cxnSpLocks/>
-            <a:stCxn id="13" idx="3"/>
-            <a:endCxn id="14" idx="1"/>
+            <a:stCxn id="18" idx="1"/>
+            <a:endCxn id="11" idx="3"/>
           </p:cNvCxnSpPr>
           <p:nvPr/>
         </p:nvCxnSpPr>
         <p:spPr>
-          <a:xfrm flipV="1">
-            <a:off x="6955875" y="4971366"/>
-            <a:ext cx="1045125" cy="1"/>
+          <a:xfrm flipH="1" flipV="1">
+            <a:off x="2217034" y="905593"/>
+            <a:ext cx="294589" cy="95578"/>
           </a:xfrm>
           <a:prstGeom prst="straightConnector1">
             <a:avLst/>
@@ -4365,7 +4045,8 @@
             <a:solidFill>
               <a:srgbClr val="FF0000"/>
             </a:solidFill>
-            <a:tailEnd type="triangle"/>
+            <a:headEnd type="oval" w="med" len="med"/>
+            <a:tailEnd type="triangle" w="med" len="med"/>
           </a:ln>
         </p:spPr>
         <p:style>
@@ -4383,6 +4064,178 @@
           </a:fontRef>
         </p:style>
       </p:cxnSp>
+      <p:cxnSp>
+        <p:nvCxnSpPr>
+          <p:cNvPr id="17" name="Straight Arrow Connector 16">
+            <a:extLst>
+              <a:ext uri="{FF2B5EF4-FFF2-40B4-BE49-F238E27FC236}">
+                <a16:creationId xmlns:a16="http://schemas.microsoft.com/office/drawing/2014/main" id="{FA1B91D2-6783-E74C-906B-2C6A6494EAF9}"/>
+              </a:ext>
+            </a:extLst>
+          </p:cNvPr>
+          <p:cNvCxnSpPr>
+            <a:cxnSpLocks/>
+            <a:stCxn id="18" idx="3"/>
+            <a:endCxn id="12" idx="1"/>
+          </p:cNvCxnSpPr>
+          <p:nvPr/>
+        </p:nvCxnSpPr>
+        <p:spPr>
+          <a:xfrm flipV="1">
+            <a:off x="4958001" y="915262"/>
+            <a:ext cx="294589" cy="85909"/>
+          </a:xfrm>
+          <a:prstGeom prst="straightConnector1">
+            <a:avLst/>
+          </a:prstGeom>
+          <a:ln w="38100">
+            <a:solidFill>
+              <a:srgbClr val="FF0000"/>
+            </a:solidFill>
+            <a:headEnd type="oval" w="med" len="med"/>
+            <a:tailEnd type="triangle" w="med" len="med"/>
+          </a:ln>
+        </p:spPr>
+        <p:style>
+          <a:lnRef idx="1">
+            <a:schemeClr val="accent1"/>
+          </a:lnRef>
+          <a:fillRef idx="0">
+            <a:schemeClr val="accent1"/>
+          </a:fillRef>
+          <a:effectRef idx="0">
+            <a:schemeClr val="accent1"/>
+          </a:effectRef>
+          <a:fontRef idx="minor">
+            <a:schemeClr val="tx1"/>
+          </a:fontRef>
+        </p:style>
+      </p:cxnSp>
+      <p:sp>
+        <p:nvSpPr>
+          <p:cNvPr id="18" name="TextBox 17">
+            <a:extLst>
+              <a:ext uri="{FF2B5EF4-FFF2-40B4-BE49-F238E27FC236}">
+                <a16:creationId xmlns:a16="http://schemas.microsoft.com/office/drawing/2014/main" id="{3B5416E3-F602-3241-B73D-5FA3EEC298CC}"/>
+              </a:ext>
+            </a:extLst>
+          </p:cNvPr>
+          <p:cNvSpPr txBox="1"/>
+          <p:nvPr/>
+        </p:nvSpPr>
+        <p:spPr>
+          <a:xfrm>
+            <a:off x="2511623" y="678005"/>
+            <a:ext cx="2446378" cy="646331"/>
+          </a:xfrm>
+          <a:prstGeom prst="rect">
+            <a:avLst/>
+          </a:prstGeom>
+          <a:solidFill>
+            <a:schemeClr val="bg1"/>
+          </a:solidFill>
+          <a:ln>
+            <a:solidFill>
+              <a:srgbClr val="FF0000"/>
+            </a:solidFill>
+          </a:ln>
+        </p:spPr>
+        <p:txBody>
+          <a:bodyPr wrap="square" rtlCol="0">
+            <a:spAutoFit/>
+          </a:bodyPr>
+          <a:lstStyle/>
+          <a:p>
+            <a:pPr algn="ctr"/>
+            <a:r>
+              <a:rPr lang="en-US" dirty="0"/>
+              <a:t>Click to navigate through your image set.</a:t>
+            </a:r>
+          </a:p>
+        </p:txBody>
+      </p:sp>
+      <p:pic>
+        <p:nvPicPr>
+          <p:cNvPr id="19" name="Graphic 18" descr="Cursor">
+            <a:extLst>
+              <a:ext uri="{FF2B5EF4-FFF2-40B4-BE49-F238E27FC236}">
+                <a16:creationId xmlns:a16="http://schemas.microsoft.com/office/drawing/2014/main" id="{B76594EB-D044-564F-9AD8-0D13E3162BF3}"/>
+              </a:ext>
+            </a:extLst>
+          </p:cNvPr>
+          <p:cNvPicPr>
+            <a:picLocks noChangeAspect="1"/>
+          </p:cNvPicPr>
+          <p:nvPr/>
+        </p:nvPicPr>
+        <p:blipFill>
+          <a:blip r:embed="rId3">
+            <a:extLst>
+              <a:ext uri="{28A0092B-C50C-407E-A947-70E740481C1C}">
+                <a14:useLocalDpi xmlns:a14="http://schemas.microsoft.com/office/drawing/2010/main" val="0"/>
+              </a:ext>
+              <a:ext uri="{96DAC541-7B7A-43D3-8B79-37D633B846F1}">
+                <asvg:svgBlip xmlns:asvg="http://schemas.microsoft.com/office/drawing/2016/SVG/main" r:embed="rId4"/>
+              </a:ext>
+            </a:extLst>
+          </a:blip>
+          <a:stretch>
+            <a:fillRect/>
+          </a:stretch>
+        </p:blipFill>
+        <p:spPr>
+          <a:xfrm>
+            <a:off x="4845281" y="5129805"/>
+            <a:ext cx="407309" cy="407309"/>
+          </a:xfrm>
+          <a:prstGeom prst="rect">
+            <a:avLst/>
+          </a:prstGeom>
+        </p:spPr>
+      </p:pic>
+      <p:sp>
+        <p:nvSpPr>
+          <p:cNvPr id="22" name="TextBox 21">
+            <a:extLst>
+              <a:ext uri="{FF2B5EF4-FFF2-40B4-BE49-F238E27FC236}">
+                <a16:creationId xmlns:a16="http://schemas.microsoft.com/office/drawing/2014/main" id="{A79A26AD-431D-9C4A-950B-4BE2A7D087DC}"/>
+              </a:ext>
+            </a:extLst>
+          </p:cNvPr>
+          <p:cNvSpPr txBox="1"/>
+          <p:nvPr/>
+        </p:nvSpPr>
+        <p:spPr>
+          <a:xfrm>
+            <a:off x="2764790" y="5503089"/>
+            <a:ext cx="2227935" cy="369332"/>
+          </a:xfrm>
+          <a:prstGeom prst="rect">
+            <a:avLst/>
+          </a:prstGeom>
+          <a:solidFill>
+            <a:schemeClr val="bg1"/>
+          </a:solidFill>
+          <a:ln>
+            <a:solidFill>
+              <a:srgbClr val="FF0000"/>
+            </a:solidFill>
+          </a:ln>
+        </p:spPr>
+        <p:txBody>
+          <a:bodyPr wrap="square" rtlCol="0">
+            <a:spAutoFit/>
+          </a:bodyPr>
+          <a:lstStyle/>
+          <a:p>
+            <a:pPr algn="ctr"/>
+            <a:r>
+              <a:rPr lang="en-US" dirty="0"/>
+              <a:t>Click to select a rating</a:t>
+            </a:r>
+          </a:p>
+        </p:txBody>
+      </p:sp>
     </p:spTree>
     <p:extLst>
       <p:ext uri="{BB962C8B-B14F-4D97-AF65-F5344CB8AC3E}">
@@ -4435,7 +4288,7 @@
         </p:blipFill>
         <p:spPr>
           <a:xfrm>
-            <a:off x="2262559" y="1351088"/>
+            <a:off x="738559" y="1351088"/>
             <a:ext cx="5973916" cy="3905578"/>
           </a:xfrm>
           <a:prstGeom prst="rect">
@@ -4460,7 +4313,7 @@
         </p:nvCxnSpPr>
         <p:spPr>
           <a:xfrm flipV="1">
-            <a:off x="5106924" y="1162976"/>
+            <a:off x="3582924" y="1162976"/>
             <a:ext cx="0" cy="686216"/>
           </a:xfrm>
           <a:prstGeom prst="straightConnector1">
@@ -4502,7 +4355,7 @@
         </p:nvSpPr>
         <p:spPr>
           <a:xfrm>
-            <a:off x="2868657" y="516645"/>
+            <a:off x="1344657" y="516646"/>
             <a:ext cx="4476534" cy="646331"/>
           </a:xfrm>
           <a:prstGeom prst="rect">
@@ -4548,7 +4401,7 @@
         </p:nvSpPr>
         <p:spPr>
           <a:xfrm>
-            <a:off x="2262559" y="1849190"/>
+            <a:off x="738559" y="1849190"/>
             <a:ext cx="6038556" cy="339510"/>
           </a:xfrm>
           <a:prstGeom prst="roundRect">
@@ -4602,7 +4455,7 @@
         </p:nvSpPr>
         <p:spPr>
           <a:xfrm>
-            <a:off x="2262559" y="1351088"/>
+            <a:off x="738559" y="1351088"/>
             <a:ext cx="5973904" cy="4155824"/>
           </a:xfrm>
           <a:prstGeom prst="rect">
@@ -4647,7 +4500,7 @@
         </p:nvSpPr>
         <p:spPr>
           <a:xfrm>
-            <a:off x="3392424" y="2404872"/>
+            <a:off x="1868424" y="2404872"/>
             <a:ext cx="4690872" cy="2935224"/>
           </a:xfrm>
           <a:prstGeom prst="rect">
@@ -4744,7 +4597,7 @@
         </p:blipFill>
         <p:spPr>
           <a:xfrm>
-            <a:off x="6045413" y="977645"/>
+            <a:off x="5642891" y="825245"/>
             <a:ext cx="2530104" cy="2530104"/>
           </a:xfrm>
           <a:prstGeom prst="rect">
@@ -4779,7 +4632,7 @@
         </p:blipFill>
         <p:spPr>
           <a:xfrm>
-            <a:off x="6045413" y="3675952"/>
+            <a:off x="5642891" y="3523552"/>
             <a:ext cx="2530104" cy="2530104"/>
           </a:xfrm>
           <a:prstGeom prst="rect">
@@ -4814,7 +4667,7 @@
         </p:blipFill>
         <p:spPr>
           <a:xfrm>
-            <a:off x="1545522" y="1042037"/>
+            <a:off x="1132754" y="828139"/>
             <a:ext cx="2539192" cy="2539192"/>
           </a:xfrm>
           <a:prstGeom prst="rect">
@@ -4836,8 +4689,8 @@
         </p:nvSpPr>
         <p:spPr>
           <a:xfrm>
-            <a:off x="1676400" y="533400"/>
-            <a:ext cx="6708984" cy="409907"/>
+            <a:off x="2035878" y="381001"/>
+            <a:ext cx="5184984" cy="409907"/>
           </a:xfrm>
           <a:prstGeom prst="roundRect">
             <a:avLst/>
@@ -4879,7 +4732,7 @@
                   <a:schemeClr val="tx1"/>
                 </a:solidFill>
               </a:rPr>
-              <a:t>In your opinion, select the </a:t>
+              <a:t>Select the </a:t>
             </a:r>
             <a:r>
               <a:rPr lang="en-US" dirty="0">
@@ -4933,22 +4786,22 @@
           </p:cNvPr>
           <p:cNvCxnSpPr>
             <a:cxnSpLocks/>
+            <a:stCxn id="22" idx="3"/>
+            <a:endCxn id="39" idx="1"/>
           </p:cNvCxnSpPr>
           <p:nvPr/>
         </p:nvCxnSpPr>
         <p:spPr>
           <a:xfrm>
-            <a:off x="4084714" y="2278555"/>
-            <a:ext cx="2011286" cy="0"/>
+            <a:off x="5181961" y="2090297"/>
+            <a:ext cx="460930" cy="0"/>
           </a:xfrm>
           <a:prstGeom prst="straightConnector1">
             <a:avLst/>
           </a:prstGeom>
           <a:ln w="38100">
             <a:solidFill>
-              <a:schemeClr val="accent1">
-                <a:lumMod val="50000"/>
-              </a:schemeClr>
+              <a:srgbClr val="FF0000"/>
             </a:solidFill>
             <a:headEnd type="oval" w="med" len="med"/>
             <a:tailEnd type="triangle" w="med" len="med"/>
@@ -4980,22 +4833,22 @@
           </p:cNvPr>
           <p:cNvCxnSpPr>
             <a:cxnSpLocks/>
+            <a:stCxn id="19" idx="3"/>
+            <a:endCxn id="41" idx="1"/>
           </p:cNvCxnSpPr>
           <p:nvPr/>
         </p:nvCxnSpPr>
         <p:spPr>
           <a:xfrm>
-            <a:off x="4084714" y="2278555"/>
-            <a:ext cx="2045359" cy="2673308"/>
+            <a:off x="5297917" y="4788604"/>
+            <a:ext cx="344974" cy="0"/>
           </a:xfrm>
           <a:prstGeom prst="straightConnector1">
             <a:avLst/>
           </a:prstGeom>
           <a:ln w="38100">
             <a:solidFill>
-              <a:schemeClr val="accent1">
-                <a:lumMod val="50000"/>
-              </a:schemeClr>
+              <a:srgbClr val="FF0000"/>
             </a:solidFill>
             <a:headEnd type="oval" w="med" len="med"/>
             <a:tailEnd type="triangle" w="med" len="med"/>
@@ -5030,7 +4883,7 @@
         </p:nvSpPr>
         <p:spPr>
           <a:xfrm>
-            <a:off x="4480012" y="1920974"/>
+            <a:off x="4093279" y="1767132"/>
             <a:ext cx="1088683" cy="646331"/>
           </a:xfrm>
           <a:prstGeom prst="rect">
@@ -5085,8 +4938,8 @@
           <p:nvPr/>
         </p:nvSpPr>
         <p:spPr>
-          <a:xfrm rot="789121">
-            <a:off x="4544930" y="3399957"/>
+          <a:xfrm>
+            <a:off x="4093279" y="4603938"/>
             <a:ext cx="1204639" cy="369332"/>
           </a:xfrm>
           <a:prstGeom prst="rect">
@@ -5139,23 +4992,22 @@
           </p:cNvPr>
           <p:cNvCxnSpPr>
             <a:cxnSpLocks/>
+            <a:stCxn id="37" idx="2"/>
             <a:endCxn id="23" idx="0"/>
           </p:cNvCxnSpPr>
           <p:nvPr/>
         </p:nvCxnSpPr>
         <p:spPr>
           <a:xfrm>
-            <a:off x="4084714" y="2278555"/>
-            <a:ext cx="472758" cy="2238504"/>
+            <a:off x="2402350" y="3367331"/>
+            <a:ext cx="0" cy="1610130"/>
           </a:xfrm>
           <a:prstGeom prst="straightConnector1">
             <a:avLst/>
           </a:prstGeom>
           <a:ln w="38100">
             <a:solidFill>
-              <a:schemeClr val="accent1">
-                <a:lumMod val="50000"/>
-              </a:schemeClr>
+              <a:srgbClr val="FF0000"/>
             </a:solidFill>
             <a:headEnd type="oval" w="med" len="med"/>
             <a:tailEnd type="triangle" w="med" len="med"/>
@@ -5190,7 +5042,7 @@
         </p:nvSpPr>
         <p:spPr>
           <a:xfrm>
-            <a:off x="3505200" y="4517059"/>
+            <a:off x="1350078" y="4977461"/>
             <a:ext cx="2104544" cy="1200329"/>
           </a:xfrm>
           <a:prstGeom prst="rect">
@@ -5277,8 +5129,8 @@
         </p:nvGrpSpPr>
         <p:grpSpPr>
           <a:xfrm>
-            <a:off x="2016252" y="713154"/>
-            <a:ext cx="4580238" cy="5431692"/>
+            <a:off x="2495241" y="609600"/>
+            <a:ext cx="4153518" cy="4925646"/>
             <a:chOff x="1143000" y="713154"/>
             <a:chExt cx="4580238" cy="5431692"/>
           </a:xfrm>
@@ -5396,42 +5248,6 @@
       </p:grpSp>
       <p:sp>
         <p:nvSpPr>
-          <p:cNvPr id="12" name="TextBox 11">
-            <a:extLst>
-              <a:ext uri="{FF2B5EF4-FFF2-40B4-BE49-F238E27FC236}">
-                <a16:creationId xmlns:a16="http://schemas.microsoft.com/office/drawing/2014/main" id="{6F47644D-4FE7-4674-9EFA-0ACF336A3139}"/>
-              </a:ext>
-            </a:extLst>
-          </p:cNvPr>
-          <p:cNvSpPr txBox="1"/>
-          <p:nvPr/>
-        </p:nvSpPr>
-        <p:spPr>
-          <a:xfrm>
-            <a:off x="457200" y="4191000"/>
-            <a:ext cx="1600200" cy="923330"/>
-          </a:xfrm>
-          <a:prstGeom prst="rect">
-            <a:avLst/>
-          </a:prstGeom>
-          <a:noFill/>
-        </p:spPr>
-        <p:txBody>
-          <a:bodyPr wrap="square" rtlCol="0">
-            <a:spAutoFit/>
-          </a:bodyPr>
-          <a:lstStyle/>
-          <a:p>
-            <a:pPr algn="r"/>
-            <a:r>
-              <a:rPr lang="en-US" dirty="0"/>
-              <a:t>Use your mouse to draw around pets</a:t>
-            </a:r>
-          </a:p>
-        </p:txBody>
-      </p:sp>
-      <p:sp>
-        <p:nvSpPr>
           <p:cNvPr id="3" name="Rectangle: Rounded Corners 2">
             <a:extLst>
               <a:ext uri="{FF2B5EF4-FFF2-40B4-BE49-F238E27FC236}">
@@ -5444,8 +5260,8 @@
         </p:nvSpPr>
         <p:spPr>
           <a:xfrm>
-            <a:off x="2133600" y="1277244"/>
-            <a:ext cx="4073652" cy="347472"/>
+            <a:off x="4800600" y="1117002"/>
+            <a:ext cx="345505" cy="315100"/>
           </a:xfrm>
           <a:prstGeom prst="roundRect">
             <a:avLst/>
@@ -5486,10 +5302,406 @@
       </p:sp>
       <p:sp>
         <p:nvSpPr>
-          <p:cNvPr id="17" name="TextBox 16">
+          <p:cNvPr id="11" name="Rectangle: Rounded Corners 2">
             <a:extLst>
               <a:ext uri="{FF2B5EF4-FFF2-40B4-BE49-F238E27FC236}">
-                <a16:creationId xmlns:a16="http://schemas.microsoft.com/office/drawing/2014/main" id="{73EE9E0F-26C6-EF4F-B325-A679FD21FDC5}"/>
+                <a16:creationId xmlns:a16="http://schemas.microsoft.com/office/drawing/2014/main" id="{C1D84F47-3C60-8845-ACA4-F352E64A0D66}"/>
+              </a:ext>
+            </a:extLst>
+          </p:cNvPr>
+          <p:cNvSpPr/>
+          <p:nvPr/>
+        </p:nvSpPr>
+        <p:spPr>
+          <a:xfrm>
+            <a:off x="3827844" y="4761864"/>
+            <a:ext cx="1488311" cy="271960"/>
+          </a:xfrm>
+          <a:prstGeom prst="roundRect">
+            <a:avLst/>
+          </a:prstGeom>
+          <a:noFill/>
+          <a:ln w="28575" cap="flat" cmpd="sng" algn="ctr">
+            <a:solidFill>
+              <a:srgbClr val="FF0000"/>
+            </a:solidFill>
+            <a:prstDash val="solid"/>
+            <a:round/>
+            <a:headEnd type="none" w="med" len="med"/>
+            <a:tailEnd type="none" w="med" len="med"/>
+          </a:ln>
+        </p:spPr>
+        <p:style>
+          <a:lnRef idx="0">
+            <a:scrgbClr r="0" g="0" b="0"/>
+          </a:lnRef>
+          <a:fillRef idx="0">
+            <a:scrgbClr r="0" g="0" b="0"/>
+          </a:fillRef>
+          <a:effectRef idx="0">
+            <a:scrgbClr r="0" g="0" b="0"/>
+          </a:effectRef>
+          <a:fontRef idx="minor">
+            <a:schemeClr val="accent2"/>
+          </a:fontRef>
+        </p:style>
+        <p:txBody>
+          <a:bodyPr rtlCol="0" anchor="ctr"/>
+          <a:lstStyle/>
+          <a:p>
+            <a:pPr algn="ctr"/>
+            <a:endParaRPr lang="en-US"/>
+          </a:p>
+        </p:txBody>
+      </p:sp>
+      <p:sp>
+        <p:nvSpPr>
+          <p:cNvPr id="15" name="Rectangle: Rounded Corners 2">
+            <a:extLst>
+              <a:ext uri="{FF2B5EF4-FFF2-40B4-BE49-F238E27FC236}">
+                <a16:creationId xmlns:a16="http://schemas.microsoft.com/office/drawing/2014/main" id="{C65B7D6D-19C2-FA49-9115-59A033D0170D}"/>
+              </a:ext>
+            </a:extLst>
+          </p:cNvPr>
+          <p:cNvSpPr/>
+          <p:nvPr/>
+        </p:nvSpPr>
+        <p:spPr>
+          <a:xfrm>
+            <a:off x="2590800" y="5154438"/>
+            <a:ext cx="710397" cy="266372"/>
+          </a:xfrm>
+          <a:prstGeom prst="roundRect">
+            <a:avLst/>
+          </a:prstGeom>
+          <a:noFill/>
+          <a:ln w="28575" cap="flat" cmpd="sng" algn="ctr">
+            <a:solidFill>
+              <a:srgbClr val="FF0000"/>
+            </a:solidFill>
+            <a:prstDash val="solid"/>
+            <a:round/>
+            <a:headEnd type="none" w="med" len="med"/>
+            <a:tailEnd type="none" w="med" len="med"/>
+          </a:ln>
+        </p:spPr>
+        <p:style>
+          <a:lnRef idx="0">
+            <a:scrgbClr r="0" g="0" b="0"/>
+          </a:lnRef>
+          <a:fillRef idx="0">
+            <a:scrgbClr r="0" g="0" b="0"/>
+          </a:fillRef>
+          <a:effectRef idx="0">
+            <a:scrgbClr r="0" g="0" b="0"/>
+          </a:effectRef>
+          <a:fontRef idx="minor">
+            <a:schemeClr val="accent2"/>
+          </a:fontRef>
+        </p:style>
+        <p:txBody>
+          <a:bodyPr rtlCol="0" anchor="ctr"/>
+          <a:lstStyle/>
+          <a:p>
+            <a:pPr algn="ctr"/>
+            <a:endParaRPr lang="en-US"/>
+          </a:p>
+        </p:txBody>
+      </p:sp>
+      <p:sp>
+        <p:nvSpPr>
+          <p:cNvPr id="16" name="Rectangle: Rounded Corners 2">
+            <a:extLst>
+              <a:ext uri="{FF2B5EF4-FFF2-40B4-BE49-F238E27FC236}">
+                <a16:creationId xmlns:a16="http://schemas.microsoft.com/office/drawing/2014/main" id="{CFCAE196-F540-A14A-AEFA-12F306FB8D08}"/>
+              </a:ext>
+            </a:extLst>
+          </p:cNvPr>
+          <p:cNvSpPr/>
+          <p:nvPr/>
+        </p:nvSpPr>
+        <p:spPr>
+          <a:xfrm>
+            <a:off x="6014012" y="5143828"/>
+            <a:ext cx="558346" cy="266372"/>
+          </a:xfrm>
+          <a:prstGeom prst="roundRect">
+            <a:avLst/>
+          </a:prstGeom>
+          <a:noFill/>
+          <a:ln w="28575" cap="flat" cmpd="sng" algn="ctr">
+            <a:solidFill>
+              <a:srgbClr val="FF0000"/>
+            </a:solidFill>
+            <a:prstDash val="solid"/>
+            <a:round/>
+            <a:headEnd type="none" w="med" len="med"/>
+            <a:tailEnd type="none" w="med" len="med"/>
+          </a:ln>
+        </p:spPr>
+        <p:style>
+          <a:lnRef idx="0">
+            <a:scrgbClr r="0" g="0" b="0"/>
+          </a:lnRef>
+          <a:fillRef idx="0">
+            <a:scrgbClr r="0" g="0" b="0"/>
+          </a:fillRef>
+          <a:effectRef idx="0">
+            <a:scrgbClr r="0" g="0" b="0"/>
+          </a:effectRef>
+          <a:fontRef idx="minor">
+            <a:schemeClr val="accent2"/>
+          </a:fontRef>
+        </p:style>
+        <p:txBody>
+          <a:bodyPr rtlCol="0" anchor="ctr"/>
+          <a:lstStyle/>
+          <a:p>
+            <a:pPr algn="ctr"/>
+            <a:endParaRPr lang="en-US"/>
+          </a:p>
+        </p:txBody>
+      </p:sp>
+      <p:cxnSp>
+        <p:nvCxnSpPr>
+          <p:cNvPr id="19" name="Straight Arrow Connector 18">
+            <a:extLst>
+              <a:ext uri="{FF2B5EF4-FFF2-40B4-BE49-F238E27FC236}">
+                <a16:creationId xmlns:a16="http://schemas.microsoft.com/office/drawing/2014/main" id="{3A701C03-A1DB-D747-AF6F-1D71503F3993}"/>
+              </a:ext>
+            </a:extLst>
+          </p:cNvPr>
+          <p:cNvCxnSpPr>
+            <a:cxnSpLocks/>
+            <a:stCxn id="14" idx="1"/>
+            <a:endCxn id="15" idx="2"/>
+          </p:cNvCxnSpPr>
+          <p:nvPr/>
+        </p:nvCxnSpPr>
+        <p:spPr>
+          <a:xfrm flipH="1" flipV="1">
+            <a:off x="2945999" y="5420810"/>
+            <a:ext cx="402812" cy="605076"/>
+          </a:xfrm>
+          <a:prstGeom prst="straightConnector1">
+            <a:avLst/>
+          </a:prstGeom>
+          <a:ln w="38100">
+            <a:solidFill>
+              <a:srgbClr val="FF0000"/>
+            </a:solidFill>
+            <a:headEnd type="oval" w="med" len="med"/>
+            <a:tailEnd type="triangle" w="med" len="med"/>
+          </a:ln>
+        </p:spPr>
+        <p:style>
+          <a:lnRef idx="1">
+            <a:schemeClr val="accent1"/>
+          </a:lnRef>
+          <a:fillRef idx="0">
+            <a:schemeClr val="accent1"/>
+          </a:fillRef>
+          <a:effectRef idx="0">
+            <a:schemeClr val="accent1"/>
+          </a:effectRef>
+          <a:fontRef idx="minor">
+            <a:schemeClr val="tx1"/>
+          </a:fontRef>
+        </p:style>
+      </p:cxnSp>
+      <p:cxnSp>
+        <p:nvCxnSpPr>
+          <p:cNvPr id="20" name="Straight Arrow Connector 19">
+            <a:extLst>
+              <a:ext uri="{FF2B5EF4-FFF2-40B4-BE49-F238E27FC236}">
+                <a16:creationId xmlns:a16="http://schemas.microsoft.com/office/drawing/2014/main" id="{A105CC71-5BBE-AF4E-9682-4D60441E4679}"/>
+              </a:ext>
+            </a:extLst>
+          </p:cNvPr>
+          <p:cNvCxnSpPr>
+            <a:cxnSpLocks/>
+            <a:stCxn id="14" idx="3"/>
+            <a:endCxn id="16" idx="2"/>
+          </p:cNvCxnSpPr>
+          <p:nvPr/>
+        </p:nvCxnSpPr>
+        <p:spPr>
+          <a:xfrm flipV="1">
+            <a:off x="5795189" y="5410200"/>
+            <a:ext cx="497996" cy="615686"/>
+          </a:xfrm>
+          <a:prstGeom prst="straightConnector1">
+            <a:avLst/>
+          </a:prstGeom>
+          <a:ln w="38100">
+            <a:solidFill>
+              <a:srgbClr val="FF0000"/>
+            </a:solidFill>
+            <a:headEnd type="oval" w="med" len="med"/>
+            <a:tailEnd type="triangle" w="med" len="med"/>
+          </a:ln>
+        </p:spPr>
+        <p:style>
+          <a:lnRef idx="1">
+            <a:schemeClr val="accent1"/>
+          </a:lnRef>
+          <a:fillRef idx="0">
+            <a:schemeClr val="accent1"/>
+          </a:fillRef>
+          <a:effectRef idx="0">
+            <a:schemeClr val="accent1"/>
+          </a:effectRef>
+          <a:fontRef idx="minor">
+            <a:schemeClr val="tx1"/>
+          </a:fontRef>
+        </p:style>
+      </p:cxnSp>
+      <p:cxnSp>
+        <p:nvCxnSpPr>
+          <p:cNvPr id="22" name="Straight Arrow Connector 21">
+            <a:extLst>
+              <a:ext uri="{FF2B5EF4-FFF2-40B4-BE49-F238E27FC236}">
+                <a16:creationId xmlns:a16="http://schemas.microsoft.com/office/drawing/2014/main" id="{F86744D9-F79F-0646-8E1D-1D76CBC95CB6}"/>
+              </a:ext>
+            </a:extLst>
+          </p:cNvPr>
+          <p:cNvCxnSpPr>
+            <a:cxnSpLocks/>
+            <a:stCxn id="12" idx="3"/>
+          </p:cNvCxnSpPr>
+          <p:nvPr/>
+        </p:nvCxnSpPr>
+        <p:spPr>
+          <a:xfrm>
+            <a:off x="2903239" y="3429000"/>
+            <a:ext cx="924605" cy="388963"/>
+          </a:xfrm>
+          <a:prstGeom prst="straightConnector1">
+            <a:avLst/>
+          </a:prstGeom>
+          <a:ln w="38100">
+            <a:solidFill>
+              <a:srgbClr val="FF0000"/>
+            </a:solidFill>
+            <a:headEnd type="oval" w="med" len="med"/>
+            <a:tailEnd type="triangle" w="med" len="med"/>
+          </a:ln>
+        </p:spPr>
+        <p:style>
+          <a:lnRef idx="1">
+            <a:schemeClr val="accent1"/>
+          </a:lnRef>
+          <a:fillRef idx="0">
+            <a:schemeClr val="accent1"/>
+          </a:fillRef>
+          <a:effectRef idx="0">
+            <a:schemeClr val="accent1"/>
+          </a:effectRef>
+          <a:fontRef idx="minor">
+            <a:schemeClr val="tx1"/>
+          </a:fontRef>
+        </p:style>
+      </p:cxnSp>
+      <p:cxnSp>
+        <p:nvCxnSpPr>
+          <p:cNvPr id="27" name="Straight Arrow Connector 26">
+            <a:extLst>
+              <a:ext uri="{FF2B5EF4-FFF2-40B4-BE49-F238E27FC236}">
+                <a16:creationId xmlns:a16="http://schemas.microsoft.com/office/drawing/2014/main" id="{666C7A61-1F78-6F41-AD7B-51A45153023D}"/>
+              </a:ext>
+            </a:extLst>
+          </p:cNvPr>
+          <p:cNvCxnSpPr>
+            <a:cxnSpLocks/>
+            <a:stCxn id="9" idx="1"/>
+            <a:endCxn id="11" idx="3"/>
+          </p:cNvCxnSpPr>
+          <p:nvPr/>
+        </p:nvCxnSpPr>
+        <p:spPr>
+          <a:xfrm flipH="1">
+            <a:off x="5316155" y="4561499"/>
+            <a:ext cx="1428508" cy="336345"/>
+          </a:xfrm>
+          <a:prstGeom prst="straightConnector1">
+            <a:avLst/>
+          </a:prstGeom>
+          <a:ln w="38100">
+            <a:solidFill>
+              <a:srgbClr val="FF0000"/>
+            </a:solidFill>
+            <a:headEnd type="oval" w="med" len="med"/>
+            <a:tailEnd type="triangle" w="med" len="med"/>
+          </a:ln>
+        </p:spPr>
+        <p:style>
+          <a:lnRef idx="1">
+            <a:schemeClr val="accent1"/>
+          </a:lnRef>
+          <a:fillRef idx="0">
+            <a:schemeClr val="accent1"/>
+          </a:fillRef>
+          <a:effectRef idx="0">
+            <a:schemeClr val="accent1"/>
+          </a:effectRef>
+          <a:fontRef idx="minor">
+            <a:schemeClr val="tx1"/>
+          </a:fontRef>
+        </p:style>
+      </p:cxnSp>
+      <p:cxnSp>
+        <p:nvCxnSpPr>
+          <p:cNvPr id="30" name="Straight Arrow Connector 29">
+            <a:extLst>
+              <a:ext uri="{FF2B5EF4-FFF2-40B4-BE49-F238E27FC236}">
+                <a16:creationId xmlns:a16="http://schemas.microsoft.com/office/drawing/2014/main" id="{6D307917-5EE8-FC40-A570-6B50612A3BF1}"/>
+              </a:ext>
+            </a:extLst>
+          </p:cNvPr>
+          <p:cNvCxnSpPr>
+            <a:cxnSpLocks/>
+            <a:stCxn id="17" idx="1"/>
+            <a:endCxn id="3" idx="3"/>
+          </p:cNvCxnSpPr>
+          <p:nvPr/>
+        </p:nvCxnSpPr>
+        <p:spPr>
+          <a:xfrm flipH="1" flipV="1">
+            <a:off x="5146105" y="1274552"/>
+            <a:ext cx="1227074" cy="600888"/>
+          </a:xfrm>
+          <a:prstGeom prst="straightConnector1">
+            <a:avLst/>
+          </a:prstGeom>
+          <a:ln w="38100">
+            <a:solidFill>
+              <a:srgbClr val="FF0000"/>
+            </a:solidFill>
+            <a:headEnd type="oval" w="med" len="med"/>
+            <a:tailEnd type="triangle" w="med" len="med"/>
+          </a:ln>
+        </p:spPr>
+        <p:style>
+          <a:lnRef idx="1">
+            <a:schemeClr val="accent1"/>
+          </a:lnRef>
+          <a:fillRef idx="0">
+            <a:schemeClr val="accent1"/>
+          </a:fillRef>
+          <a:effectRef idx="0">
+            <a:schemeClr val="accent1"/>
+          </a:effectRef>
+          <a:fontRef idx="minor">
+            <a:schemeClr val="tx1"/>
+          </a:fontRef>
+        </p:style>
+      </p:cxnSp>
+      <p:sp>
+        <p:nvSpPr>
+          <p:cNvPr id="12" name="TextBox 11">
+            <a:extLst>
+              <a:ext uri="{FF2B5EF4-FFF2-40B4-BE49-F238E27FC236}">
+                <a16:creationId xmlns:a16="http://schemas.microsoft.com/office/drawing/2014/main" id="{6F47644D-4FE7-4674-9EFA-0ACF336A3139}"/>
               </a:ext>
             </a:extLst>
           </p:cNvPr>
@@ -5498,13 +5710,20 @@
         </p:nvSpPr>
         <p:spPr>
           <a:xfrm>
-            <a:off x="6629400" y="1143000"/>
-            <a:ext cx="1932621" cy="646331"/>
+            <a:off x="815454" y="2828835"/>
+            <a:ext cx="2087785" cy="1200329"/>
           </a:xfrm>
           <a:prstGeom prst="rect">
             <a:avLst/>
           </a:prstGeom>
-          <a:noFill/>
+          <a:solidFill>
+            <a:schemeClr val="bg1"/>
+          </a:solidFill>
+          <a:ln>
+            <a:solidFill>
+              <a:srgbClr val="FF0000"/>
+            </a:solidFill>
+          </a:ln>
         </p:spPr>
         <p:txBody>
           <a:bodyPr wrap="square" rtlCol="0">
@@ -5512,9 +5731,157 @@
           </a:bodyPr>
           <a:lstStyle/>
           <a:p>
+            <a:pPr algn="r"/>
+            <a:r>
+              <a:rPr lang="en-US" i="1" dirty="0">
+                <a:highlight>
+                  <a:srgbClr val="FFFF00"/>
+                </a:highlight>
+              </a:rPr>
+              <a:t>Right-click and drag</a:t>
+            </a:r>
             <a:r>
               <a:rPr lang="en-US" dirty="0"/>
-              <a:t>Select the specified pet</a:t>
+              <a:t> your mouse to select areas that represent pets.</a:t>
+            </a:r>
+          </a:p>
+        </p:txBody>
+      </p:sp>
+      <p:sp>
+        <p:nvSpPr>
+          <p:cNvPr id="17" name="TextBox 16">
+            <a:extLst>
+              <a:ext uri="{FF2B5EF4-FFF2-40B4-BE49-F238E27FC236}">
+                <a16:creationId xmlns:a16="http://schemas.microsoft.com/office/drawing/2014/main" id="{73EE9E0F-26C6-EF4F-B325-A679FD21FDC5}"/>
+              </a:ext>
+            </a:extLst>
+          </p:cNvPr>
+          <p:cNvSpPr txBox="1"/>
+          <p:nvPr/>
+        </p:nvSpPr>
+        <p:spPr>
+          <a:xfrm>
+            <a:off x="6373179" y="1413775"/>
+            <a:ext cx="1932621" cy="923330"/>
+          </a:xfrm>
+          <a:prstGeom prst="rect">
+            <a:avLst/>
+          </a:prstGeom>
+          <a:solidFill>
+            <a:schemeClr val="bg1"/>
+          </a:solidFill>
+          <a:ln>
+            <a:solidFill>
+              <a:srgbClr val="FF0000"/>
+            </a:solidFill>
+          </a:ln>
+        </p:spPr>
+        <p:txBody>
+          <a:bodyPr wrap="square" rtlCol="0">
+            <a:spAutoFit/>
+          </a:bodyPr>
+          <a:lstStyle/>
+          <a:p>
+            <a:r>
+              <a:rPr lang="en-US" dirty="0"/>
+              <a:t>Select all areas related to the specified pet</a:t>
+            </a:r>
+          </a:p>
+        </p:txBody>
+      </p:sp>
+      <p:sp>
+        <p:nvSpPr>
+          <p:cNvPr id="9" name="TextBox 8">
+            <a:extLst>
+              <a:ext uri="{FF2B5EF4-FFF2-40B4-BE49-F238E27FC236}">
+                <a16:creationId xmlns:a16="http://schemas.microsoft.com/office/drawing/2014/main" id="{2CA26FCD-AE52-B647-98B5-26A8D1CD87F4}"/>
+              </a:ext>
+            </a:extLst>
+          </p:cNvPr>
+          <p:cNvSpPr txBox="1"/>
+          <p:nvPr/>
+        </p:nvSpPr>
+        <p:spPr>
+          <a:xfrm>
+            <a:off x="6744663" y="3822835"/>
+            <a:ext cx="1561137" cy="1477328"/>
+          </a:xfrm>
+          <a:prstGeom prst="rect">
+            <a:avLst/>
+          </a:prstGeom>
+          <a:solidFill>
+            <a:schemeClr val="bg1"/>
+          </a:solidFill>
+          <a:ln>
+            <a:solidFill>
+              <a:srgbClr val="FF0000"/>
+            </a:solidFill>
+          </a:ln>
+        </p:spPr>
+        <p:txBody>
+          <a:bodyPr wrap="square" rtlCol="0">
+            <a:spAutoFit/>
+          </a:bodyPr>
+          <a:lstStyle/>
+          <a:p>
+            <a:r>
+              <a:rPr lang="en-US" dirty="0"/>
+              <a:t>If you make a mistake, click </a:t>
+            </a:r>
+            <a:r>
+              <a:rPr lang="en-US" dirty="0">
+                <a:highlight>
+                  <a:srgbClr val="FFFF00"/>
+                </a:highlight>
+              </a:rPr>
+              <a:t>clear selection</a:t>
+            </a:r>
+            <a:r>
+              <a:rPr lang="en-US" dirty="0"/>
+              <a:t> to start fresh on this image.</a:t>
+            </a:r>
+          </a:p>
+        </p:txBody>
+      </p:sp>
+      <p:sp>
+        <p:nvSpPr>
+          <p:cNvPr id="14" name="TextBox 13">
+            <a:extLst>
+              <a:ext uri="{FF2B5EF4-FFF2-40B4-BE49-F238E27FC236}">
+                <a16:creationId xmlns:a16="http://schemas.microsoft.com/office/drawing/2014/main" id="{2A935BFB-B42D-6143-820C-C1F99D969216}"/>
+              </a:ext>
+            </a:extLst>
+          </p:cNvPr>
+          <p:cNvSpPr txBox="1"/>
+          <p:nvPr/>
+        </p:nvSpPr>
+        <p:spPr>
+          <a:xfrm>
+            <a:off x="3348811" y="5702720"/>
+            <a:ext cx="2446378" cy="646331"/>
+          </a:xfrm>
+          <a:prstGeom prst="rect">
+            <a:avLst/>
+          </a:prstGeom>
+          <a:solidFill>
+            <a:schemeClr val="bg1"/>
+          </a:solidFill>
+          <a:ln>
+            <a:solidFill>
+              <a:srgbClr val="FF0000"/>
+            </a:solidFill>
+          </a:ln>
+        </p:spPr>
+        <p:txBody>
+          <a:bodyPr wrap="square" rtlCol="0">
+            <a:spAutoFit/>
+          </a:bodyPr>
+          <a:lstStyle/>
+          <a:p>
+            <a:pPr algn="ctr"/>
+            <a:r>
+              <a:rPr lang="en-US" dirty="0"/>
+              <a:t>Click to navigate through your image set.</a:t>
             </a:r>
           </a:p>
         </p:txBody>
@@ -5533,7 +5900,7 @@
 </file>
 
 <file path=ppt/slides/slide7.xml><?xml version="1.0" encoding="utf-8"?>
-<p:sld xmlns:a="http://schemas.openxmlformats.org/drawingml/2006/main" xmlns:r="http://schemas.openxmlformats.org/officeDocument/2006/relationships" xmlns:p="http://schemas.openxmlformats.org/presentationml/2006/main">
+<p:sld xmlns:a="http://schemas.openxmlformats.org/drawingml/2006/main" xmlns:r="http://schemas.openxmlformats.org/officeDocument/2006/relationships" xmlns:p="http://schemas.openxmlformats.org/presentationml/2006/main" show="0">
   <p:cSld>
     <p:spTree>
       <p:nvGrpSpPr>
@@ -5563,7 +5930,7 @@
         </p:nvGrpSpPr>
         <p:grpSpPr>
           <a:xfrm>
-            <a:off x="2924746" y="647700"/>
+            <a:off x="1400747" y="647700"/>
             <a:ext cx="4690625" cy="5562600"/>
             <a:chOff x="3124200" y="609600"/>
             <a:chExt cx="4883390" cy="5791200"/>
@@ -5690,7 +6057,7 @@
         </p:nvSpPr>
         <p:spPr>
           <a:xfrm>
-            <a:off x="7757632" y="1130352"/>
+            <a:off x="6233632" y="1130352"/>
             <a:ext cx="1509622" cy="923330"/>
           </a:xfrm>
           <a:prstGeom prst="rect">
@@ -5731,7 +6098,7 @@
         </p:nvSpPr>
         <p:spPr>
           <a:xfrm>
-            <a:off x="6694383" y="647701"/>
+            <a:off x="5170383" y="647701"/>
             <a:ext cx="838200" cy="457200"/>
           </a:xfrm>
           <a:prstGeom prst="roundRect">
@@ -5789,7 +6156,7 @@
         </p:nvCxnSpPr>
         <p:spPr>
           <a:xfrm>
-            <a:off x="7532583" y="876301"/>
+            <a:off x="6008584" y="876301"/>
             <a:ext cx="225049" cy="715716"/>
           </a:xfrm>
           <a:prstGeom prst="straightConnector1">
@@ -5869,7 +6236,7 @@
         </p:blipFill>
         <p:spPr>
           <a:xfrm>
-            <a:off x="2262559" y="1351088"/>
+            <a:off x="738559" y="1351088"/>
             <a:ext cx="5973916" cy="3905578"/>
           </a:xfrm>
           <a:prstGeom prst="rect">
@@ -5894,7 +6261,7 @@
         </p:nvCxnSpPr>
         <p:spPr>
           <a:xfrm flipV="1">
-            <a:off x="5106924" y="1162976"/>
+            <a:off x="3582924" y="1162977"/>
             <a:ext cx="0" cy="686225"/>
           </a:xfrm>
           <a:prstGeom prst="straightConnector1">
@@ -5936,7 +6303,7 @@
         </p:nvSpPr>
         <p:spPr>
           <a:xfrm>
-            <a:off x="2386584" y="516645"/>
+            <a:off x="862584" y="516646"/>
             <a:ext cx="5440680" cy="646331"/>
           </a:xfrm>
           <a:prstGeom prst="rect">
@@ -5983,7 +6350,7 @@
         </p:nvSpPr>
         <p:spPr>
           <a:xfrm>
-            <a:off x="2262559" y="1849190"/>
+            <a:off x="738559" y="1849190"/>
             <a:ext cx="6038556" cy="339510"/>
           </a:xfrm>
           <a:prstGeom prst="roundRect">
@@ -6037,7 +6404,7 @@
         </p:nvSpPr>
         <p:spPr>
           <a:xfrm>
-            <a:off x="2262559" y="1351088"/>
+            <a:off x="738559" y="1351088"/>
             <a:ext cx="5973904" cy="4155824"/>
           </a:xfrm>
           <a:prstGeom prst="rect">
@@ -6082,7 +6449,7 @@
         </p:nvSpPr>
         <p:spPr>
           <a:xfrm>
-            <a:off x="3392424" y="2404872"/>
+            <a:off x="1868424" y="2404872"/>
             <a:ext cx="4690872" cy="2935224"/>
           </a:xfrm>
           <a:prstGeom prst="rect">
@@ -6138,7 +6505,7 @@
 <file path=ppt/theme/theme1.xml><?xml version="1.0" encoding="utf-8"?>
 <a:theme xmlns:a="http://schemas.openxmlformats.org/drawingml/2006/main" name="Office Theme">
   <a:themeElements>
-    <a:clrScheme name="Office">
+    <a:clrScheme name="Office Theme">
       <a:dk1>
         <a:sysClr val="windowText" lastClr="000000"/>
       </a:dk1>
@@ -6176,7 +6543,7 @@
         <a:srgbClr val="954F72"/>
       </a:folHlink>
     </a:clrScheme>
-    <a:fontScheme name="Office">
+    <a:fontScheme name="Office Theme">
       <a:majorFont>
         <a:latin typeface="Calibri Light" panose="020F0302020204030204"/>
         <a:ea typeface=""/>
@@ -6211,23 +6578,6 @@
         <a:font script="Viet" typeface="Times New Roman"/>
         <a:font script="Uigh" typeface="Microsoft Uighur"/>
         <a:font script="Geor" typeface="Sylfaen"/>
-        <a:font script="Armn" typeface="Arial"/>
-        <a:font script="Bugi" typeface="Leelawadee UI"/>
-        <a:font script="Bopo" typeface="Microsoft JhengHei"/>
-        <a:font script="Java" typeface="Javanese Text"/>
-        <a:font script="Lisu" typeface="Segoe UI"/>
-        <a:font script="Mymr" typeface="Myanmar Text"/>
-        <a:font script="Nkoo" typeface="Ebrima"/>
-        <a:font script="Olck" typeface="Nirmala UI"/>
-        <a:font script="Osma" typeface="Ebrima"/>
-        <a:font script="Phag" typeface="Phagspa"/>
-        <a:font script="Syrn" typeface="Estrangelo Edessa"/>
-        <a:font script="Syrj" typeface="Estrangelo Edessa"/>
-        <a:font script="Syre" typeface="Estrangelo Edessa"/>
-        <a:font script="Sora" typeface="Nirmala UI"/>
-        <a:font script="Tale" typeface="Microsoft Tai Le"/>
-        <a:font script="Talu" typeface="Microsoft New Tai Lue"/>
-        <a:font script="Tfng" typeface="Ebrima"/>
       </a:majorFont>
       <a:minorFont>
         <a:latin typeface="Calibri" panose="020F0502020204030204"/>
@@ -6263,26 +6613,9 @@
         <a:font script="Viet" typeface="Arial"/>
         <a:font script="Uigh" typeface="Microsoft Uighur"/>
         <a:font script="Geor" typeface="Sylfaen"/>
-        <a:font script="Armn" typeface="Arial"/>
-        <a:font script="Bugi" typeface="Leelawadee UI"/>
-        <a:font script="Bopo" typeface="Microsoft JhengHei"/>
-        <a:font script="Java" typeface="Javanese Text"/>
-        <a:font script="Lisu" typeface="Segoe UI"/>
-        <a:font script="Mymr" typeface="Myanmar Text"/>
-        <a:font script="Nkoo" typeface="Ebrima"/>
-        <a:font script="Olck" typeface="Nirmala UI"/>
-        <a:font script="Osma" typeface="Ebrima"/>
-        <a:font script="Phag" typeface="Phagspa"/>
-        <a:font script="Syrn" typeface="Estrangelo Edessa"/>
-        <a:font script="Syrj" typeface="Estrangelo Edessa"/>
-        <a:font script="Syre" typeface="Estrangelo Edessa"/>
-        <a:font script="Sora" typeface="Nirmala UI"/>
-        <a:font script="Tale" typeface="Microsoft Tai Le"/>
-        <a:font script="Talu" typeface="Microsoft New Tai Lue"/>
-        <a:font script="Tfng" typeface="Ebrima"/>
       </a:minorFont>
     </a:fontScheme>
-    <a:fmtScheme name="Office">
+    <a:fmtScheme name="Office Theme">
       <a:fillStyleLst>
         <a:solidFill>
           <a:schemeClr val="phClr"/>

</xml_diff>

<commit_message>
Text Annotation Tutorial - v1
</commit_message>
<xml_diff>
--- a/user-study/instructions/Instructions.pptx
+++ b/user-study/instructions/Instructions.pptx
@@ -16,6 +16,9 @@
     <p:sldId id="267" r:id="rId10"/>
     <p:sldId id="268" r:id="rId11"/>
     <p:sldId id="271" r:id="rId12"/>
+    <p:sldId id="272" r:id="rId13"/>
+    <p:sldId id="274" r:id="rId14"/>
+    <p:sldId id="273" r:id="rId15"/>
   </p:sldIdLst>
   <p:sldSz cx="9144000" cy="6858000" type="screen4x3"/>
   <p:notesSz cx="6858000" cy="9144000"/>
@@ -264,7 +267,7 @@
           <a:p>
             <a:fld id="{D98ADB59-0FC3-4F23-98C1-896570F2CCB9}" type="datetimeFigureOut">
               <a:rPr lang="en-US" smtClean="0"/>
-              <a:t>5/20/20</a:t>
+              <a:t>5/21/20</a:t>
             </a:fld>
             <a:endParaRPr lang="en-US"/>
           </a:p>
@@ -434,7 +437,7 @@
           <a:p>
             <a:fld id="{D98ADB59-0FC3-4F23-98C1-896570F2CCB9}" type="datetimeFigureOut">
               <a:rPr lang="en-US" smtClean="0"/>
-              <a:t>5/20/20</a:t>
+              <a:t>5/21/20</a:t>
             </a:fld>
             <a:endParaRPr lang="en-US"/>
           </a:p>
@@ -614,7 +617,7 @@
           <a:p>
             <a:fld id="{D98ADB59-0FC3-4F23-98C1-896570F2CCB9}" type="datetimeFigureOut">
               <a:rPr lang="en-US" smtClean="0"/>
-              <a:t>5/20/20</a:t>
+              <a:t>5/21/20</a:t>
             </a:fld>
             <a:endParaRPr lang="en-US"/>
           </a:p>
@@ -784,7 +787,7 @@
           <a:p>
             <a:fld id="{D98ADB59-0FC3-4F23-98C1-896570F2CCB9}" type="datetimeFigureOut">
               <a:rPr lang="en-US" smtClean="0"/>
-              <a:t>5/20/20</a:t>
+              <a:t>5/21/20</a:t>
             </a:fld>
             <a:endParaRPr lang="en-US"/>
           </a:p>
@@ -1028,7 +1031,7 @@
           <a:p>
             <a:fld id="{D98ADB59-0FC3-4F23-98C1-896570F2CCB9}" type="datetimeFigureOut">
               <a:rPr lang="en-US" smtClean="0"/>
-              <a:t>5/20/20</a:t>
+              <a:t>5/21/20</a:t>
             </a:fld>
             <a:endParaRPr lang="en-US"/>
           </a:p>
@@ -1260,7 +1263,7 @@
           <a:p>
             <a:fld id="{D98ADB59-0FC3-4F23-98C1-896570F2CCB9}" type="datetimeFigureOut">
               <a:rPr lang="en-US" smtClean="0"/>
-              <a:t>5/20/20</a:t>
+              <a:t>5/21/20</a:t>
             </a:fld>
             <a:endParaRPr lang="en-US"/>
           </a:p>
@@ -1627,7 +1630,7 @@
           <a:p>
             <a:fld id="{D98ADB59-0FC3-4F23-98C1-896570F2CCB9}" type="datetimeFigureOut">
               <a:rPr lang="en-US" smtClean="0"/>
-              <a:t>5/20/20</a:t>
+              <a:t>5/21/20</a:t>
             </a:fld>
             <a:endParaRPr lang="en-US"/>
           </a:p>
@@ -1745,7 +1748,7 @@
           <a:p>
             <a:fld id="{D98ADB59-0FC3-4F23-98C1-896570F2CCB9}" type="datetimeFigureOut">
               <a:rPr lang="en-US" smtClean="0"/>
-              <a:t>5/20/20</a:t>
+              <a:t>5/21/20</a:t>
             </a:fld>
             <a:endParaRPr lang="en-US"/>
           </a:p>
@@ -1840,7 +1843,7 @@
           <a:p>
             <a:fld id="{D98ADB59-0FC3-4F23-98C1-896570F2CCB9}" type="datetimeFigureOut">
               <a:rPr lang="en-US" smtClean="0"/>
-              <a:t>5/20/20</a:t>
+              <a:t>5/21/20</a:t>
             </a:fld>
             <a:endParaRPr lang="en-US"/>
           </a:p>
@@ -2117,7 +2120,7 @@
           <a:p>
             <a:fld id="{D98ADB59-0FC3-4F23-98C1-896570F2CCB9}" type="datetimeFigureOut">
               <a:rPr lang="en-US" smtClean="0"/>
-              <a:t>5/20/20</a:t>
+              <a:t>5/21/20</a:t>
             </a:fld>
             <a:endParaRPr lang="en-US"/>
           </a:p>
@@ -2374,7 +2377,7 @@
           <a:p>
             <a:fld id="{D98ADB59-0FC3-4F23-98C1-896570F2CCB9}" type="datetimeFigureOut">
               <a:rPr lang="en-US" smtClean="0"/>
-              <a:t>5/20/20</a:t>
+              <a:t>5/21/20</a:t>
             </a:fld>
             <a:endParaRPr lang="en-US"/>
           </a:p>
@@ -2587,7 +2590,7 @@
           <a:p>
             <a:fld id="{D98ADB59-0FC3-4F23-98C1-896570F2CCB9}" type="datetimeFigureOut">
               <a:rPr lang="en-US" smtClean="0"/>
-              <a:t>5/20/20</a:t>
+              <a:t>5/21/20</a:t>
             </a:fld>
             <a:endParaRPr lang="en-US"/>
           </a:p>
@@ -4006,6 +4009,1084 @@
 </p:sld>
 </file>
 
+<file path=ppt/slides/slide12.xml><?xml version="1.0" encoding="utf-8"?>
+<p:sld xmlns:a="http://schemas.openxmlformats.org/drawingml/2006/main" xmlns:r="http://schemas.openxmlformats.org/officeDocument/2006/relationships" xmlns:p="http://schemas.openxmlformats.org/presentationml/2006/main" show="0">
+  <p:cSld>
+    <p:spTree>
+      <p:nvGrpSpPr>
+        <p:cNvPr id="1" name=""/>
+        <p:cNvGrpSpPr/>
+        <p:nvPr/>
+      </p:nvGrpSpPr>
+      <p:grpSpPr>
+        <a:xfrm>
+          <a:off x="0" y="0"/>
+          <a:ext cx="0" cy="0"/>
+          <a:chOff x="0" y="0"/>
+          <a:chExt cx="0" cy="0"/>
+        </a:xfrm>
+      </p:grpSpPr>
+      <p:pic>
+        <p:nvPicPr>
+          <p:cNvPr id="10" name="Picture 9" descr="A screenshot of a cell phone&#10;&#10;Description automatically generated">
+            <a:extLst>
+              <a:ext uri="{FF2B5EF4-FFF2-40B4-BE49-F238E27FC236}">
+                <a16:creationId xmlns:a16="http://schemas.microsoft.com/office/drawing/2014/main" id="{00CEE1E0-DA5A-4242-9103-F1315B4DD6FB}"/>
+              </a:ext>
+            </a:extLst>
+          </p:cNvPr>
+          <p:cNvPicPr>
+            <a:picLocks noChangeAspect="1"/>
+          </p:cNvPicPr>
+          <p:nvPr/>
+        </p:nvPicPr>
+        <p:blipFill>
+          <a:blip r:embed="rId2">
+            <a:extLst>
+              <a:ext uri="{28A0092B-C50C-407E-A947-70E740481C1C}">
+                <a14:useLocalDpi xmlns:a14="http://schemas.microsoft.com/office/drawing/2010/main" val="0"/>
+              </a:ext>
+            </a:extLst>
+          </a:blip>
+          <a:stretch>
+            <a:fillRect/>
+          </a:stretch>
+        </p:blipFill>
+        <p:spPr>
+          <a:xfrm>
+            <a:off x="0" y="161745"/>
+            <a:ext cx="9144000" cy="6534509"/>
+          </a:xfrm>
+          <a:prstGeom prst="rect">
+            <a:avLst/>
+          </a:prstGeom>
+        </p:spPr>
+      </p:pic>
+      <p:cxnSp>
+        <p:nvCxnSpPr>
+          <p:cNvPr id="12" name="Straight Arrow Connector 11">
+            <a:extLst>
+              <a:ext uri="{FF2B5EF4-FFF2-40B4-BE49-F238E27FC236}">
+                <a16:creationId xmlns:a16="http://schemas.microsoft.com/office/drawing/2014/main" id="{052AE882-3CB1-F548-9F35-2795B744A93B}"/>
+              </a:ext>
+            </a:extLst>
+          </p:cNvPr>
+          <p:cNvCxnSpPr>
+            <a:cxnSpLocks/>
+            <a:stCxn id="13" idx="3"/>
+          </p:cNvCxnSpPr>
+          <p:nvPr/>
+        </p:nvCxnSpPr>
+        <p:spPr>
+          <a:xfrm flipH="1">
+            <a:off x="4572000" y="1114455"/>
+            <a:ext cx="381000" cy="409545"/>
+          </a:xfrm>
+          <a:prstGeom prst="straightConnector1">
+            <a:avLst/>
+          </a:prstGeom>
+          <a:ln w="38100">
+            <a:solidFill>
+              <a:srgbClr val="FF0000"/>
+            </a:solidFill>
+            <a:headEnd type="oval" w="med" len="med"/>
+            <a:tailEnd type="triangle" w="med" len="med"/>
+          </a:ln>
+        </p:spPr>
+        <p:style>
+          <a:lnRef idx="1">
+            <a:schemeClr val="accent1"/>
+          </a:lnRef>
+          <a:fillRef idx="0">
+            <a:schemeClr val="accent1"/>
+          </a:fillRef>
+          <a:effectRef idx="0">
+            <a:schemeClr val="accent1"/>
+          </a:effectRef>
+          <a:fontRef idx="minor">
+            <a:schemeClr val="tx1"/>
+          </a:fontRef>
+        </p:style>
+      </p:cxnSp>
+      <p:sp>
+        <p:nvSpPr>
+          <p:cNvPr id="13" name="TextBox 12">
+            <a:extLst>
+              <a:ext uri="{FF2B5EF4-FFF2-40B4-BE49-F238E27FC236}">
+                <a16:creationId xmlns:a16="http://schemas.microsoft.com/office/drawing/2014/main" id="{DCF78F1E-8DC6-0840-B1A2-6734D6B1DA1A}"/>
+              </a:ext>
+            </a:extLst>
+          </p:cNvPr>
+          <p:cNvSpPr txBox="1"/>
+          <p:nvPr/>
+        </p:nvSpPr>
+        <p:spPr>
+          <a:xfrm>
+            <a:off x="76200" y="914400"/>
+            <a:ext cx="4876800" cy="400110"/>
+          </a:xfrm>
+          <a:prstGeom prst="rect">
+            <a:avLst/>
+          </a:prstGeom>
+          <a:solidFill>
+            <a:schemeClr val="bg1"/>
+          </a:solidFill>
+          <a:ln>
+            <a:solidFill>
+              <a:srgbClr val="FF0000"/>
+            </a:solidFill>
+          </a:ln>
+        </p:spPr>
+        <p:style>
+          <a:lnRef idx="2">
+            <a:schemeClr val="accent2"/>
+          </a:lnRef>
+          <a:fillRef idx="1">
+            <a:schemeClr val="lt1"/>
+          </a:fillRef>
+          <a:effectRef idx="0">
+            <a:schemeClr val="accent2"/>
+          </a:effectRef>
+          <a:fontRef idx="minor">
+            <a:schemeClr val="dk1"/>
+          </a:fontRef>
+        </p:style>
+        <p:txBody>
+          <a:bodyPr wrap="square" rtlCol="0">
+            <a:spAutoFit/>
+          </a:bodyPr>
+          <a:lstStyle/>
+          <a:p>
+            <a:r>
+              <a:rPr lang="en-US" sz="2000" dirty="0"/>
+              <a:t>Select the </a:t>
+            </a:r>
+            <a:r>
+              <a:rPr lang="en-US" sz="2000" dirty="0">
+                <a:highlight>
+                  <a:srgbClr val="FFFF00"/>
+                </a:highlight>
+              </a:rPr>
+              <a:t>best words</a:t>
+            </a:r>
+            <a:r>
+              <a:rPr lang="en-US" sz="2000" dirty="0"/>
+              <a:t> that </a:t>
+            </a:r>
+            <a:r>
+              <a:rPr lang="en-US" sz="2000" dirty="0">
+                <a:highlight>
+                  <a:srgbClr val="FFFF00"/>
+                </a:highlight>
+              </a:rPr>
+              <a:t>describe the topic</a:t>
+            </a:r>
+            <a:r>
+              <a:rPr lang="en-US" sz="2000" dirty="0"/>
+              <a:t>:</a:t>
+            </a:r>
+          </a:p>
+        </p:txBody>
+      </p:sp>
+      <p:sp>
+        <p:nvSpPr>
+          <p:cNvPr id="19" name="Rectangle: Rounded Corners 2">
+            <a:extLst>
+              <a:ext uri="{FF2B5EF4-FFF2-40B4-BE49-F238E27FC236}">
+                <a16:creationId xmlns:a16="http://schemas.microsoft.com/office/drawing/2014/main" id="{04AA9D5B-5A7C-BA40-9000-DB9539A4AF07}"/>
+              </a:ext>
+            </a:extLst>
+          </p:cNvPr>
+          <p:cNvSpPr/>
+          <p:nvPr/>
+        </p:nvSpPr>
+        <p:spPr>
+          <a:xfrm>
+            <a:off x="1600200" y="2762491"/>
+            <a:ext cx="4495800" cy="1447800"/>
+          </a:xfrm>
+          <a:prstGeom prst="roundRect">
+            <a:avLst/>
+          </a:prstGeom>
+          <a:noFill/>
+          <a:ln w="28575" cap="flat" cmpd="sng" algn="ctr">
+            <a:solidFill>
+              <a:srgbClr val="FF0000"/>
+            </a:solidFill>
+            <a:prstDash val="solid"/>
+            <a:round/>
+            <a:headEnd type="none" w="med" len="med"/>
+            <a:tailEnd type="none" w="med" len="med"/>
+          </a:ln>
+        </p:spPr>
+        <p:style>
+          <a:lnRef idx="0">
+            <a:scrgbClr r="0" g="0" b="0"/>
+          </a:lnRef>
+          <a:fillRef idx="0">
+            <a:scrgbClr r="0" g="0" b="0"/>
+          </a:fillRef>
+          <a:effectRef idx="0">
+            <a:scrgbClr r="0" g="0" b="0"/>
+          </a:effectRef>
+          <a:fontRef idx="minor">
+            <a:schemeClr val="accent2"/>
+          </a:fontRef>
+        </p:style>
+        <p:txBody>
+          <a:bodyPr rtlCol="0" anchor="ctr"/>
+          <a:lstStyle/>
+          <a:p>
+            <a:pPr algn="ctr"/>
+            <a:endParaRPr lang="en-US"/>
+          </a:p>
+        </p:txBody>
+      </p:sp>
+    </p:spTree>
+    <p:extLst>
+      <p:ext uri="{BB962C8B-B14F-4D97-AF65-F5344CB8AC3E}">
+        <p14:creationId xmlns:p14="http://schemas.microsoft.com/office/powerpoint/2010/main" val="2902365164"/>
+      </p:ext>
+    </p:extLst>
+  </p:cSld>
+  <p:clrMapOvr>
+    <a:masterClrMapping/>
+  </p:clrMapOvr>
+</p:sld>
+</file>
+
+<file path=ppt/slides/slide13.xml><?xml version="1.0" encoding="utf-8"?>
+<p:sld xmlns:a="http://schemas.openxmlformats.org/drawingml/2006/main" xmlns:r="http://schemas.openxmlformats.org/officeDocument/2006/relationships" xmlns:p="http://schemas.openxmlformats.org/presentationml/2006/main">
+  <p:cSld>
+    <p:spTree>
+      <p:nvGrpSpPr>
+        <p:cNvPr id="1" name=""/>
+        <p:cNvGrpSpPr/>
+        <p:nvPr/>
+      </p:nvGrpSpPr>
+      <p:grpSpPr>
+        <a:xfrm>
+          <a:off x="0" y="0"/>
+          <a:ext cx="0" cy="0"/>
+          <a:chOff x="0" y="0"/>
+          <a:chExt cx="0" cy="0"/>
+        </a:xfrm>
+      </p:grpSpPr>
+      <p:pic>
+        <p:nvPicPr>
+          <p:cNvPr id="6" name="Picture 5" descr="A screenshot of a cell phone&#10;&#10;Description automatically generated">
+            <a:extLst>
+              <a:ext uri="{FF2B5EF4-FFF2-40B4-BE49-F238E27FC236}">
+                <a16:creationId xmlns:a16="http://schemas.microsoft.com/office/drawing/2014/main" id="{A2623446-7314-6E4F-9D6E-B42614D9FD24}"/>
+              </a:ext>
+            </a:extLst>
+          </p:cNvPr>
+          <p:cNvPicPr>
+            <a:picLocks noChangeAspect="1"/>
+          </p:cNvPicPr>
+          <p:nvPr/>
+        </p:nvPicPr>
+        <p:blipFill>
+          <a:blip r:embed="rId2">
+            <a:extLst>
+              <a:ext uri="{28A0092B-C50C-407E-A947-70E740481C1C}">
+                <a14:useLocalDpi xmlns:a14="http://schemas.microsoft.com/office/drawing/2010/main" val="0"/>
+              </a:ext>
+            </a:extLst>
+          </a:blip>
+          <a:stretch>
+            <a:fillRect/>
+          </a:stretch>
+        </p:blipFill>
+        <p:spPr>
+          <a:xfrm>
+            <a:off x="0" y="161745"/>
+            <a:ext cx="9144000" cy="6534509"/>
+          </a:xfrm>
+          <a:prstGeom prst="rect">
+            <a:avLst/>
+          </a:prstGeom>
+        </p:spPr>
+      </p:pic>
+      <p:cxnSp>
+        <p:nvCxnSpPr>
+          <p:cNvPr id="8" name="Straight Arrow Connector 7">
+            <a:extLst>
+              <a:ext uri="{FF2B5EF4-FFF2-40B4-BE49-F238E27FC236}">
+                <a16:creationId xmlns:a16="http://schemas.microsoft.com/office/drawing/2014/main" id="{A35DF222-41E4-194A-B6EB-59D52CF32C0E}"/>
+              </a:ext>
+            </a:extLst>
+          </p:cNvPr>
+          <p:cNvCxnSpPr>
+            <a:cxnSpLocks/>
+            <a:stCxn id="10" idx="3"/>
+          </p:cNvCxnSpPr>
+          <p:nvPr/>
+        </p:nvCxnSpPr>
+        <p:spPr>
+          <a:xfrm flipH="1">
+            <a:off x="4572000" y="1114455"/>
+            <a:ext cx="381000" cy="409545"/>
+          </a:xfrm>
+          <a:prstGeom prst="straightConnector1">
+            <a:avLst/>
+          </a:prstGeom>
+          <a:ln w="38100">
+            <a:solidFill>
+              <a:srgbClr val="FF0000"/>
+            </a:solidFill>
+            <a:headEnd type="oval" w="med" len="med"/>
+            <a:tailEnd type="triangle" w="med" len="med"/>
+          </a:ln>
+        </p:spPr>
+        <p:style>
+          <a:lnRef idx="1">
+            <a:schemeClr val="accent1"/>
+          </a:lnRef>
+          <a:fillRef idx="0">
+            <a:schemeClr val="accent1"/>
+          </a:fillRef>
+          <a:effectRef idx="0">
+            <a:schemeClr val="accent1"/>
+          </a:effectRef>
+          <a:fontRef idx="minor">
+            <a:schemeClr val="tx1"/>
+          </a:fontRef>
+        </p:style>
+      </p:cxnSp>
+      <p:sp>
+        <p:nvSpPr>
+          <p:cNvPr id="10" name="TextBox 9">
+            <a:extLst>
+              <a:ext uri="{FF2B5EF4-FFF2-40B4-BE49-F238E27FC236}">
+                <a16:creationId xmlns:a16="http://schemas.microsoft.com/office/drawing/2014/main" id="{2BC0A712-C719-7346-91B7-30B268B14BE2}"/>
+              </a:ext>
+            </a:extLst>
+          </p:cNvPr>
+          <p:cNvSpPr txBox="1"/>
+          <p:nvPr/>
+        </p:nvSpPr>
+        <p:spPr>
+          <a:xfrm>
+            <a:off x="76200" y="914400"/>
+            <a:ext cx="4876800" cy="400110"/>
+          </a:xfrm>
+          <a:prstGeom prst="rect">
+            <a:avLst/>
+          </a:prstGeom>
+          <a:solidFill>
+            <a:schemeClr val="bg1"/>
+          </a:solidFill>
+          <a:ln>
+            <a:solidFill>
+              <a:srgbClr val="FF0000"/>
+            </a:solidFill>
+          </a:ln>
+        </p:spPr>
+        <p:style>
+          <a:lnRef idx="2">
+            <a:schemeClr val="accent2"/>
+          </a:lnRef>
+          <a:fillRef idx="1">
+            <a:schemeClr val="lt1"/>
+          </a:fillRef>
+          <a:effectRef idx="0">
+            <a:schemeClr val="accent2"/>
+          </a:effectRef>
+          <a:fontRef idx="minor">
+            <a:schemeClr val="dk1"/>
+          </a:fontRef>
+        </p:style>
+        <p:txBody>
+          <a:bodyPr wrap="square" rtlCol="0">
+            <a:spAutoFit/>
+          </a:bodyPr>
+          <a:lstStyle/>
+          <a:p>
+            <a:r>
+              <a:rPr lang="en-US" sz="2000" dirty="0"/>
+              <a:t>Select the </a:t>
+            </a:r>
+            <a:r>
+              <a:rPr lang="en-US" sz="2000" dirty="0">
+                <a:highlight>
+                  <a:srgbClr val="FFFF00"/>
+                </a:highlight>
+              </a:rPr>
+              <a:t>best words</a:t>
+            </a:r>
+            <a:r>
+              <a:rPr lang="en-US" sz="2000" dirty="0"/>
+              <a:t> that </a:t>
+            </a:r>
+            <a:r>
+              <a:rPr lang="en-US" sz="2000" dirty="0">
+                <a:highlight>
+                  <a:srgbClr val="FFFF00"/>
+                </a:highlight>
+              </a:rPr>
+              <a:t>describe the topic</a:t>
+            </a:r>
+            <a:r>
+              <a:rPr lang="en-US" sz="2000" dirty="0"/>
+              <a:t>:</a:t>
+            </a:r>
+          </a:p>
+        </p:txBody>
+      </p:sp>
+      <p:sp>
+        <p:nvSpPr>
+          <p:cNvPr id="11" name="Rectangle: Rounded Corners 2">
+            <a:extLst>
+              <a:ext uri="{FF2B5EF4-FFF2-40B4-BE49-F238E27FC236}">
+                <a16:creationId xmlns:a16="http://schemas.microsoft.com/office/drawing/2014/main" id="{493DFB2B-C819-AB4F-A531-62EE236E9DBF}"/>
+              </a:ext>
+            </a:extLst>
+          </p:cNvPr>
+          <p:cNvSpPr/>
+          <p:nvPr/>
+        </p:nvSpPr>
+        <p:spPr>
+          <a:xfrm>
+            <a:off x="1600200" y="2762491"/>
+            <a:ext cx="4495800" cy="1447800"/>
+          </a:xfrm>
+          <a:prstGeom prst="roundRect">
+            <a:avLst/>
+          </a:prstGeom>
+          <a:noFill/>
+          <a:ln w="28575" cap="flat" cmpd="sng" algn="ctr">
+            <a:solidFill>
+              <a:srgbClr val="FF0000"/>
+            </a:solidFill>
+            <a:prstDash val="solid"/>
+            <a:round/>
+            <a:headEnd type="none" w="med" len="med"/>
+            <a:tailEnd type="none" w="med" len="med"/>
+          </a:ln>
+        </p:spPr>
+        <p:style>
+          <a:lnRef idx="0">
+            <a:scrgbClr r="0" g="0" b="0"/>
+          </a:lnRef>
+          <a:fillRef idx="0">
+            <a:scrgbClr r="0" g="0" b="0"/>
+          </a:fillRef>
+          <a:effectRef idx="0">
+            <a:scrgbClr r="0" g="0" b="0"/>
+          </a:effectRef>
+          <a:fontRef idx="minor">
+            <a:schemeClr val="accent2"/>
+          </a:fontRef>
+        </p:style>
+        <p:txBody>
+          <a:bodyPr rtlCol="0" anchor="ctr"/>
+          <a:lstStyle/>
+          <a:p>
+            <a:pPr algn="ctr"/>
+            <a:endParaRPr lang="en-US"/>
+          </a:p>
+        </p:txBody>
+      </p:sp>
+      <p:pic>
+        <p:nvPicPr>
+          <p:cNvPr id="12" name="Graphic 11" descr="Cursor">
+            <a:extLst>
+              <a:ext uri="{FF2B5EF4-FFF2-40B4-BE49-F238E27FC236}">
+                <a16:creationId xmlns:a16="http://schemas.microsoft.com/office/drawing/2014/main" id="{C0E38251-B48F-3147-85D5-DB23FC6731FA}"/>
+              </a:ext>
+            </a:extLst>
+          </p:cNvPr>
+          <p:cNvPicPr>
+            <a:picLocks noChangeAspect="1"/>
+          </p:cNvPicPr>
+          <p:nvPr/>
+        </p:nvPicPr>
+        <p:blipFill>
+          <a:blip r:embed="rId3">
+            <a:extLst>
+              <a:ext uri="{28A0092B-C50C-407E-A947-70E740481C1C}">
+                <a14:useLocalDpi xmlns:a14="http://schemas.microsoft.com/office/drawing/2010/main" val="0"/>
+              </a:ext>
+              <a:ext uri="{96DAC541-7B7A-43D3-8B79-37D633B846F1}">
+                <asvg:svgBlip xmlns:asvg="http://schemas.microsoft.com/office/drawing/2016/SVG/main" r:embed="rId4"/>
+              </a:ext>
+            </a:extLst>
+          </a:blip>
+          <a:stretch>
+            <a:fillRect/>
+          </a:stretch>
+        </p:blipFill>
+        <p:spPr>
+          <a:xfrm>
+            <a:off x="5631184" y="3496418"/>
+            <a:ext cx="443495" cy="443495"/>
+          </a:xfrm>
+          <a:prstGeom prst="rect">
+            <a:avLst/>
+          </a:prstGeom>
+        </p:spPr>
+      </p:pic>
+    </p:spTree>
+    <p:extLst>
+      <p:ext uri="{BB962C8B-B14F-4D97-AF65-F5344CB8AC3E}">
+        <p14:creationId xmlns:p14="http://schemas.microsoft.com/office/powerpoint/2010/main" val="3650849996"/>
+      </p:ext>
+    </p:extLst>
+  </p:cSld>
+  <p:clrMapOvr>
+    <a:masterClrMapping/>
+  </p:clrMapOvr>
+</p:sld>
+</file>
+
+<file path=ppt/slides/slide14.xml><?xml version="1.0" encoding="utf-8"?>
+<p:sld xmlns:a="http://schemas.openxmlformats.org/drawingml/2006/main" xmlns:r="http://schemas.openxmlformats.org/officeDocument/2006/relationships" xmlns:p="http://schemas.openxmlformats.org/presentationml/2006/main">
+  <p:cSld>
+    <p:spTree>
+      <p:nvGrpSpPr>
+        <p:cNvPr id="1" name=""/>
+        <p:cNvGrpSpPr/>
+        <p:nvPr/>
+      </p:nvGrpSpPr>
+      <p:grpSpPr>
+        <a:xfrm>
+          <a:off x="0" y="0"/>
+          <a:ext cx="0" cy="0"/>
+          <a:chOff x="0" y="0"/>
+          <a:chExt cx="0" cy="0"/>
+        </a:xfrm>
+      </p:grpSpPr>
+      <p:pic>
+        <p:nvPicPr>
+          <p:cNvPr id="6" name="Picture 5" descr="A screenshot of a cell phone&#10;&#10;Description automatically generated">
+            <a:extLst>
+              <a:ext uri="{FF2B5EF4-FFF2-40B4-BE49-F238E27FC236}">
+                <a16:creationId xmlns:a16="http://schemas.microsoft.com/office/drawing/2014/main" id="{B7937660-2EB6-AC4F-8A9C-D0972759261D}"/>
+              </a:ext>
+            </a:extLst>
+          </p:cNvPr>
+          <p:cNvPicPr>
+            <a:picLocks noChangeAspect="1"/>
+          </p:cNvPicPr>
+          <p:nvPr/>
+        </p:nvPicPr>
+        <p:blipFill>
+          <a:blip r:embed="rId2">
+            <a:extLst>
+              <a:ext uri="{28A0092B-C50C-407E-A947-70E740481C1C}">
+                <a14:useLocalDpi xmlns:a14="http://schemas.microsoft.com/office/drawing/2010/main" val="0"/>
+              </a:ext>
+            </a:extLst>
+          </a:blip>
+          <a:stretch>
+            <a:fillRect/>
+          </a:stretch>
+        </p:blipFill>
+        <p:spPr>
+          <a:xfrm>
+            <a:off x="0" y="161745"/>
+            <a:ext cx="9144000" cy="6534509"/>
+          </a:xfrm>
+          <a:prstGeom prst="rect">
+            <a:avLst/>
+          </a:prstGeom>
+        </p:spPr>
+      </p:pic>
+      <p:pic>
+        <p:nvPicPr>
+          <p:cNvPr id="8" name="Graphic 7" descr="Cursor">
+            <a:extLst>
+              <a:ext uri="{FF2B5EF4-FFF2-40B4-BE49-F238E27FC236}">
+                <a16:creationId xmlns:a16="http://schemas.microsoft.com/office/drawing/2014/main" id="{C5E6542E-7BF7-3744-A35E-9120A88BDA45}"/>
+              </a:ext>
+            </a:extLst>
+          </p:cNvPr>
+          <p:cNvPicPr>
+            <a:picLocks noChangeAspect="1"/>
+          </p:cNvPicPr>
+          <p:nvPr/>
+        </p:nvPicPr>
+        <p:blipFill>
+          <a:blip r:embed="rId3">
+            <a:extLst>
+              <a:ext uri="{28A0092B-C50C-407E-A947-70E740481C1C}">
+                <a14:useLocalDpi xmlns:a14="http://schemas.microsoft.com/office/drawing/2010/main" val="0"/>
+              </a:ext>
+              <a:ext uri="{96DAC541-7B7A-43D3-8B79-37D633B846F1}">
+                <asvg:svgBlip xmlns:asvg="http://schemas.microsoft.com/office/drawing/2016/SVG/main" r:embed="rId4"/>
+              </a:ext>
+            </a:extLst>
+          </a:blip>
+          <a:stretch>
+            <a:fillRect/>
+          </a:stretch>
+        </p:blipFill>
+        <p:spPr>
+          <a:xfrm>
+            <a:off x="5631184" y="3496418"/>
+            <a:ext cx="443495" cy="443495"/>
+          </a:xfrm>
+          <a:prstGeom prst="rect">
+            <a:avLst/>
+          </a:prstGeom>
+        </p:spPr>
+      </p:pic>
+      <p:sp>
+        <p:nvSpPr>
+          <p:cNvPr id="10" name="Rectangle: Rounded Corners 2">
+            <a:extLst>
+              <a:ext uri="{FF2B5EF4-FFF2-40B4-BE49-F238E27FC236}">
+                <a16:creationId xmlns:a16="http://schemas.microsoft.com/office/drawing/2014/main" id="{55425449-58EF-A141-8E7C-9D49424864BE}"/>
+              </a:ext>
+            </a:extLst>
+          </p:cNvPr>
+          <p:cNvSpPr/>
+          <p:nvPr/>
+        </p:nvSpPr>
+        <p:spPr>
+          <a:xfrm>
+            <a:off x="3429000" y="5170026"/>
+            <a:ext cx="2286000" cy="316374"/>
+          </a:xfrm>
+          <a:prstGeom prst="roundRect">
+            <a:avLst/>
+          </a:prstGeom>
+          <a:noFill/>
+          <a:ln w="28575" cap="flat" cmpd="sng" algn="ctr">
+            <a:solidFill>
+              <a:srgbClr val="FF0000"/>
+            </a:solidFill>
+            <a:prstDash val="solid"/>
+            <a:round/>
+            <a:headEnd type="none" w="med" len="med"/>
+            <a:tailEnd type="none" w="med" len="med"/>
+          </a:ln>
+        </p:spPr>
+        <p:style>
+          <a:lnRef idx="0">
+            <a:scrgbClr r="0" g="0" b="0"/>
+          </a:lnRef>
+          <a:fillRef idx="0">
+            <a:scrgbClr r="0" g="0" b="0"/>
+          </a:fillRef>
+          <a:effectRef idx="0">
+            <a:scrgbClr r="0" g="0" b="0"/>
+          </a:effectRef>
+          <a:fontRef idx="minor">
+            <a:schemeClr val="accent2"/>
+          </a:fontRef>
+        </p:style>
+        <p:txBody>
+          <a:bodyPr rtlCol="0" anchor="ctr"/>
+          <a:lstStyle/>
+          <a:p>
+            <a:pPr algn="ctr"/>
+            <a:endParaRPr lang="en-US"/>
+          </a:p>
+        </p:txBody>
+      </p:sp>
+      <p:sp>
+        <p:nvSpPr>
+          <p:cNvPr id="11" name="Rectangle: Rounded Corners 2">
+            <a:extLst>
+              <a:ext uri="{FF2B5EF4-FFF2-40B4-BE49-F238E27FC236}">
+                <a16:creationId xmlns:a16="http://schemas.microsoft.com/office/drawing/2014/main" id="{84A679B2-4024-4A4D-8592-1233C1A304FB}"/>
+              </a:ext>
+            </a:extLst>
+          </p:cNvPr>
+          <p:cNvSpPr/>
+          <p:nvPr/>
+        </p:nvSpPr>
+        <p:spPr>
+          <a:xfrm>
+            <a:off x="192912" y="6069101"/>
+            <a:ext cx="1178688" cy="484097"/>
+          </a:xfrm>
+          <a:prstGeom prst="roundRect">
+            <a:avLst/>
+          </a:prstGeom>
+          <a:noFill/>
+          <a:ln w="28575" cap="flat" cmpd="sng" algn="ctr">
+            <a:solidFill>
+              <a:srgbClr val="FF0000"/>
+            </a:solidFill>
+            <a:prstDash val="solid"/>
+            <a:round/>
+            <a:headEnd type="none" w="med" len="med"/>
+            <a:tailEnd type="none" w="med" len="med"/>
+          </a:ln>
+        </p:spPr>
+        <p:style>
+          <a:lnRef idx="0">
+            <a:scrgbClr r="0" g="0" b="0"/>
+          </a:lnRef>
+          <a:fillRef idx="0">
+            <a:scrgbClr r="0" g="0" b="0"/>
+          </a:fillRef>
+          <a:effectRef idx="0">
+            <a:scrgbClr r="0" g="0" b="0"/>
+          </a:effectRef>
+          <a:fontRef idx="minor">
+            <a:schemeClr val="accent2"/>
+          </a:fontRef>
+        </p:style>
+        <p:txBody>
+          <a:bodyPr rtlCol="0" anchor="ctr"/>
+          <a:lstStyle/>
+          <a:p>
+            <a:pPr algn="ctr"/>
+            <a:endParaRPr lang="en-US"/>
+          </a:p>
+        </p:txBody>
+      </p:sp>
+      <p:sp>
+        <p:nvSpPr>
+          <p:cNvPr id="12" name="Rectangle: Rounded Corners 2">
+            <a:extLst>
+              <a:ext uri="{FF2B5EF4-FFF2-40B4-BE49-F238E27FC236}">
+                <a16:creationId xmlns:a16="http://schemas.microsoft.com/office/drawing/2014/main" id="{2F2664DC-2155-3343-AD00-C92261485836}"/>
+              </a:ext>
+            </a:extLst>
+          </p:cNvPr>
+          <p:cNvSpPr/>
+          <p:nvPr/>
+        </p:nvSpPr>
+        <p:spPr>
+          <a:xfrm>
+            <a:off x="7950426" y="6069102"/>
+            <a:ext cx="964973" cy="484097"/>
+          </a:xfrm>
+          <a:prstGeom prst="roundRect">
+            <a:avLst/>
+          </a:prstGeom>
+          <a:noFill/>
+          <a:ln w="28575" cap="flat" cmpd="sng" algn="ctr">
+            <a:solidFill>
+              <a:srgbClr val="FF0000"/>
+            </a:solidFill>
+            <a:prstDash val="solid"/>
+            <a:round/>
+            <a:headEnd type="none" w="med" len="med"/>
+            <a:tailEnd type="none" w="med" len="med"/>
+          </a:ln>
+        </p:spPr>
+        <p:style>
+          <a:lnRef idx="0">
+            <a:scrgbClr r="0" g="0" b="0"/>
+          </a:lnRef>
+          <a:fillRef idx="0">
+            <a:scrgbClr r="0" g="0" b="0"/>
+          </a:fillRef>
+          <a:effectRef idx="0">
+            <a:scrgbClr r="0" g="0" b="0"/>
+          </a:effectRef>
+          <a:fontRef idx="minor">
+            <a:schemeClr val="accent2"/>
+          </a:fontRef>
+        </p:style>
+        <p:txBody>
+          <a:bodyPr rtlCol="0" anchor="ctr"/>
+          <a:lstStyle/>
+          <a:p>
+            <a:pPr algn="ctr"/>
+            <a:endParaRPr lang="en-US"/>
+          </a:p>
+        </p:txBody>
+      </p:sp>
+      <p:cxnSp>
+        <p:nvCxnSpPr>
+          <p:cNvPr id="13" name="Straight Arrow Connector 12">
+            <a:extLst>
+              <a:ext uri="{FF2B5EF4-FFF2-40B4-BE49-F238E27FC236}">
+                <a16:creationId xmlns:a16="http://schemas.microsoft.com/office/drawing/2014/main" id="{78A58C02-D3B1-9049-9FAF-648429B4DE40}"/>
+              </a:ext>
+            </a:extLst>
+          </p:cNvPr>
+          <p:cNvCxnSpPr>
+            <a:cxnSpLocks/>
+            <a:stCxn id="17" idx="1"/>
+            <a:endCxn id="11" idx="3"/>
+          </p:cNvCxnSpPr>
+          <p:nvPr/>
+        </p:nvCxnSpPr>
+        <p:spPr>
+          <a:xfrm flipH="1" flipV="1">
+            <a:off x="1371600" y="6311150"/>
+            <a:ext cx="1295400" cy="1"/>
+          </a:xfrm>
+          <a:prstGeom prst="straightConnector1">
+            <a:avLst/>
+          </a:prstGeom>
+          <a:ln w="38100">
+            <a:solidFill>
+              <a:srgbClr val="FF0000"/>
+            </a:solidFill>
+            <a:headEnd type="oval" w="med" len="med"/>
+            <a:tailEnd type="triangle" w="med" len="med"/>
+          </a:ln>
+        </p:spPr>
+        <p:style>
+          <a:lnRef idx="1">
+            <a:schemeClr val="accent1"/>
+          </a:lnRef>
+          <a:fillRef idx="0">
+            <a:schemeClr val="accent1"/>
+          </a:fillRef>
+          <a:effectRef idx="0">
+            <a:schemeClr val="accent1"/>
+          </a:effectRef>
+          <a:fontRef idx="minor">
+            <a:schemeClr val="tx1"/>
+          </a:fontRef>
+        </p:style>
+      </p:cxnSp>
+      <p:cxnSp>
+        <p:nvCxnSpPr>
+          <p:cNvPr id="14" name="Straight Arrow Connector 13">
+            <a:extLst>
+              <a:ext uri="{FF2B5EF4-FFF2-40B4-BE49-F238E27FC236}">
+                <a16:creationId xmlns:a16="http://schemas.microsoft.com/office/drawing/2014/main" id="{07BD7B09-378C-6741-8AF1-21BE6FCD45B1}"/>
+              </a:ext>
+            </a:extLst>
+          </p:cNvPr>
+          <p:cNvCxnSpPr>
+            <a:cxnSpLocks/>
+            <a:stCxn id="17" idx="3"/>
+            <a:endCxn id="12" idx="1"/>
+          </p:cNvCxnSpPr>
+          <p:nvPr/>
+        </p:nvCxnSpPr>
+        <p:spPr>
+          <a:xfrm>
+            <a:off x="6477000" y="6311151"/>
+            <a:ext cx="1473426" cy="0"/>
+          </a:xfrm>
+          <a:prstGeom prst="straightConnector1">
+            <a:avLst/>
+          </a:prstGeom>
+          <a:ln w="38100">
+            <a:solidFill>
+              <a:srgbClr val="FF0000"/>
+            </a:solidFill>
+            <a:headEnd type="oval" w="med" len="med"/>
+            <a:tailEnd type="triangle" w="med" len="med"/>
+          </a:ln>
+        </p:spPr>
+        <p:style>
+          <a:lnRef idx="1">
+            <a:schemeClr val="accent1"/>
+          </a:lnRef>
+          <a:fillRef idx="0">
+            <a:schemeClr val="accent1"/>
+          </a:fillRef>
+          <a:effectRef idx="0">
+            <a:schemeClr val="accent1"/>
+          </a:effectRef>
+          <a:fontRef idx="minor">
+            <a:schemeClr val="tx1"/>
+          </a:fontRef>
+        </p:style>
+      </p:cxnSp>
+      <p:cxnSp>
+        <p:nvCxnSpPr>
+          <p:cNvPr id="15" name="Straight Arrow Connector 14">
+            <a:extLst>
+              <a:ext uri="{FF2B5EF4-FFF2-40B4-BE49-F238E27FC236}">
+                <a16:creationId xmlns:a16="http://schemas.microsoft.com/office/drawing/2014/main" id="{EC095C0C-0851-8B45-99B9-9BD5EA1337F1}"/>
+              </a:ext>
+            </a:extLst>
+          </p:cNvPr>
+          <p:cNvCxnSpPr>
+            <a:cxnSpLocks/>
+            <a:stCxn id="16" idx="1"/>
+            <a:endCxn id="10" idx="3"/>
+          </p:cNvCxnSpPr>
+          <p:nvPr/>
+        </p:nvCxnSpPr>
+        <p:spPr>
+          <a:xfrm flipH="1">
+            <a:off x="5715000" y="5024735"/>
+            <a:ext cx="455062" cy="303478"/>
+          </a:xfrm>
+          <a:prstGeom prst="straightConnector1">
+            <a:avLst/>
+          </a:prstGeom>
+          <a:ln w="38100">
+            <a:solidFill>
+              <a:srgbClr val="FF0000"/>
+            </a:solidFill>
+            <a:headEnd type="oval" w="med" len="med"/>
+            <a:tailEnd type="triangle" w="med" len="med"/>
+          </a:ln>
+        </p:spPr>
+        <p:style>
+          <a:lnRef idx="1">
+            <a:schemeClr val="accent1"/>
+          </a:lnRef>
+          <a:fillRef idx="0">
+            <a:schemeClr val="accent1"/>
+          </a:fillRef>
+          <a:effectRef idx="0">
+            <a:schemeClr val="accent1"/>
+          </a:effectRef>
+          <a:fontRef idx="minor">
+            <a:schemeClr val="tx1"/>
+          </a:fontRef>
+        </p:style>
+      </p:cxnSp>
+      <p:sp>
+        <p:nvSpPr>
+          <p:cNvPr id="16" name="TextBox 15">
+            <a:extLst>
+              <a:ext uri="{FF2B5EF4-FFF2-40B4-BE49-F238E27FC236}">
+                <a16:creationId xmlns:a16="http://schemas.microsoft.com/office/drawing/2014/main" id="{F7F46BC3-04F5-3941-8D57-82BFEEC5067E}"/>
+              </a:ext>
+            </a:extLst>
+          </p:cNvPr>
+          <p:cNvSpPr txBox="1"/>
+          <p:nvPr/>
+        </p:nvSpPr>
+        <p:spPr>
+          <a:xfrm>
+            <a:off x="6170062" y="4563070"/>
+            <a:ext cx="2518876" cy="923330"/>
+          </a:xfrm>
+          <a:prstGeom prst="rect">
+            <a:avLst/>
+          </a:prstGeom>
+          <a:solidFill>
+            <a:schemeClr val="bg1"/>
+          </a:solidFill>
+          <a:ln>
+            <a:solidFill>
+              <a:srgbClr val="FF0000"/>
+            </a:solidFill>
+          </a:ln>
+        </p:spPr>
+        <p:txBody>
+          <a:bodyPr wrap="square" rtlCol="0">
+            <a:spAutoFit/>
+          </a:bodyPr>
+          <a:lstStyle/>
+          <a:p>
+            <a:r>
+              <a:rPr lang="en-US" dirty="0"/>
+              <a:t>If you make a mistake, click </a:t>
+            </a:r>
+            <a:r>
+              <a:rPr lang="en-US" dirty="0">
+                <a:highlight>
+                  <a:srgbClr val="FFFF00"/>
+                </a:highlight>
+              </a:rPr>
+              <a:t>clear selections</a:t>
+            </a:r>
+            <a:r>
+              <a:rPr lang="en-US" dirty="0"/>
+              <a:t> to start fresh on this article.</a:t>
+            </a:r>
+          </a:p>
+        </p:txBody>
+      </p:sp>
+      <p:sp>
+        <p:nvSpPr>
+          <p:cNvPr id="17" name="TextBox 16">
+            <a:extLst>
+              <a:ext uri="{FF2B5EF4-FFF2-40B4-BE49-F238E27FC236}">
+                <a16:creationId xmlns:a16="http://schemas.microsoft.com/office/drawing/2014/main" id="{4CDC3B6C-C192-404E-8125-3AF6C8D38356}"/>
+              </a:ext>
+            </a:extLst>
+          </p:cNvPr>
+          <p:cNvSpPr txBox="1"/>
+          <p:nvPr/>
+        </p:nvSpPr>
+        <p:spPr>
+          <a:xfrm>
+            <a:off x="2667000" y="6126485"/>
+            <a:ext cx="3810000" cy="369332"/>
+          </a:xfrm>
+          <a:prstGeom prst="rect">
+            <a:avLst/>
+          </a:prstGeom>
+          <a:solidFill>
+            <a:schemeClr val="bg1"/>
+          </a:solidFill>
+          <a:ln>
+            <a:solidFill>
+              <a:srgbClr val="FF0000"/>
+            </a:solidFill>
+          </a:ln>
+        </p:spPr>
+        <p:txBody>
+          <a:bodyPr wrap="square" rtlCol="0">
+            <a:spAutoFit/>
+          </a:bodyPr>
+          <a:lstStyle/>
+          <a:p>
+            <a:pPr algn="ctr"/>
+            <a:r>
+              <a:rPr lang="en-US" dirty="0"/>
+              <a:t>Click to navigate through your articles.</a:t>
+            </a:r>
+          </a:p>
+        </p:txBody>
+      </p:sp>
+      <p:sp>
+        <p:nvSpPr>
+          <p:cNvPr id="31" name="TextBox 30">
+            <a:extLst>
+              <a:ext uri="{FF2B5EF4-FFF2-40B4-BE49-F238E27FC236}">
+                <a16:creationId xmlns:a16="http://schemas.microsoft.com/office/drawing/2014/main" id="{117196BD-3E4D-D44E-953B-382BF9B7DFBD}"/>
+              </a:ext>
+            </a:extLst>
+          </p:cNvPr>
+          <p:cNvSpPr txBox="1"/>
+          <p:nvPr/>
+        </p:nvSpPr>
+        <p:spPr>
+          <a:xfrm>
+            <a:off x="6047671" y="3244333"/>
+            <a:ext cx="2209800" cy="369332"/>
+          </a:xfrm>
+          <a:prstGeom prst="rect">
+            <a:avLst/>
+          </a:prstGeom>
+          <a:solidFill>
+            <a:schemeClr val="bg1"/>
+          </a:solidFill>
+          <a:ln>
+            <a:solidFill>
+              <a:srgbClr val="FF0000"/>
+            </a:solidFill>
+          </a:ln>
+        </p:spPr>
+        <p:txBody>
+          <a:bodyPr wrap="square" rtlCol="0">
+            <a:spAutoFit/>
+          </a:bodyPr>
+          <a:lstStyle/>
+          <a:p>
+            <a:r>
+              <a:rPr lang="en-US" dirty="0"/>
+              <a:t>Click to Select words</a:t>
+            </a:r>
+          </a:p>
+        </p:txBody>
+      </p:sp>
+    </p:spTree>
+    <p:extLst>
+      <p:ext uri="{BB962C8B-B14F-4D97-AF65-F5344CB8AC3E}">
+        <p14:creationId xmlns:p14="http://schemas.microsoft.com/office/powerpoint/2010/main" val="3477984812"/>
+      </p:ext>
+    </p:extLst>
+  </p:cSld>
+  <p:clrMapOvr>
+    <a:masterClrMapping/>
+  </p:clrMapOvr>
+</p:sld>
+</file>
+
 <file path=ppt/slides/slide2.xml><?xml version="1.0" encoding="utf-8"?>
 <p:sld xmlns:a="http://schemas.openxmlformats.org/drawingml/2006/main" xmlns:r="http://schemas.openxmlformats.org/officeDocument/2006/relationships" xmlns:p="http://schemas.openxmlformats.org/presentationml/2006/main">
   <p:cSld>

</xml_diff>

<commit_message>
migrating to the new server
</commit_message>
<xml_diff>
--- a/user-study/instructions/Instructions.pptx
+++ b/user-study/instructions/Instructions.pptx
@@ -16,9 +16,10 @@
     <p:sldId id="267" r:id="rId10"/>
     <p:sldId id="268" r:id="rId11"/>
     <p:sldId id="271" r:id="rId12"/>
-    <p:sldId id="272" r:id="rId13"/>
-    <p:sldId id="274" r:id="rId14"/>
-    <p:sldId id="273" r:id="rId15"/>
+    <p:sldId id="275" r:id="rId13"/>
+    <p:sldId id="272" r:id="rId14"/>
+    <p:sldId id="274" r:id="rId15"/>
+    <p:sldId id="273" r:id="rId16"/>
   </p:sldIdLst>
   <p:sldSz cx="9144000" cy="6858000" type="screen4x3"/>
   <p:notesSz cx="6858000" cy="9144000"/>
@@ -267,7 +268,7 @@
           <a:p>
             <a:fld id="{D98ADB59-0FC3-4F23-98C1-896570F2CCB9}" type="datetimeFigureOut">
               <a:rPr lang="en-US" smtClean="0"/>
-              <a:t>5/21/20</a:t>
+              <a:t>5/30/2020</a:t>
             </a:fld>
             <a:endParaRPr lang="en-US"/>
           </a:p>
@@ -437,7 +438,7 @@
           <a:p>
             <a:fld id="{D98ADB59-0FC3-4F23-98C1-896570F2CCB9}" type="datetimeFigureOut">
               <a:rPr lang="en-US" smtClean="0"/>
-              <a:t>5/21/20</a:t>
+              <a:t>5/30/2020</a:t>
             </a:fld>
             <a:endParaRPr lang="en-US"/>
           </a:p>
@@ -617,7 +618,7 @@
           <a:p>
             <a:fld id="{D98ADB59-0FC3-4F23-98C1-896570F2CCB9}" type="datetimeFigureOut">
               <a:rPr lang="en-US" smtClean="0"/>
-              <a:t>5/21/20</a:t>
+              <a:t>5/30/2020</a:t>
             </a:fld>
             <a:endParaRPr lang="en-US"/>
           </a:p>
@@ -787,7 +788,7 @@
           <a:p>
             <a:fld id="{D98ADB59-0FC3-4F23-98C1-896570F2CCB9}" type="datetimeFigureOut">
               <a:rPr lang="en-US" smtClean="0"/>
-              <a:t>5/21/20</a:t>
+              <a:t>5/30/2020</a:t>
             </a:fld>
             <a:endParaRPr lang="en-US"/>
           </a:p>
@@ -1031,7 +1032,7 @@
           <a:p>
             <a:fld id="{D98ADB59-0FC3-4F23-98C1-896570F2CCB9}" type="datetimeFigureOut">
               <a:rPr lang="en-US" smtClean="0"/>
-              <a:t>5/21/20</a:t>
+              <a:t>5/30/2020</a:t>
             </a:fld>
             <a:endParaRPr lang="en-US"/>
           </a:p>
@@ -1263,7 +1264,7 @@
           <a:p>
             <a:fld id="{D98ADB59-0FC3-4F23-98C1-896570F2CCB9}" type="datetimeFigureOut">
               <a:rPr lang="en-US" smtClean="0"/>
-              <a:t>5/21/20</a:t>
+              <a:t>5/30/2020</a:t>
             </a:fld>
             <a:endParaRPr lang="en-US"/>
           </a:p>
@@ -1630,7 +1631,7 @@
           <a:p>
             <a:fld id="{D98ADB59-0FC3-4F23-98C1-896570F2CCB9}" type="datetimeFigureOut">
               <a:rPr lang="en-US" smtClean="0"/>
-              <a:t>5/21/20</a:t>
+              <a:t>5/30/2020</a:t>
             </a:fld>
             <a:endParaRPr lang="en-US"/>
           </a:p>
@@ -1748,7 +1749,7 @@
           <a:p>
             <a:fld id="{D98ADB59-0FC3-4F23-98C1-896570F2CCB9}" type="datetimeFigureOut">
               <a:rPr lang="en-US" smtClean="0"/>
-              <a:t>5/21/20</a:t>
+              <a:t>5/30/2020</a:t>
             </a:fld>
             <a:endParaRPr lang="en-US"/>
           </a:p>
@@ -1843,7 +1844,7 @@
           <a:p>
             <a:fld id="{D98ADB59-0FC3-4F23-98C1-896570F2CCB9}" type="datetimeFigureOut">
               <a:rPr lang="en-US" smtClean="0"/>
-              <a:t>5/21/20</a:t>
+              <a:t>5/30/2020</a:t>
             </a:fld>
             <a:endParaRPr lang="en-US"/>
           </a:p>
@@ -2120,7 +2121,7 @@
           <a:p>
             <a:fld id="{D98ADB59-0FC3-4F23-98C1-896570F2CCB9}" type="datetimeFigureOut">
               <a:rPr lang="en-US" smtClean="0"/>
-              <a:t>5/21/20</a:t>
+              <a:t>5/30/2020</a:t>
             </a:fld>
             <a:endParaRPr lang="en-US"/>
           </a:p>
@@ -2377,7 +2378,7 @@
           <a:p>
             <a:fld id="{D98ADB59-0FC3-4F23-98C1-896570F2CCB9}" type="datetimeFigureOut">
               <a:rPr lang="en-US" smtClean="0"/>
-              <a:t>5/21/20</a:t>
+              <a:t>5/30/2020</a:t>
             </a:fld>
             <a:endParaRPr lang="en-US"/>
           </a:p>
@@ -2590,7 +2591,7 @@
           <a:p>
             <a:fld id="{D98ADB59-0FC3-4F23-98C1-896570F2CCB9}" type="datetimeFigureOut">
               <a:rPr lang="en-US" smtClean="0"/>
-              <a:t>5/21/20</a:t>
+              <a:t>5/30/2020</a:t>
             </a:fld>
             <a:endParaRPr lang="en-US"/>
           </a:p>
@@ -3907,7 +3908,7 @@
         </p:nvSpPr>
         <p:spPr>
           <a:xfrm>
-            <a:off x="3657600" y="4251280"/>
+            <a:off x="2993367" y="4389842"/>
             <a:ext cx="2958654" cy="461665"/>
           </a:xfrm>
           <a:prstGeom prst="rect">
@@ -3933,6 +3934,191 @@
               <a:rPr lang="en-US" sz="2400" dirty="0"/>
               <a:t>Click to select a rating</a:t>
             </a:r>
+          </a:p>
+        </p:txBody>
+      </p:sp>
+      <p:sp>
+        <p:nvSpPr>
+          <p:cNvPr id="15" name="TextBox 14">
+            <a:extLst>
+              <a:ext uri="{FF2B5EF4-FFF2-40B4-BE49-F238E27FC236}">
+                <a16:creationId xmlns:a16="http://schemas.microsoft.com/office/drawing/2014/main" id="{DC64B75E-7FA5-4FBA-861B-796B28E90CF0}"/>
+              </a:ext>
+            </a:extLst>
+          </p:cNvPr>
+          <p:cNvSpPr txBox="1"/>
+          <p:nvPr/>
+        </p:nvSpPr>
+        <p:spPr>
+          <a:xfrm>
+            <a:off x="3733800" y="5329520"/>
+            <a:ext cx="3015570" cy="923330"/>
+          </a:xfrm>
+          <a:prstGeom prst="rect">
+            <a:avLst/>
+          </a:prstGeom>
+          <a:solidFill>
+            <a:schemeClr val="bg1"/>
+          </a:solidFill>
+          <a:ln>
+            <a:solidFill>
+              <a:srgbClr val="FF0000"/>
+            </a:solidFill>
+          </a:ln>
+        </p:spPr>
+        <p:txBody>
+          <a:bodyPr wrap="square" rtlCol="0">
+            <a:spAutoFit/>
+          </a:bodyPr>
+          <a:lstStyle/>
+          <a:p>
+            <a:r>
+              <a:rPr lang="en-US" dirty="0"/>
+              <a:t>Your Rating on scale of 1 to 10</a:t>
+            </a:r>
+            <a:br>
+              <a:rPr lang="en-US" dirty="0"/>
+            </a:br>
+            <a:r>
+              <a:rPr lang="en-US" dirty="0"/>
+              <a:t> 1:  Worst explanation</a:t>
+            </a:r>
+            <a:br>
+              <a:rPr lang="en-US" dirty="0"/>
+            </a:br>
+            <a:r>
+              <a:rPr lang="en-US" dirty="0"/>
+              <a:t>10: Best explanation</a:t>
+            </a:r>
+          </a:p>
+        </p:txBody>
+      </p:sp>
+      <p:sp>
+        <p:nvSpPr>
+          <p:cNvPr id="19" name="Rectangle: Rounded Corners 2">
+            <a:extLst>
+              <a:ext uri="{FF2B5EF4-FFF2-40B4-BE49-F238E27FC236}">
+                <a16:creationId xmlns:a16="http://schemas.microsoft.com/office/drawing/2014/main" id="{B904F396-9600-4EF4-917D-D46E68420B00}"/>
+              </a:ext>
+            </a:extLst>
+          </p:cNvPr>
+          <p:cNvSpPr/>
+          <p:nvPr/>
+        </p:nvSpPr>
+        <p:spPr>
+          <a:xfrm>
+            <a:off x="1143000" y="3662305"/>
+            <a:ext cx="6172200" cy="579842"/>
+          </a:xfrm>
+          <a:prstGeom prst="roundRect">
+            <a:avLst/>
+          </a:prstGeom>
+          <a:noFill/>
+          <a:ln w="28575" cap="flat" cmpd="sng" algn="ctr">
+            <a:solidFill>
+              <a:srgbClr val="FF0000"/>
+            </a:solidFill>
+            <a:prstDash val="solid"/>
+            <a:round/>
+            <a:headEnd type="none" w="med" len="med"/>
+            <a:tailEnd type="none" w="med" len="med"/>
+          </a:ln>
+        </p:spPr>
+        <p:style>
+          <a:lnRef idx="0">
+            <a:scrgbClr r="0" g="0" b="0"/>
+          </a:lnRef>
+          <a:fillRef idx="0">
+            <a:scrgbClr r="0" g="0" b="0"/>
+          </a:fillRef>
+          <a:effectRef idx="0">
+            <a:scrgbClr r="0" g="0" b="0"/>
+          </a:effectRef>
+          <a:fontRef idx="minor">
+            <a:schemeClr val="accent2"/>
+          </a:fontRef>
+        </p:style>
+        <p:txBody>
+          <a:bodyPr rtlCol="0" anchor="ctr"/>
+          <a:lstStyle/>
+          <a:p>
+            <a:pPr algn="ctr"/>
+            <a:endParaRPr lang="en-US"/>
+          </a:p>
+        </p:txBody>
+      </p:sp>
+      <p:sp>
+        <p:nvSpPr>
+          <p:cNvPr id="2" name="Arrow: Bent 1">
+            <a:extLst>
+              <a:ext uri="{FF2B5EF4-FFF2-40B4-BE49-F238E27FC236}">
+                <a16:creationId xmlns:a16="http://schemas.microsoft.com/office/drawing/2014/main" id="{01C08DC1-43D0-49F3-B6D5-22CBBB33D506}"/>
+              </a:ext>
+            </a:extLst>
+          </p:cNvPr>
+          <p:cNvSpPr/>
+          <p:nvPr/>
+        </p:nvSpPr>
+        <p:spPr>
+          <a:xfrm flipV="1">
+            <a:off x="3200400" y="4864673"/>
+            <a:ext cx="533400" cy="685800"/>
+          </a:xfrm>
+          <a:prstGeom prst="bentArrow">
+            <a:avLst/>
+          </a:prstGeom>
+          <a:gradFill flip="none" rotWithShape="1">
+            <a:gsLst>
+              <a:gs pos="0">
+                <a:srgbClr val="FF0000">
+                  <a:tint val="66000"/>
+                  <a:satMod val="160000"/>
+                </a:srgbClr>
+              </a:gs>
+              <a:gs pos="91000">
+                <a:srgbClr val="FF0000">
+                  <a:tint val="44500"/>
+                  <a:satMod val="160000"/>
+                </a:srgbClr>
+              </a:gs>
+              <a:gs pos="100000">
+                <a:srgbClr val="FF0000">
+                  <a:tint val="23500"/>
+                  <a:satMod val="160000"/>
+                </a:srgbClr>
+              </a:gs>
+            </a:gsLst>
+            <a:lin ang="16200000" scaled="1"/>
+            <a:tileRect/>
+          </a:gradFill>
+          <a:ln>
+            <a:noFill/>
+          </a:ln>
+        </p:spPr>
+        <p:style>
+          <a:lnRef idx="0">
+            <a:scrgbClr r="0" g="0" b="0"/>
+          </a:lnRef>
+          <a:fillRef idx="0">
+            <a:scrgbClr r="0" g="0" b="0"/>
+          </a:fillRef>
+          <a:effectRef idx="0">
+            <a:scrgbClr r="0" g="0" b="0"/>
+          </a:effectRef>
+          <a:fontRef idx="minor">
+            <a:schemeClr val="lt1"/>
+          </a:fontRef>
+        </p:style>
+        <p:txBody>
+          <a:bodyPr rtlCol="0" anchor="ctr"/>
+          <a:lstStyle/>
+          <a:p>
+            <a:pPr algn="ctr"/>
+            <a:endParaRPr lang="en-US">
+              <a:solidFill>
+                <a:schemeClr val="tx1"/>
+              </a:solidFill>
+            </a:endParaRPr>
           </a:p>
         </p:txBody>
       </p:sp>
@@ -4010,6 +4196,66 @@
 </file>
 
 <file path=ppt/slides/slide12.xml><?xml version="1.0" encoding="utf-8"?>
+<p:sld xmlns:a="http://schemas.openxmlformats.org/drawingml/2006/main" xmlns:r="http://schemas.openxmlformats.org/officeDocument/2006/relationships" xmlns:p="http://schemas.openxmlformats.org/presentationml/2006/main">
+  <p:cSld>
+    <p:spTree>
+      <p:nvGrpSpPr>
+        <p:cNvPr id="1" name=""/>
+        <p:cNvGrpSpPr/>
+        <p:nvPr/>
+      </p:nvGrpSpPr>
+      <p:grpSpPr>
+        <a:xfrm>
+          <a:off x="0" y="0"/>
+          <a:ext cx="0" cy="0"/>
+          <a:chOff x="0" y="0"/>
+          <a:chExt cx="0" cy="0"/>
+        </a:xfrm>
+      </p:grpSpPr>
+      <p:pic>
+        <p:nvPicPr>
+          <p:cNvPr id="3" name="Picture 2">
+            <a:extLst>
+              <a:ext uri="{FF2B5EF4-FFF2-40B4-BE49-F238E27FC236}">
+                <a16:creationId xmlns:a16="http://schemas.microsoft.com/office/drawing/2014/main" id="{2A061F1B-AD83-4F3F-A119-6C6692874C39}"/>
+              </a:ext>
+            </a:extLst>
+          </p:cNvPr>
+          <p:cNvPicPr>
+            <a:picLocks noChangeAspect="1"/>
+          </p:cNvPicPr>
+          <p:nvPr/>
+        </p:nvPicPr>
+        <p:blipFill>
+          <a:blip r:embed="rId2"/>
+          <a:stretch>
+            <a:fillRect/>
+          </a:stretch>
+        </p:blipFill>
+        <p:spPr>
+          <a:xfrm>
+            <a:off x="762000" y="1295400"/>
+            <a:ext cx="7772400" cy="2742173"/>
+          </a:xfrm>
+          <a:prstGeom prst="rect">
+            <a:avLst/>
+          </a:prstGeom>
+        </p:spPr>
+      </p:pic>
+    </p:spTree>
+    <p:extLst>
+      <p:ext uri="{BB962C8B-B14F-4D97-AF65-F5344CB8AC3E}">
+        <p14:creationId xmlns:p14="http://schemas.microsoft.com/office/powerpoint/2010/main" val="1144682682"/>
+      </p:ext>
+    </p:extLst>
+  </p:cSld>
+  <p:clrMapOvr>
+    <a:masterClrMapping/>
+  </p:clrMapOvr>
+</p:sld>
+</file>
+
+<file path=ppt/slides/slide13.xml><?xml version="1.0" encoding="utf-8"?>
 <p:sld xmlns:a="http://schemas.openxmlformats.org/drawingml/2006/main" xmlns:r="http://schemas.openxmlformats.org/officeDocument/2006/relationships" xmlns:p="http://schemas.openxmlformats.org/presentationml/2006/main" show="0">
   <p:cSld>
     <p:spTree>
@@ -4255,7 +4501,7 @@
 </p:sld>
 </file>
 
-<file path=ppt/slides/slide13.xml><?xml version="1.0" encoding="utf-8"?>
+<file path=ppt/slides/slide14.xml><?xml version="1.0" encoding="utf-8"?>
 <p:sld xmlns:a="http://schemas.openxmlformats.org/drawingml/2006/main" xmlns:r="http://schemas.openxmlformats.org/officeDocument/2006/relationships" xmlns:p="http://schemas.openxmlformats.org/presentationml/2006/main">
   <p:cSld>
     <p:spTree>
@@ -4540,7 +4786,7 @@
 </p:sld>
 </file>
 
-<file path=ppt/slides/slide14.xml><?xml version="1.0" encoding="utf-8"?>
+<file path=ppt/slides/slide15.xml><?xml version="1.0" encoding="utf-8"?>
 <p:sld xmlns:a="http://schemas.openxmlformats.org/drawingml/2006/main" xmlns:r="http://schemas.openxmlformats.org/officeDocument/2006/relationships" xmlns:p="http://schemas.openxmlformats.org/presentationml/2006/main">
   <p:cSld>
     <p:spTree>
@@ -8228,7 +8474,7 @@
         </p:blipFill>
         <p:spPr>
           <a:xfrm>
-            <a:off x="914400" y="1380744"/>
+            <a:off x="381000" y="152400"/>
             <a:ext cx="7315200" cy="4096512"/>
           </a:xfrm>
           <a:prstGeom prst="rect">
@@ -8264,7 +8510,7 @@
         </p:blipFill>
         <p:spPr>
           <a:xfrm>
-            <a:off x="914400" y="1380744"/>
+            <a:off x="381000" y="152400"/>
             <a:ext cx="7315200" cy="4096512"/>
           </a:xfrm>
           <a:prstGeom prst="rect">
@@ -8300,7 +8546,7 @@
         </p:blipFill>
         <p:spPr>
           <a:xfrm>
-            <a:off x="914400" y="1380744"/>
+            <a:off x="381000" y="152400"/>
             <a:ext cx="7315200" cy="4096512"/>
           </a:xfrm>
           <a:prstGeom prst="rect">
@@ -8336,7 +8582,7 @@
         </p:blipFill>
         <p:spPr>
           <a:xfrm>
-            <a:off x="914400" y="1380744"/>
+            <a:off x="381000" y="152400"/>
             <a:ext cx="7315200" cy="4096512"/>
           </a:xfrm>
           <a:prstGeom prst="rect">
@@ -8372,7 +8618,7 @@
         </p:blipFill>
         <p:spPr>
           <a:xfrm>
-            <a:off x="914400" y="1380744"/>
+            <a:off x="381000" y="152400"/>
             <a:ext cx="7315200" cy="4096512"/>
           </a:xfrm>
           <a:prstGeom prst="rect">
@@ -8408,7 +8654,7 @@
         </p:blipFill>
         <p:spPr>
           <a:xfrm>
-            <a:off x="914400" y="1380744"/>
+            <a:off x="381000" y="152400"/>
             <a:ext cx="7315200" cy="4096512"/>
           </a:xfrm>
           <a:prstGeom prst="rect">
@@ -8416,102 +8662,6 @@
           </a:prstGeom>
         </p:spPr>
       </p:pic>
-      <p:sp>
-        <p:nvSpPr>
-          <p:cNvPr id="31" name="TextBox 30">
-            <a:extLst>
-              <a:ext uri="{FF2B5EF4-FFF2-40B4-BE49-F238E27FC236}">
-                <a16:creationId xmlns:a16="http://schemas.microsoft.com/office/drawing/2014/main" id="{5BD60263-5CE7-0E45-9F5A-D1FD4E3BD05A}"/>
-              </a:ext>
-            </a:extLst>
-          </p:cNvPr>
-          <p:cNvSpPr txBox="1"/>
-          <p:nvPr/>
-        </p:nvSpPr>
-        <p:spPr>
-          <a:xfrm>
-            <a:off x="4191000" y="4419815"/>
-            <a:ext cx="3015570" cy="369332"/>
-          </a:xfrm>
-          <a:prstGeom prst="rect">
-            <a:avLst/>
-          </a:prstGeom>
-          <a:solidFill>
-            <a:schemeClr val="bg1"/>
-          </a:solidFill>
-          <a:ln>
-            <a:solidFill>
-              <a:srgbClr val="FF0000"/>
-            </a:solidFill>
-          </a:ln>
-        </p:spPr>
-        <p:txBody>
-          <a:bodyPr wrap="square" rtlCol="0">
-            <a:spAutoFit/>
-          </a:bodyPr>
-          <a:lstStyle/>
-          <a:p>
-            <a:r>
-              <a:rPr lang="en-US" dirty="0"/>
-              <a:t>Your Rating on scale of 1 to 10</a:t>
-            </a:r>
-          </a:p>
-        </p:txBody>
-      </p:sp>
-      <p:sp>
-        <p:nvSpPr>
-          <p:cNvPr id="40" name="Rectangle: Rounded Corners 2">
-            <a:extLst>
-              <a:ext uri="{FF2B5EF4-FFF2-40B4-BE49-F238E27FC236}">
-                <a16:creationId xmlns:a16="http://schemas.microsoft.com/office/drawing/2014/main" id="{855AB9EB-9002-DA42-9669-7332508F8FB0}"/>
-              </a:ext>
-            </a:extLst>
-          </p:cNvPr>
-          <p:cNvSpPr/>
-          <p:nvPr/>
-        </p:nvSpPr>
-        <p:spPr>
-          <a:xfrm>
-            <a:off x="4572000" y="3730577"/>
-            <a:ext cx="2367715" cy="445531"/>
-          </a:xfrm>
-          <a:prstGeom prst="roundRect">
-            <a:avLst/>
-          </a:prstGeom>
-          <a:noFill/>
-          <a:ln w="28575" cap="flat" cmpd="sng" algn="ctr">
-            <a:solidFill>
-              <a:srgbClr val="FF0000"/>
-            </a:solidFill>
-            <a:prstDash val="solid"/>
-            <a:round/>
-            <a:headEnd type="none" w="med" len="med"/>
-            <a:tailEnd type="none" w="med" len="med"/>
-          </a:ln>
-        </p:spPr>
-        <p:style>
-          <a:lnRef idx="0">
-            <a:scrgbClr r="0" g="0" b="0"/>
-          </a:lnRef>
-          <a:fillRef idx="0">
-            <a:scrgbClr r="0" g="0" b="0"/>
-          </a:fillRef>
-          <a:effectRef idx="0">
-            <a:scrgbClr r="0" g="0" b="0"/>
-          </a:effectRef>
-          <a:fontRef idx="minor">
-            <a:schemeClr val="accent2"/>
-          </a:fontRef>
-        </p:style>
-        <p:txBody>
-          <a:bodyPr rtlCol="0" anchor="ctr"/>
-          <a:lstStyle/>
-          <a:p>
-            <a:pPr algn="ctr"/>
-            <a:endParaRPr lang="en-US"/>
-          </a:p>
-        </p:txBody>
-      </p:sp>
       <p:cxnSp>
         <p:nvCxnSpPr>
           <p:cNvPr id="41" name="Straight Arrow Connector 40">
@@ -8529,8 +8679,8 @@
         </p:nvCxnSpPr>
         <p:spPr>
           <a:xfrm>
-            <a:off x="2628900" y="2371130"/>
-            <a:ext cx="1485900" cy="600670"/>
+            <a:off x="2095500" y="1419785"/>
+            <a:ext cx="1485900" cy="323671"/>
           </a:xfrm>
           <a:prstGeom prst="straightConnector1">
             <a:avLst/>
@@ -8575,8 +8725,8 @@
         </p:nvCxnSpPr>
         <p:spPr>
           <a:xfrm>
-            <a:off x="4191000" y="1909465"/>
-            <a:ext cx="838200" cy="528721"/>
+            <a:off x="3657600" y="819621"/>
+            <a:ext cx="609600" cy="323164"/>
           </a:xfrm>
           <a:prstGeom prst="straightConnector1">
             <a:avLst/>
@@ -8618,8 +8768,8 @@
         </p:nvSpPr>
         <p:spPr>
           <a:xfrm>
-            <a:off x="1066800" y="1447800"/>
-            <a:ext cx="3124200" cy="923330"/>
+            <a:off x="533400" y="219456"/>
+            <a:ext cx="3124200" cy="1200329"/>
           </a:xfrm>
           <a:prstGeom prst="rect">
             <a:avLst/>
@@ -8663,8 +8813,365 @@
             </a:r>
             <a:r>
               <a:rPr lang="en-US" dirty="0"/>
-              <a:t>’</a:t>
-            </a:r>
+              <a:t>’ topic</a:t>
+            </a:r>
+          </a:p>
+        </p:txBody>
+      </p:sp>
+      <p:grpSp>
+        <p:nvGrpSpPr>
+          <p:cNvPr id="3" name="Group 2">
+            <a:extLst>
+              <a:ext uri="{FF2B5EF4-FFF2-40B4-BE49-F238E27FC236}">
+                <a16:creationId xmlns:a16="http://schemas.microsoft.com/office/drawing/2014/main" id="{B3FDCE70-3908-44D0-B436-A8518DFF41BF}"/>
+              </a:ext>
+            </a:extLst>
+          </p:cNvPr>
+          <p:cNvGrpSpPr/>
+          <p:nvPr/>
+        </p:nvGrpSpPr>
+        <p:grpSpPr>
+          <a:xfrm>
+            <a:off x="3581400" y="4811375"/>
+            <a:ext cx="3531979" cy="1860446"/>
+            <a:chOff x="2224473" y="5056589"/>
+            <a:chExt cx="3795327" cy="2481942"/>
+          </a:xfrm>
+        </p:grpSpPr>
+        <p:pic>
+          <p:nvPicPr>
+            <p:cNvPr id="2" name="Picture 1">
+              <a:extLst>
+                <a:ext uri="{FF2B5EF4-FFF2-40B4-BE49-F238E27FC236}">
+                  <a16:creationId xmlns:a16="http://schemas.microsoft.com/office/drawing/2014/main" id="{13DB6647-67C1-4C93-AA6C-C423BFB53EA2}"/>
+                </a:ext>
+              </a:extLst>
+            </p:cNvPr>
+            <p:cNvPicPr>
+              <a:picLocks noChangeAspect="1"/>
+            </p:cNvPicPr>
+            <p:nvPr/>
+          </p:nvPicPr>
+          <p:blipFill>
+            <a:blip r:embed="rId8"/>
+            <a:stretch>
+              <a:fillRect/>
+            </a:stretch>
+          </p:blipFill>
+          <p:spPr>
+            <a:xfrm>
+              <a:off x="2224473" y="5056589"/>
+              <a:ext cx="914400" cy="2481942"/>
+            </a:xfrm>
+            <a:prstGeom prst="rect">
+              <a:avLst/>
+            </a:prstGeom>
+          </p:spPr>
+        </p:pic>
+        <p:cxnSp>
+          <p:nvCxnSpPr>
+            <p:cNvPr id="14" name="Straight Arrow Connector 13">
+              <a:extLst>
+                <a:ext uri="{FF2B5EF4-FFF2-40B4-BE49-F238E27FC236}">
+                  <a16:creationId xmlns:a16="http://schemas.microsoft.com/office/drawing/2014/main" id="{102B4B03-CEF9-49C0-84D3-DE2A40E1229E}"/>
+                </a:ext>
+              </a:extLst>
+            </p:cNvPr>
+            <p:cNvCxnSpPr>
+              <a:cxnSpLocks/>
+            </p:cNvCxnSpPr>
+            <p:nvPr/>
+          </p:nvCxnSpPr>
+          <p:spPr>
+            <a:xfrm>
+              <a:off x="3288934" y="5245608"/>
+              <a:ext cx="444867" cy="0"/>
+            </a:xfrm>
+            <a:prstGeom prst="straightConnector1">
+              <a:avLst/>
+            </a:prstGeom>
+            <a:ln w="38100">
+              <a:solidFill>
+                <a:schemeClr val="tx1"/>
+              </a:solidFill>
+              <a:tailEnd type="triangle"/>
+            </a:ln>
+          </p:spPr>
+          <p:style>
+            <a:lnRef idx="1">
+              <a:schemeClr val="accent1"/>
+            </a:lnRef>
+            <a:fillRef idx="0">
+              <a:schemeClr val="accent1"/>
+            </a:fillRef>
+            <a:effectRef idx="0">
+              <a:schemeClr val="accent1"/>
+            </a:effectRef>
+            <a:fontRef idx="minor">
+              <a:schemeClr val="tx1"/>
+            </a:fontRef>
+          </p:style>
+        </p:cxnSp>
+        <p:cxnSp>
+          <p:nvCxnSpPr>
+            <p:cNvPr id="16" name="Straight Arrow Connector 15">
+              <a:extLst>
+                <a:ext uri="{FF2B5EF4-FFF2-40B4-BE49-F238E27FC236}">
+                  <a16:creationId xmlns:a16="http://schemas.microsoft.com/office/drawing/2014/main" id="{49508F76-F7CF-4F39-9E7D-858F62082ABC}"/>
+                </a:ext>
+              </a:extLst>
+            </p:cNvPr>
+            <p:cNvCxnSpPr>
+              <a:cxnSpLocks/>
+            </p:cNvCxnSpPr>
+            <p:nvPr/>
+          </p:nvCxnSpPr>
+          <p:spPr>
+            <a:xfrm>
+              <a:off x="3288932" y="7162800"/>
+              <a:ext cx="444868" cy="0"/>
+            </a:xfrm>
+            <a:prstGeom prst="straightConnector1">
+              <a:avLst/>
+            </a:prstGeom>
+            <a:ln w="38100">
+              <a:solidFill>
+                <a:schemeClr val="tx1"/>
+              </a:solidFill>
+              <a:tailEnd type="triangle"/>
+            </a:ln>
+          </p:spPr>
+          <p:style>
+            <a:lnRef idx="1">
+              <a:schemeClr val="accent1"/>
+            </a:lnRef>
+            <a:fillRef idx="0">
+              <a:schemeClr val="accent1"/>
+            </a:fillRef>
+            <a:effectRef idx="0">
+              <a:schemeClr val="accent1"/>
+            </a:effectRef>
+            <a:fontRef idx="minor">
+              <a:schemeClr val="tx1"/>
+            </a:fontRef>
+          </p:style>
+        </p:cxnSp>
+        <p:sp>
+          <p:nvSpPr>
+            <p:cNvPr id="17" name="TextBox 16">
+              <a:extLst>
+                <a:ext uri="{FF2B5EF4-FFF2-40B4-BE49-F238E27FC236}">
+                  <a16:creationId xmlns:a16="http://schemas.microsoft.com/office/drawing/2014/main" id="{45A4C963-7924-451D-9B57-A19A39048EA2}"/>
+                </a:ext>
+              </a:extLst>
+            </p:cNvPr>
+            <p:cNvSpPr txBox="1"/>
+            <p:nvPr/>
+          </p:nvSpPr>
+          <p:spPr>
+            <a:xfrm>
+              <a:off x="3733800" y="5060942"/>
+              <a:ext cx="2286000" cy="374455"/>
+            </a:xfrm>
+            <a:prstGeom prst="rect">
+              <a:avLst/>
+            </a:prstGeom>
+            <a:noFill/>
+          </p:spPr>
+          <p:txBody>
+            <a:bodyPr wrap="square" rtlCol="0">
+              <a:spAutoFit/>
+            </a:bodyPr>
+            <a:lstStyle/>
+            <a:p>
+              <a:r>
+                <a:rPr lang="en-US" sz="1600" dirty="0"/>
+                <a:t>Highest importance</a:t>
+              </a:r>
+            </a:p>
+          </p:txBody>
+        </p:sp>
+        <p:sp>
+          <p:nvSpPr>
+            <p:cNvPr id="18" name="TextBox 17">
+              <a:extLst>
+                <a:ext uri="{FF2B5EF4-FFF2-40B4-BE49-F238E27FC236}">
+                  <a16:creationId xmlns:a16="http://schemas.microsoft.com/office/drawing/2014/main" id="{ABD9F77E-EFFA-44CA-B126-1C59D940A67C}"/>
+                </a:ext>
+              </a:extLst>
+            </p:cNvPr>
+            <p:cNvSpPr txBox="1"/>
+            <p:nvPr/>
+          </p:nvSpPr>
+          <p:spPr>
+            <a:xfrm>
+              <a:off x="3733800" y="6988542"/>
+              <a:ext cx="2286000" cy="374455"/>
+            </a:xfrm>
+            <a:prstGeom prst="rect">
+              <a:avLst/>
+            </a:prstGeom>
+            <a:noFill/>
+          </p:spPr>
+          <p:txBody>
+            <a:bodyPr wrap="square" rtlCol="0">
+              <a:spAutoFit/>
+            </a:bodyPr>
+            <a:lstStyle/>
+            <a:p>
+              <a:r>
+                <a:rPr lang="en-US" sz="1600" dirty="0"/>
+                <a:t>Lowest importance</a:t>
+              </a:r>
+            </a:p>
+          </p:txBody>
+        </p:sp>
+      </p:grpSp>
+      <p:sp>
+        <p:nvSpPr>
+          <p:cNvPr id="19" name="Rectangle: Rounded Corners 2">
+            <a:extLst>
+              <a:ext uri="{FF2B5EF4-FFF2-40B4-BE49-F238E27FC236}">
+                <a16:creationId xmlns:a16="http://schemas.microsoft.com/office/drawing/2014/main" id="{E517A6E9-58D8-41B8-B6C7-68FEE82B2962}"/>
+              </a:ext>
+            </a:extLst>
+          </p:cNvPr>
+          <p:cNvSpPr/>
+          <p:nvPr/>
+        </p:nvSpPr>
+        <p:spPr>
+          <a:xfrm>
+            <a:off x="3962400" y="1142785"/>
+            <a:ext cx="2286000" cy="326243"/>
+          </a:xfrm>
+          <a:prstGeom prst="roundRect">
+            <a:avLst/>
+          </a:prstGeom>
+          <a:noFill/>
+          <a:ln w="28575" cap="flat" cmpd="sng" algn="ctr">
+            <a:solidFill>
+              <a:srgbClr val="FF0000"/>
+            </a:solidFill>
+            <a:prstDash val="solid"/>
+            <a:round/>
+            <a:headEnd type="none" w="med" len="med"/>
+            <a:tailEnd type="none" w="med" len="med"/>
+          </a:ln>
+        </p:spPr>
+        <p:style>
+          <a:lnRef idx="0">
+            <a:scrgbClr r="0" g="0" b="0"/>
+          </a:lnRef>
+          <a:fillRef idx="0">
+            <a:scrgbClr r="0" g="0" b="0"/>
+          </a:fillRef>
+          <a:effectRef idx="0">
+            <a:scrgbClr r="0" g="0" b="0"/>
+          </a:effectRef>
+          <a:fontRef idx="minor">
+            <a:schemeClr val="accent2"/>
+          </a:fontRef>
+        </p:style>
+        <p:txBody>
+          <a:bodyPr rtlCol="0" anchor="ctr"/>
+          <a:lstStyle/>
+          <a:p>
+            <a:pPr algn="ctr"/>
+            <a:endParaRPr lang="en-US"/>
+          </a:p>
+        </p:txBody>
+      </p:sp>
+      <p:sp>
+        <p:nvSpPr>
+          <p:cNvPr id="21" name="TextBox 20">
+            <a:extLst>
+              <a:ext uri="{FF2B5EF4-FFF2-40B4-BE49-F238E27FC236}">
+                <a16:creationId xmlns:a16="http://schemas.microsoft.com/office/drawing/2014/main" id="{99E4C5A6-9933-4E71-B8FF-A5D9A56876AD}"/>
+              </a:ext>
+            </a:extLst>
+          </p:cNvPr>
+          <p:cNvSpPr txBox="1"/>
+          <p:nvPr/>
+        </p:nvSpPr>
+        <p:spPr>
+          <a:xfrm>
+            <a:off x="1078339" y="5434929"/>
+            <a:ext cx="2407298" cy="338554"/>
+          </a:xfrm>
+          <a:prstGeom prst="rect">
+            <a:avLst/>
+          </a:prstGeom>
+          <a:noFill/>
+        </p:spPr>
+        <p:txBody>
+          <a:bodyPr wrap="square" rtlCol="0">
+            <a:spAutoFit/>
+          </a:bodyPr>
+          <a:lstStyle/>
+          <a:p>
+            <a:r>
+              <a:rPr lang="en-US" sz="1600" dirty="0"/>
+              <a:t>What do colors mean?</a:t>
+            </a:r>
+          </a:p>
+        </p:txBody>
+      </p:sp>
+      <p:sp>
+        <p:nvSpPr>
+          <p:cNvPr id="22" name="Rectangle: Rounded Corners 2">
+            <a:extLst>
+              <a:ext uri="{FF2B5EF4-FFF2-40B4-BE49-F238E27FC236}">
+                <a16:creationId xmlns:a16="http://schemas.microsoft.com/office/drawing/2014/main" id="{ECB70984-D069-4842-87EB-4FB0EA8449DF}"/>
+              </a:ext>
+            </a:extLst>
+          </p:cNvPr>
+          <p:cNvSpPr/>
+          <p:nvPr/>
+        </p:nvSpPr>
+        <p:spPr>
+          <a:xfrm>
+            <a:off x="1047859" y="4721114"/>
+            <a:ext cx="5791201" cy="1981200"/>
+          </a:xfrm>
+          <a:prstGeom prst="roundRect">
+            <a:avLst>
+              <a:gd name="adj" fmla="val 6284"/>
+            </a:avLst>
+          </a:prstGeom>
+          <a:noFill/>
+          <a:ln w="28575" cap="flat" cmpd="sng" algn="ctr">
+            <a:solidFill>
+              <a:schemeClr val="tx1">
+                <a:lumMod val="65000"/>
+                <a:lumOff val="35000"/>
+              </a:schemeClr>
+            </a:solidFill>
+            <a:prstDash val="solid"/>
+            <a:round/>
+            <a:headEnd type="none" w="med" len="med"/>
+            <a:tailEnd type="none" w="med" len="med"/>
+          </a:ln>
+        </p:spPr>
+        <p:style>
+          <a:lnRef idx="0">
+            <a:scrgbClr r="0" g="0" b="0"/>
+          </a:lnRef>
+          <a:fillRef idx="0">
+            <a:scrgbClr r="0" g="0" b="0"/>
+          </a:fillRef>
+          <a:effectRef idx="0">
+            <a:scrgbClr r="0" g="0" b="0"/>
+          </a:effectRef>
+          <a:fontRef idx="minor">
+            <a:schemeClr val="accent2"/>
+          </a:fontRef>
+        </p:style>
+        <p:txBody>
+          <a:bodyPr rtlCol="0" anchor="ctr"/>
+          <a:lstStyle/>
+          <a:p>
+            <a:pPr algn="ctr"/>
+            <a:endParaRPr lang="en-US"/>
           </a:p>
         </p:txBody>
       </p:sp>

</xml_diff>